<commit_message>
add data in ppt
</commit_message>
<xml_diff>
--- a/final_submission_ppt.pptx
+++ b/final_submission_ppt.pptx
@@ -128,6 +128,11 @@
       </a:defRPr>
     </a:lvl9pPr>
   </p:defaultTextStyle>
+  <p:extLst>
+    <p:ext uri="{EFAFB233-063F-42B5-8137-9DF3F51BA10A}">
+      <p15:sldGuideLst xmlns:p15="http://schemas.microsoft.com/office/powerpoint/2012/main"/>
+    </p:ext>
+  </p:extLst>
 </p:presentation>
 </file>
 
@@ -213,7 +218,7 @@
           <a:p>
             <a:fld id="{CEA70BE0-BF05-4CF0-9DB8-666FF0CBBF8A}" type="datetimeFigureOut">
               <a:rPr lang="en-IN" smtClean="0"/>
-              <a:t>26-05-2022</a:t>
+              <a:t>29-05-2022</a:t>
             </a:fld>
             <a:endParaRPr lang="en-IN"/>
           </a:p>
@@ -277,35 +282,35 @@
           <a:p>
             <a:pPr lvl="0"/>
             <a:r>
-              <a:rPr lang="en-US" smtClean="0"/>
+              <a:rPr lang="en-US"/>
               <a:t>Edit Master text styles</a:t>
             </a:r>
           </a:p>
           <a:p>
             <a:pPr lvl="1"/>
             <a:r>
-              <a:rPr lang="en-US" smtClean="0"/>
+              <a:rPr lang="en-US"/>
               <a:t>Second level</a:t>
             </a:r>
           </a:p>
           <a:p>
             <a:pPr lvl="2"/>
             <a:r>
-              <a:rPr lang="en-US" smtClean="0"/>
+              <a:rPr lang="en-US"/>
               <a:t>Third level</a:t>
             </a:r>
           </a:p>
           <a:p>
             <a:pPr lvl="3"/>
             <a:r>
-              <a:rPr lang="en-US" smtClean="0"/>
+              <a:rPr lang="en-US"/>
               <a:t>Fourth level</a:t>
             </a:r>
           </a:p>
           <a:p>
             <a:pPr lvl="4"/>
             <a:r>
-              <a:rPr lang="en-US" smtClean="0"/>
+              <a:rPr lang="en-US"/>
               <a:t>Fifth level</a:t>
             </a:r>
             <a:endParaRPr lang="en-IN"/>
@@ -631,7 +636,7 @@
               </a:spcBef>
             </a:pPr>
             <a:r>
-              <a:rPr lang="en-US" smtClean="0"/>
+              <a:rPr lang="en-US"/>
               <a:t>Advantage of this 5 pen pc technology:</a:t>
             </a:r>
           </a:p>
@@ -642,7 +647,7 @@
               </a:spcBef>
             </a:pPr>
             <a:r>
-              <a:rPr lang="en-US" smtClean="0"/>
+              <a:rPr lang="en-US"/>
               <a:t>It is Portable i.e can be carried</a:t>
             </a:r>
           </a:p>
@@ -653,7 +658,7 @@
               </a:spcBef>
             </a:pPr>
             <a:r>
-              <a:rPr lang="en-US" smtClean="0"/>
+              <a:rPr lang="en-US"/>
               <a:t>It is Feasible i.e workable, executable</a:t>
             </a:r>
           </a:p>
@@ -664,7 +669,7 @@
               </a:spcBef>
             </a:pPr>
             <a:r>
-              <a:rPr lang="en-US" smtClean="0"/>
+              <a:rPr lang="en-US"/>
               <a:t>Ultimate ubiquitous(being present everywhere at once)</a:t>
             </a:r>
           </a:p>
@@ -675,7 +680,7 @@
               </a:spcBef>
             </a:pPr>
             <a:r>
-              <a:rPr lang="en-US" smtClean="0"/>
+              <a:rPr lang="en-US"/>
               <a:t>Support WiFi technology</a:t>
             </a:r>
           </a:p>
@@ -686,7 +691,7 @@
               </a:spcBef>
             </a:pPr>
             <a:r>
-              <a:rPr lang="en-US" smtClean="0"/>
+              <a:rPr lang="en-US"/>
               <a:t>Pens produces both the monitor as well as the keyboard on any flat surfaces from where you can carry out functions.</a:t>
             </a:r>
           </a:p>
@@ -696,7 +701,7 @@
                 <a:spcPct val="0"/>
               </a:spcBef>
             </a:pPr>
-            <a:endParaRPr lang="en-US" smtClean="0"/>
+            <a:endParaRPr lang="en-US"/>
           </a:p>
         </p:txBody>
       </p:sp>
@@ -747,7 +752,7 @@
               </a:pPr>
               <a:t>17</a:t>
             </a:fld>
-            <a:endParaRPr lang="en-US" smtClean="0"/>
+            <a:endParaRPr lang="en-US"/>
           </a:p>
         </p:txBody>
       </p:sp>
@@ -830,7 +835,7 @@
               </a:spcBef>
             </a:pPr>
             <a:r>
-              <a:rPr lang="en-US" sz="2000" b="1" smtClean="0">
+              <a:rPr lang="en-US" sz="2000" b="1">
                 <a:latin typeface="Times New Roman" pitchFamily="16" charset="0"/>
                 <a:cs typeface="Times New Roman" pitchFamily="16" charset="0"/>
               </a:rPr>
@@ -844,7 +849,7 @@
               </a:spcBef>
             </a:pPr>
             <a:r>
-              <a:rPr lang="en-US" sz="2000" b="1" smtClean="0">
+              <a:rPr lang="en-US" sz="2000" b="1">
                 <a:latin typeface="Times New Roman" pitchFamily="16" charset="0"/>
                 <a:cs typeface="Times New Roman" pitchFamily="16" charset="0"/>
               </a:rPr>
@@ -858,7 +863,7 @@
               </a:spcBef>
             </a:pPr>
             <a:r>
-              <a:rPr lang="en-US" smtClean="0">
+              <a:rPr lang="en-US">
                 <a:latin typeface="Times New Roman" pitchFamily="16" charset="0"/>
                 <a:cs typeface="Times New Roman" pitchFamily="16" charset="0"/>
               </a:rPr>
@@ -871,7 +876,7 @@
                 <a:spcPct val="0"/>
               </a:spcBef>
             </a:pPr>
-            <a:endParaRPr lang="en-US" smtClean="0"/>
+            <a:endParaRPr lang="en-US"/>
           </a:p>
         </p:txBody>
       </p:sp>
@@ -922,7 +927,7 @@
               </a:pPr>
               <a:t>20</a:t>
             </a:fld>
-            <a:endParaRPr lang="en-US" smtClean="0"/>
+            <a:endParaRPr lang="en-US"/>
           </a:p>
         </p:txBody>
       </p:sp>
@@ -1004,7 +1009,7 @@
                 <a:spcPct val="0"/>
               </a:spcBef>
             </a:pPr>
-            <a:endParaRPr lang="en-US" smtClean="0"/>
+            <a:endParaRPr lang="en-US"/>
           </a:p>
         </p:txBody>
       </p:sp>
@@ -1055,7 +1060,7 @@
               </a:pPr>
               <a:t>4</a:t>
             </a:fld>
-            <a:endParaRPr lang="en-US" smtClean="0"/>
+            <a:endParaRPr lang="en-US"/>
           </a:p>
         </p:txBody>
       </p:sp>
@@ -1137,7 +1142,7 @@
                 <a:spcPct val="0"/>
               </a:spcBef>
             </a:pPr>
-            <a:endParaRPr lang="en-US" smtClean="0"/>
+            <a:endParaRPr lang="en-US"/>
           </a:p>
         </p:txBody>
       </p:sp>
@@ -1188,7 +1193,7 @@
               </a:pPr>
               <a:t>5</a:t>
             </a:fld>
-            <a:endParaRPr lang="en-US" smtClean="0"/>
+            <a:endParaRPr lang="en-US"/>
           </a:p>
         </p:txBody>
       </p:sp>
@@ -1270,7 +1275,7 @@
                 <a:spcPct val="0"/>
               </a:spcBef>
             </a:pPr>
-            <a:endParaRPr lang="en-US" smtClean="0"/>
+            <a:endParaRPr lang="en-US"/>
           </a:p>
         </p:txBody>
       </p:sp>
@@ -1321,7 +1326,7 @@
               </a:pPr>
               <a:t>7</a:t>
             </a:fld>
-            <a:endParaRPr lang="en-US" smtClean="0"/>
+            <a:endParaRPr lang="en-US"/>
           </a:p>
         </p:txBody>
       </p:sp>
@@ -1403,7 +1408,7 @@
                 <a:spcPct val="0"/>
               </a:spcBef>
             </a:pPr>
-            <a:endParaRPr lang="en-US" smtClean="0"/>
+            <a:endParaRPr lang="en-US"/>
           </a:p>
         </p:txBody>
       </p:sp>
@@ -1454,7 +1459,7 @@
               </a:pPr>
               <a:t>8</a:t>
             </a:fld>
-            <a:endParaRPr lang="en-US" smtClean="0"/>
+            <a:endParaRPr lang="en-US"/>
           </a:p>
         </p:txBody>
       </p:sp>
@@ -1537,7 +1542,7 @@
               </a:spcBef>
             </a:pPr>
             <a:r>
-              <a:rPr lang="en-US" b="1" smtClean="0"/>
+              <a:rPr lang="en-US" b="1"/>
               <a:t>LED Projector:</a:t>
             </a:r>
           </a:p>
@@ -1548,7 +1553,7 @@
               </a:spcBef>
             </a:pPr>
             <a:r>
-              <a:rPr lang="en-US" smtClean="0"/>
+              <a:rPr lang="en-US"/>
               <a:t>The role of monitor is taken by LED Projector which projects on the screen. The size of the projector is of A4 size. It has the approximate resolution capacity of 1024 X 768. Thus it is gives more clarity and good picture.</a:t>
             </a:r>
           </a:p>
@@ -1558,7 +1563,7 @@
                 <a:spcPct val="0"/>
               </a:spcBef>
             </a:pPr>
-            <a:endParaRPr lang="en-US" smtClean="0"/>
+            <a:endParaRPr lang="en-US"/>
           </a:p>
         </p:txBody>
       </p:sp>
@@ -1609,7 +1614,7 @@
               </a:pPr>
               <a:t>11</a:t>
             </a:fld>
-            <a:endParaRPr lang="en-US" smtClean="0"/>
+            <a:endParaRPr lang="en-US"/>
           </a:p>
         </p:txBody>
       </p:sp>
@@ -1692,7 +1697,7 @@
               </a:spcBef>
             </a:pPr>
             <a:r>
-              <a:rPr lang="en-US" b="1" smtClean="0"/>
+              <a:rPr lang="en-US" b="1"/>
               <a:t>Features of virtual keyboards are:</a:t>
             </a:r>
           </a:p>
@@ -1703,49 +1708,49 @@
               </a:spcBef>
             </a:pPr>
             <a:r>
-              <a:rPr lang="en-US" smtClean="0"/>
+              <a:rPr lang="en-US"/>
               <a:t>VKB settings can be changed by Sound: </a:t>
             </a:r>
             <a:br>
-              <a:rPr lang="en-US" smtClean="0"/>
+              <a:rPr lang="en-US"/>
             </a:br>
             <a:r>
-              <a:rPr lang="en-US" smtClean="0"/>
+              <a:rPr lang="en-US"/>
               <a:t>Controllable Virtual Keyboard sound effects (key clicks) </a:t>
             </a:r>
             <a:br>
-              <a:rPr lang="en-US" smtClean="0"/>
+              <a:rPr lang="en-US"/>
             </a:br>
             <a:r>
-              <a:rPr lang="en-US" smtClean="0"/>
+              <a:rPr lang="en-US"/>
               <a:t>Connection: Connection to the appropriate Laptop/PC port </a:t>
             </a:r>
             <a:br>
-              <a:rPr lang="en-US" smtClean="0"/>
+              <a:rPr lang="en-US"/>
             </a:br>
             <a:r>
-              <a:rPr lang="en-US" smtClean="0"/>
+              <a:rPr lang="en-US"/>
               <a:t>Intensity: Intensity of the projected Virtual Keyboard </a:t>
             </a:r>
             <a:br>
-              <a:rPr lang="en-US" smtClean="0"/>
+              <a:rPr lang="en-US"/>
             </a:br>
             <a:r>
-              <a:rPr lang="en-US" smtClean="0"/>
+              <a:rPr lang="en-US"/>
               <a:t>Timeouts: coordinated timeouts to conserve the Virtual Keyboard's battery life </a:t>
             </a:r>
             <a:br>
-              <a:rPr lang="en-US" smtClean="0"/>
+              <a:rPr lang="en-US"/>
             </a:br>
             <a:r>
-              <a:rPr lang="en-US" smtClean="0"/>
+              <a:rPr lang="en-US"/>
               <a:t>Sensitivity: adjustable sensitivity of the Virtual Keyboard </a:t>
             </a:r>
             <a:br>
-              <a:rPr lang="en-US" smtClean="0"/>
+              <a:rPr lang="en-US"/>
             </a:br>
             <a:r>
-              <a:rPr lang="en-US" smtClean="0"/>
+              <a:rPr lang="en-US"/>
               <a:t>Auto-repeat: Allows the VKB to automatically repeat a key based on prescribed parameters. </a:t>
             </a:r>
           </a:p>
@@ -1755,7 +1760,7 @@
                 <a:spcPct val="0"/>
               </a:spcBef>
             </a:pPr>
-            <a:endParaRPr lang="en-US" smtClean="0"/>
+            <a:endParaRPr lang="en-US"/>
           </a:p>
         </p:txBody>
       </p:sp>
@@ -1806,7 +1811,7 @@
               </a:pPr>
               <a:t>12</a:t>
             </a:fld>
-            <a:endParaRPr lang="en-US" smtClean="0"/>
+            <a:endParaRPr lang="en-US"/>
           </a:p>
         </p:txBody>
       </p:sp>
@@ -1889,7 +1894,7 @@
               </a:spcBef>
             </a:pPr>
             <a:r>
-              <a:rPr lang="en-US" b="1" smtClean="0"/>
+              <a:rPr lang="en-US" b="1"/>
               <a:t>Digital Camera:</a:t>
             </a:r>
           </a:p>
@@ -1900,10 +1905,10 @@
               </a:spcBef>
             </a:pPr>
             <a:r>
-              <a:rPr lang="en-US" smtClean="0"/>
+              <a:rPr lang="en-US"/>
               <a:t>We had digital camera in the shape of pen. It is useful in video recording, video conferencing, simply it is called as web cam. It is also connected with other devices through Bluetooth. The major advantage it is small which is easily portable. It is a 360-Degree Visual Communication Device. We have seen video phones hundreds of times in movies. However, why can't we act naturally in front of videophone cameras? Conventional visual communications at a distance have been limited due to the display devices and terminals. This terminal enables showing of the surrounding atmosphere and group-to-group communication with a round display and a central super-wide-angle camera.</a:t>
             </a:r>
-            <a:endParaRPr lang="en-US" b="1" smtClean="0"/>
+            <a:endParaRPr lang="en-US" b="1"/>
           </a:p>
           <a:p>
             <a:pPr eaLnBrk="1" hangingPunct="1">
@@ -1911,7 +1916,7 @@
                 <a:spcPct val="0"/>
               </a:spcBef>
             </a:pPr>
-            <a:endParaRPr lang="en-US" smtClean="0"/>
+            <a:endParaRPr lang="en-US"/>
           </a:p>
         </p:txBody>
       </p:sp>
@@ -1962,7 +1967,7 @@
               </a:pPr>
               <a:t>13</a:t>
             </a:fld>
-            <a:endParaRPr lang="en-US" smtClean="0"/>
+            <a:endParaRPr lang="en-US"/>
           </a:p>
         </p:txBody>
       </p:sp>
@@ -2045,7 +2050,7 @@
               </a:spcBef>
             </a:pPr>
             <a:r>
-              <a:rPr lang="en-US" b="1" smtClean="0"/>
+              <a:rPr lang="en-US" b="1"/>
               <a:t>Battery:</a:t>
             </a:r>
           </a:p>
@@ -2056,31 +2061,31 @@
               </a:spcBef>
             </a:pPr>
             <a:r>
-              <a:rPr lang="en-US" smtClean="0"/>
+              <a:rPr lang="en-US"/>
               <a:t>The most important part in the portable type of computer is its battery. Usually batteries must be </a:t>
             </a:r>
             <a:r>
-              <a:rPr lang="en-US" b="1" smtClean="0"/>
+              <a:rPr lang="en-US" b="1"/>
               <a:t>small in size and work for longer time</a:t>
             </a:r>
             <a:r>
-              <a:rPr lang="en-US" smtClean="0"/>
+              <a:rPr lang="en-US"/>
               <a:t>. It comes with a </a:t>
             </a:r>
             <a:r>
-              <a:rPr lang="en-US" b="1" smtClean="0"/>
+              <a:rPr lang="en-US" b="1"/>
               <a:t>battery life of 6+. </a:t>
             </a:r>
             <a:r>
-              <a:rPr lang="en-US" smtClean="0"/>
+              <a:rPr lang="en-US"/>
               <a:t>For normal use it can be used for </a:t>
             </a:r>
             <a:r>
-              <a:rPr lang="en-US" b="1" smtClean="0"/>
+              <a:rPr lang="en-US" b="1"/>
               <a:t>2 weeks</a:t>
             </a:r>
             <a:r>
-              <a:rPr lang="en-US" smtClean="0"/>
+              <a:rPr lang="en-US"/>
               <a:t>.</a:t>
             </a:r>
           </a:p>
@@ -2090,7 +2095,7 @@
                 <a:spcPct val="0"/>
               </a:spcBef>
             </a:pPr>
-            <a:endParaRPr lang="en-US" smtClean="0"/>
+            <a:endParaRPr lang="en-US"/>
           </a:p>
           <a:p>
             <a:pPr eaLnBrk="1" hangingPunct="1">
@@ -2099,7 +2104,7 @@
               </a:spcBef>
             </a:pPr>
             <a:r>
-              <a:rPr lang="en-US" smtClean="0"/>
+              <a:rPr lang="en-US"/>
               <a:t>This 'pen sort of instrument' produces both the monitor as well as the keyboard on any flat surfaces from where you can carry out functions you would normally do on your desktop computer.</a:t>
             </a:r>
           </a:p>
@@ -2109,7 +2114,7 @@
                 <a:spcPct val="0"/>
               </a:spcBef>
             </a:pPr>
-            <a:endParaRPr lang="en-US" smtClean="0"/>
+            <a:endParaRPr lang="en-US"/>
           </a:p>
         </p:txBody>
       </p:sp>
@@ -2160,7 +2165,7 @@
               </a:pPr>
               <a:t>14</a:t>
             </a:fld>
-            <a:endParaRPr lang="en-US" smtClean="0"/>
+            <a:endParaRPr lang="en-US"/>
           </a:p>
         </p:txBody>
       </p:sp>
@@ -2778,7 +2783,7 @@
           </a:lstStyle>
           <a:p>
             <a:r>
-              <a:rPr lang="en-US" smtClean="0"/>
+              <a:rPr lang="en-US"/>
               <a:t>Click to edit Master title style</a:t>
             </a:r>
             <a:endParaRPr lang="en-US" dirty="0"/>
@@ -2898,7 +2903,7 @@
           </a:lstStyle>
           <a:p>
             <a:r>
-              <a:rPr lang="en-US" smtClean="0"/>
+              <a:rPr lang="en-US"/>
               <a:t>Click to edit Master subtitle style</a:t>
             </a:r>
             <a:endParaRPr lang="en-US" dirty="0"/>
@@ -2922,7 +2927,7 @@
           <a:p>
             <a:fld id="{32FA8481-49B5-4554-8783-D82DF5D35915}" type="datetimeFigureOut">
               <a:rPr lang="en-IN" smtClean="0"/>
-              <a:t>26-05-2022</a:t>
+              <a:t>29-05-2022</a:t>
             </a:fld>
             <a:endParaRPr lang="en-IN"/>
           </a:p>
@@ -3027,7 +3032,7 @@
           </a:lstStyle>
           <a:p>
             <a:r>
-              <a:rPr lang="en-US" smtClean="0"/>
+              <a:rPr lang="en-US"/>
               <a:t>Click to edit Master title style</a:t>
             </a:r>
             <a:endParaRPr lang="en-US" dirty="0"/>
@@ -3150,7 +3155,7 @@
           <a:p>
             <a:pPr lvl="0"/>
             <a:r>
-              <a:rPr lang="en-US" smtClean="0"/>
+              <a:rPr lang="en-US"/>
               <a:t>Edit Master text styles</a:t>
             </a:r>
           </a:p>
@@ -3173,7 +3178,7 @@
           <a:p>
             <a:fld id="{32FA8481-49B5-4554-8783-D82DF5D35915}" type="datetimeFigureOut">
               <a:rPr lang="en-IN" smtClean="0"/>
-              <a:t>26-05-2022</a:t>
+              <a:t>29-05-2022</a:t>
             </a:fld>
             <a:endParaRPr lang="en-IN"/>
           </a:p>
@@ -3278,7 +3283,7 @@
           </a:lstStyle>
           <a:p>
             <a:r>
-              <a:rPr lang="en-US" smtClean="0"/>
+              <a:rPr lang="en-US"/>
               <a:t>Click to edit Master title style</a:t>
             </a:r>
             <a:endParaRPr lang="en-US" dirty="0"/>
@@ -3342,7 +3347,7 @@
           <a:p>
             <a:pPr lvl="0"/>
             <a:r>
-              <a:rPr lang="en-US" smtClean="0"/>
+              <a:rPr lang="en-US"/>
               <a:t>Edit Master text styles</a:t>
             </a:r>
           </a:p>
@@ -3464,7 +3469,7 @@
           <a:p>
             <a:pPr lvl="0"/>
             <a:r>
-              <a:rPr lang="en-US" smtClean="0"/>
+              <a:rPr lang="en-US"/>
               <a:t>Edit Master text styles</a:t>
             </a:r>
           </a:p>
@@ -3487,7 +3492,7 @@
           <a:p>
             <a:fld id="{32FA8481-49B5-4554-8783-D82DF5D35915}" type="datetimeFigureOut">
               <a:rPr lang="en-IN" smtClean="0"/>
-              <a:t>26-05-2022</a:t>
+              <a:t>29-05-2022</a:t>
             </a:fld>
             <a:endParaRPr lang="en-IN"/>
           </a:p>
@@ -3674,7 +3679,7 @@
           </a:lstStyle>
           <a:p>
             <a:r>
-              <a:rPr lang="en-US" smtClean="0"/>
+              <a:rPr lang="en-US"/>
               <a:t>Click to edit Master title style</a:t>
             </a:r>
             <a:endParaRPr lang="en-US" dirty="0"/>
@@ -3797,7 +3802,7 @@
           <a:p>
             <a:pPr lvl="0"/>
             <a:r>
-              <a:rPr lang="en-US" smtClean="0"/>
+              <a:rPr lang="en-US"/>
               <a:t>Edit Master text styles</a:t>
             </a:r>
           </a:p>
@@ -3820,7 +3825,7 @@
           <a:p>
             <a:fld id="{32FA8481-49B5-4554-8783-D82DF5D35915}" type="datetimeFigureOut">
               <a:rPr lang="en-IN" smtClean="0"/>
-              <a:t>26-05-2022</a:t>
+              <a:t>29-05-2022</a:t>
             </a:fld>
             <a:endParaRPr lang="en-IN"/>
           </a:p>
@@ -3925,7 +3930,7 @@
           </a:lstStyle>
           <a:p>
             <a:r>
-              <a:rPr lang="en-US" smtClean="0"/>
+              <a:rPr lang="en-US"/>
               <a:t>Click to edit Master title style</a:t>
             </a:r>
             <a:endParaRPr lang="en-US" dirty="0"/>
@@ -3989,7 +3994,7 @@
           <a:p>
             <a:pPr lvl="0"/>
             <a:r>
-              <a:rPr lang="en-US" smtClean="0"/>
+              <a:rPr lang="en-US"/>
               <a:t>Edit Master text styles</a:t>
             </a:r>
           </a:p>
@@ -4111,7 +4116,7 @@
           <a:p>
             <a:pPr lvl="0"/>
             <a:r>
-              <a:rPr lang="en-US" smtClean="0"/>
+              <a:rPr lang="en-US"/>
               <a:t>Edit Master text styles</a:t>
             </a:r>
           </a:p>
@@ -4134,7 +4139,7 @@
           <a:p>
             <a:fld id="{32FA8481-49B5-4554-8783-D82DF5D35915}" type="datetimeFigureOut">
               <a:rPr lang="en-IN" smtClean="0"/>
-              <a:t>26-05-2022</a:t>
+              <a:t>29-05-2022</a:t>
             </a:fld>
             <a:endParaRPr lang="en-IN"/>
           </a:p>
@@ -4321,7 +4326,7 @@
           </a:lstStyle>
           <a:p>
             <a:r>
-              <a:rPr lang="en-US" smtClean="0"/>
+              <a:rPr lang="en-US"/>
               <a:t>Click to edit Master title style</a:t>
             </a:r>
             <a:endParaRPr lang="en-US" dirty="0"/>
@@ -4382,7 +4387,7 @@
           <a:p>
             <a:pPr lvl="0"/>
             <a:r>
-              <a:rPr lang="en-US" smtClean="0"/>
+              <a:rPr lang="en-US"/>
               <a:t>Edit Master text styles</a:t>
             </a:r>
           </a:p>
@@ -4504,7 +4509,7 @@
           <a:p>
             <a:pPr lvl="0"/>
             <a:r>
-              <a:rPr lang="en-US" smtClean="0"/>
+              <a:rPr lang="en-US"/>
               <a:t>Edit Master text styles</a:t>
             </a:r>
           </a:p>
@@ -4527,7 +4532,7 @@
           <a:p>
             <a:fld id="{32FA8481-49B5-4554-8783-D82DF5D35915}" type="datetimeFigureOut">
               <a:rPr lang="en-IN" smtClean="0"/>
-              <a:t>26-05-2022</a:t>
+              <a:t>29-05-2022</a:t>
             </a:fld>
             <a:endParaRPr lang="en-IN"/>
           </a:p>
@@ -4621,7 +4626,7 @@
           <a:lstStyle/>
           <a:p>
             <a:r>
-              <a:rPr lang="en-US" smtClean="0"/>
+              <a:rPr lang="en-US"/>
               <a:t>Click to edit Master title style</a:t>
             </a:r>
             <a:endParaRPr lang="en-US" dirty="0"/>
@@ -4645,35 +4650,35 @@
           <a:p>
             <a:pPr lvl="0"/>
             <a:r>
-              <a:rPr lang="en-US" smtClean="0"/>
+              <a:rPr lang="en-US"/>
               <a:t>Edit Master text styles</a:t>
             </a:r>
           </a:p>
           <a:p>
             <a:pPr lvl="1"/>
             <a:r>
-              <a:rPr lang="en-US" smtClean="0"/>
+              <a:rPr lang="en-US"/>
               <a:t>Second level</a:t>
             </a:r>
           </a:p>
           <a:p>
             <a:pPr lvl="2"/>
             <a:r>
-              <a:rPr lang="en-US" smtClean="0"/>
+              <a:rPr lang="en-US"/>
               <a:t>Third level</a:t>
             </a:r>
           </a:p>
           <a:p>
             <a:pPr lvl="3"/>
             <a:r>
-              <a:rPr lang="en-US" smtClean="0"/>
+              <a:rPr lang="en-US"/>
               <a:t>Fourth level</a:t>
             </a:r>
           </a:p>
           <a:p>
             <a:pPr lvl="4"/>
             <a:r>
-              <a:rPr lang="en-US" smtClean="0"/>
+              <a:rPr lang="en-US"/>
               <a:t>Fifth level</a:t>
             </a:r>
             <a:endParaRPr lang="en-US" dirty="0"/>
@@ -4697,7 +4702,7 @@
           <a:p>
             <a:fld id="{32FA8481-49B5-4554-8783-D82DF5D35915}" type="datetimeFigureOut">
               <a:rPr lang="en-IN" smtClean="0"/>
-              <a:t>26-05-2022</a:t>
+              <a:t>29-05-2022</a:t>
             </a:fld>
             <a:endParaRPr lang="en-IN"/>
           </a:p>
@@ -4796,7 +4801,7 @@
           <a:lstStyle/>
           <a:p>
             <a:r>
-              <a:rPr lang="en-US" smtClean="0"/>
+              <a:rPr lang="en-US"/>
               <a:t>Click to edit Master title style</a:t>
             </a:r>
             <a:endParaRPr lang="en-US" dirty="0"/>
@@ -4825,35 +4830,35 @@
           <a:p>
             <a:pPr lvl="0"/>
             <a:r>
-              <a:rPr lang="en-US" smtClean="0"/>
+              <a:rPr lang="en-US"/>
               <a:t>Edit Master text styles</a:t>
             </a:r>
           </a:p>
           <a:p>
             <a:pPr lvl="1"/>
             <a:r>
-              <a:rPr lang="en-US" smtClean="0"/>
+              <a:rPr lang="en-US"/>
               <a:t>Second level</a:t>
             </a:r>
           </a:p>
           <a:p>
             <a:pPr lvl="2"/>
             <a:r>
-              <a:rPr lang="en-US" smtClean="0"/>
+              <a:rPr lang="en-US"/>
               <a:t>Third level</a:t>
             </a:r>
           </a:p>
           <a:p>
             <a:pPr lvl="3"/>
             <a:r>
-              <a:rPr lang="en-US" smtClean="0"/>
+              <a:rPr lang="en-US"/>
               <a:t>Fourth level</a:t>
             </a:r>
           </a:p>
           <a:p>
             <a:pPr lvl="4"/>
             <a:r>
-              <a:rPr lang="en-US" smtClean="0"/>
+              <a:rPr lang="en-US"/>
               <a:t>Fifth level</a:t>
             </a:r>
             <a:endParaRPr lang="en-US" dirty="0"/>
@@ -4877,7 +4882,7 @@
           <a:p>
             <a:fld id="{32FA8481-49B5-4554-8783-D82DF5D35915}" type="datetimeFigureOut">
               <a:rPr lang="en-IN" smtClean="0"/>
-              <a:t>26-05-2022</a:t>
+              <a:t>29-05-2022</a:t>
             </a:fld>
             <a:endParaRPr lang="en-IN"/>
           </a:p>
@@ -4971,7 +4976,7 @@
           <a:lstStyle/>
           <a:p>
             <a:r>
-              <a:rPr lang="en-US" smtClean="0"/>
+              <a:rPr lang="en-US"/>
               <a:t>Click to edit Master title style</a:t>
             </a:r>
             <a:endParaRPr lang="en-US" dirty="0"/>
@@ -4995,35 +5000,35 @@
           <a:p>
             <a:pPr lvl="0"/>
             <a:r>
-              <a:rPr lang="en-US" smtClean="0"/>
+              <a:rPr lang="en-US"/>
               <a:t>Edit Master text styles</a:t>
             </a:r>
           </a:p>
           <a:p>
             <a:pPr lvl="1"/>
             <a:r>
-              <a:rPr lang="en-US" smtClean="0"/>
+              <a:rPr lang="en-US"/>
               <a:t>Second level</a:t>
             </a:r>
           </a:p>
           <a:p>
             <a:pPr lvl="2"/>
             <a:r>
-              <a:rPr lang="en-US" smtClean="0"/>
+              <a:rPr lang="en-US"/>
               <a:t>Third level</a:t>
             </a:r>
           </a:p>
           <a:p>
             <a:pPr lvl="3"/>
             <a:r>
-              <a:rPr lang="en-US" smtClean="0"/>
+              <a:rPr lang="en-US"/>
               <a:t>Fourth level</a:t>
             </a:r>
           </a:p>
           <a:p>
             <a:pPr lvl="4"/>
             <a:r>
-              <a:rPr lang="en-US" smtClean="0"/>
+              <a:rPr lang="en-US"/>
               <a:t>Fifth level</a:t>
             </a:r>
             <a:endParaRPr lang="en-US" dirty="0"/>
@@ -5047,7 +5052,7 @@
           <a:p>
             <a:fld id="{32FA8481-49B5-4554-8783-D82DF5D35915}" type="datetimeFigureOut">
               <a:rPr lang="en-IN" smtClean="0"/>
-              <a:t>26-05-2022</a:t>
+              <a:t>29-05-2022</a:t>
             </a:fld>
             <a:endParaRPr lang="en-IN"/>
           </a:p>
@@ -5150,7 +5155,7 @@
           </a:lstStyle>
           <a:p>
             <a:r>
-              <a:rPr lang="en-US" smtClean="0"/>
+              <a:rPr lang="en-US"/>
               <a:t>Click to edit Master title style</a:t>
             </a:r>
             <a:endParaRPr lang="en-US" dirty="0"/>
@@ -5271,7 +5276,7 @@
           <a:p>
             <a:pPr lvl="0"/>
             <a:r>
-              <a:rPr lang="en-US" smtClean="0"/>
+              <a:rPr lang="en-US"/>
               <a:t>Edit Master text styles</a:t>
             </a:r>
           </a:p>
@@ -5294,7 +5299,7 @@
           <a:p>
             <a:fld id="{32FA8481-49B5-4554-8783-D82DF5D35915}" type="datetimeFigureOut">
               <a:rPr lang="en-IN" smtClean="0"/>
-              <a:t>26-05-2022</a:t>
+              <a:t>29-05-2022</a:t>
             </a:fld>
             <a:endParaRPr lang="en-IN"/>
           </a:p>
@@ -5388,7 +5393,7 @@
           <a:lstStyle/>
           <a:p>
             <a:r>
-              <a:rPr lang="en-US" smtClean="0"/>
+              <a:rPr lang="en-US"/>
               <a:t>Click to edit Master title style</a:t>
             </a:r>
             <a:endParaRPr lang="en-US" dirty="0"/>
@@ -5417,35 +5422,35 @@
           <a:p>
             <a:pPr lvl="0"/>
             <a:r>
-              <a:rPr lang="en-US" smtClean="0"/>
+              <a:rPr lang="en-US"/>
               <a:t>Edit Master text styles</a:t>
             </a:r>
           </a:p>
           <a:p>
             <a:pPr lvl="1"/>
             <a:r>
-              <a:rPr lang="en-US" smtClean="0"/>
+              <a:rPr lang="en-US"/>
               <a:t>Second level</a:t>
             </a:r>
           </a:p>
           <a:p>
             <a:pPr lvl="2"/>
             <a:r>
-              <a:rPr lang="en-US" smtClean="0"/>
+              <a:rPr lang="en-US"/>
               <a:t>Third level</a:t>
             </a:r>
           </a:p>
           <a:p>
             <a:pPr lvl="3"/>
             <a:r>
-              <a:rPr lang="en-US" smtClean="0"/>
+              <a:rPr lang="en-US"/>
               <a:t>Fourth level</a:t>
             </a:r>
           </a:p>
           <a:p>
             <a:pPr lvl="4"/>
             <a:r>
-              <a:rPr lang="en-US" smtClean="0"/>
+              <a:rPr lang="en-US"/>
               <a:t>Fifth level</a:t>
             </a:r>
             <a:endParaRPr lang="en-US" dirty="0"/>
@@ -5474,35 +5479,35 @@
           <a:p>
             <a:pPr lvl="0"/>
             <a:r>
-              <a:rPr lang="en-US" smtClean="0"/>
+              <a:rPr lang="en-US"/>
               <a:t>Edit Master text styles</a:t>
             </a:r>
           </a:p>
           <a:p>
             <a:pPr lvl="1"/>
             <a:r>
-              <a:rPr lang="en-US" smtClean="0"/>
+              <a:rPr lang="en-US"/>
               <a:t>Second level</a:t>
             </a:r>
           </a:p>
           <a:p>
             <a:pPr lvl="2"/>
             <a:r>
-              <a:rPr lang="en-US" smtClean="0"/>
+              <a:rPr lang="en-US"/>
               <a:t>Third level</a:t>
             </a:r>
           </a:p>
           <a:p>
             <a:pPr lvl="3"/>
             <a:r>
-              <a:rPr lang="en-US" smtClean="0"/>
+              <a:rPr lang="en-US"/>
               <a:t>Fourth level</a:t>
             </a:r>
           </a:p>
           <a:p>
             <a:pPr lvl="4"/>
             <a:r>
-              <a:rPr lang="en-US" smtClean="0"/>
+              <a:rPr lang="en-US"/>
               <a:t>Fifth level</a:t>
             </a:r>
             <a:endParaRPr lang="en-US" dirty="0"/>
@@ -5526,7 +5531,7 @@
           <a:p>
             <a:fld id="{32FA8481-49B5-4554-8783-D82DF5D35915}" type="datetimeFigureOut">
               <a:rPr lang="en-IN" smtClean="0"/>
-              <a:t>26-05-2022</a:t>
+              <a:t>29-05-2022</a:t>
             </a:fld>
             <a:endParaRPr lang="en-IN"/>
           </a:p>
@@ -5624,7 +5629,7 @@
           </a:lstStyle>
           <a:p>
             <a:r>
-              <a:rPr lang="en-US" smtClean="0"/>
+              <a:rPr lang="en-US"/>
               <a:t>Click to edit Master title style</a:t>
             </a:r>
             <a:endParaRPr lang="en-US" dirty="0"/>
@@ -5692,7 +5697,7 @@
           <a:p>
             <a:pPr lvl="0"/>
             <a:r>
-              <a:rPr lang="en-US" smtClean="0"/>
+              <a:rPr lang="en-US"/>
               <a:t>Edit Master text styles</a:t>
             </a:r>
           </a:p>
@@ -5722,35 +5727,35 @@
           <a:p>
             <a:pPr lvl="0"/>
             <a:r>
-              <a:rPr lang="en-US" smtClean="0"/>
+              <a:rPr lang="en-US"/>
               <a:t>Edit Master text styles</a:t>
             </a:r>
           </a:p>
           <a:p>
             <a:pPr lvl="1"/>
             <a:r>
-              <a:rPr lang="en-US" smtClean="0"/>
+              <a:rPr lang="en-US"/>
               <a:t>Second level</a:t>
             </a:r>
           </a:p>
           <a:p>
             <a:pPr lvl="2"/>
             <a:r>
-              <a:rPr lang="en-US" smtClean="0"/>
+              <a:rPr lang="en-US"/>
               <a:t>Third level</a:t>
             </a:r>
           </a:p>
           <a:p>
             <a:pPr lvl="3"/>
             <a:r>
-              <a:rPr lang="en-US" smtClean="0"/>
+              <a:rPr lang="en-US"/>
               <a:t>Fourth level</a:t>
             </a:r>
           </a:p>
           <a:p>
             <a:pPr lvl="4"/>
             <a:r>
-              <a:rPr lang="en-US" smtClean="0"/>
+              <a:rPr lang="en-US"/>
               <a:t>Fifth level</a:t>
             </a:r>
             <a:endParaRPr lang="en-US" dirty="0"/>
@@ -5818,7 +5823,7 @@
           <a:p>
             <a:pPr lvl="0"/>
             <a:r>
-              <a:rPr lang="en-US" smtClean="0"/>
+              <a:rPr lang="en-US"/>
               <a:t>Edit Master text styles</a:t>
             </a:r>
           </a:p>
@@ -5848,35 +5853,35 @@
           <a:p>
             <a:pPr lvl="0"/>
             <a:r>
-              <a:rPr lang="en-US" smtClean="0"/>
+              <a:rPr lang="en-US"/>
               <a:t>Edit Master text styles</a:t>
             </a:r>
           </a:p>
           <a:p>
             <a:pPr lvl="1"/>
             <a:r>
-              <a:rPr lang="en-US" smtClean="0"/>
+              <a:rPr lang="en-US"/>
               <a:t>Second level</a:t>
             </a:r>
           </a:p>
           <a:p>
             <a:pPr lvl="2"/>
             <a:r>
-              <a:rPr lang="en-US" smtClean="0"/>
+              <a:rPr lang="en-US"/>
               <a:t>Third level</a:t>
             </a:r>
           </a:p>
           <a:p>
             <a:pPr lvl="3"/>
             <a:r>
-              <a:rPr lang="en-US" smtClean="0"/>
+              <a:rPr lang="en-US"/>
               <a:t>Fourth level</a:t>
             </a:r>
           </a:p>
           <a:p>
             <a:pPr lvl="4"/>
             <a:r>
-              <a:rPr lang="en-US" smtClean="0"/>
+              <a:rPr lang="en-US"/>
               <a:t>Fifth level</a:t>
             </a:r>
             <a:endParaRPr lang="en-US" dirty="0"/>
@@ -5900,7 +5905,7 @@
           <a:p>
             <a:fld id="{32FA8481-49B5-4554-8783-D82DF5D35915}" type="datetimeFigureOut">
               <a:rPr lang="en-IN" smtClean="0"/>
-              <a:t>26-05-2022</a:t>
+              <a:t>29-05-2022</a:t>
             </a:fld>
             <a:endParaRPr lang="en-IN"/>
           </a:p>
@@ -5999,7 +6004,7 @@
           <a:lstStyle/>
           <a:p>
             <a:r>
-              <a:rPr lang="en-US" smtClean="0"/>
+              <a:rPr lang="en-US"/>
               <a:t>Click to edit Master title style</a:t>
             </a:r>
             <a:endParaRPr lang="en-US" dirty="0"/>
@@ -6023,7 +6028,7 @@
           <a:p>
             <a:fld id="{32FA8481-49B5-4554-8783-D82DF5D35915}" type="datetimeFigureOut">
               <a:rPr lang="en-IN" smtClean="0"/>
-              <a:t>26-05-2022</a:t>
+              <a:t>29-05-2022</a:t>
             </a:fld>
             <a:endParaRPr lang="en-IN"/>
           </a:p>
@@ -6118,7 +6123,7 @@
           <a:p>
             <a:fld id="{32FA8481-49B5-4554-8783-D82DF5D35915}" type="datetimeFigureOut">
               <a:rPr lang="en-IN" smtClean="0"/>
-              <a:t>26-05-2022</a:t>
+              <a:t>29-05-2022</a:t>
             </a:fld>
             <a:endParaRPr lang="en-IN"/>
           </a:p>
@@ -6223,7 +6228,7 @@
           </a:lstStyle>
           <a:p>
             <a:r>
-              <a:rPr lang="en-US" smtClean="0"/>
+              <a:rPr lang="en-US"/>
               <a:t>Click to edit Master title style</a:t>
             </a:r>
             <a:endParaRPr lang="en-US" dirty="0"/>
@@ -6254,35 +6259,35 @@
           <a:p>
             <a:pPr lvl="0"/>
             <a:r>
-              <a:rPr lang="en-US" smtClean="0"/>
+              <a:rPr lang="en-US"/>
               <a:t>Edit Master text styles</a:t>
             </a:r>
           </a:p>
           <a:p>
             <a:pPr lvl="1"/>
             <a:r>
-              <a:rPr lang="en-US" smtClean="0"/>
+              <a:rPr lang="en-US"/>
               <a:t>Second level</a:t>
             </a:r>
           </a:p>
           <a:p>
             <a:pPr lvl="2"/>
             <a:r>
-              <a:rPr lang="en-US" smtClean="0"/>
+              <a:rPr lang="en-US"/>
               <a:t>Third level</a:t>
             </a:r>
           </a:p>
           <a:p>
             <a:pPr lvl="3"/>
             <a:r>
-              <a:rPr lang="en-US" smtClean="0"/>
+              <a:rPr lang="en-US"/>
               <a:t>Fourth level</a:t>
             </a:r>
           </a:p>
           <a:p>
             <a:pPr lvl="4"/>
             <a:r>
-              <a:rPr lang="en-US" smtClean="0"/>
+              <a:rPr lang="en-US"/>
               <a:t>Fifth level</a:t>
             </a:r>
             <a:endParaRPr lang="en-US" dirty="0"/>
@@ -6350,7 +6355,7 @@
           <a:p>
             <a:pPr lvl="0"/>
             <a:r>
-              <a:rPr lang="en-US" smtClean="0"/>
+              <a:rPr lang="en-US"/>
               <a:t>Edit Master text styles</a:t>
             </a:r>
           </a:p>
@@ -6373,7 +6378,7 @@
           <a:p>
             <a:fld id="{32FA8481-49B5-4554-8783-D82DF5D35915}" type="datetimeFigureOut">
               <a:rPr lang="en-IN" smtClean="0"/>
-              <a:t>26-05-2022</a:t>
+              <a:t>29-05-2022</a:t>
             </a:fld>
             <a:endParaRPr lang="en-IN"/>
           </a:p>
@@ -6478,7 +6483,7 @@
           </a:lstStyle>
           <a:p>
             <a:r>
-              <a:rPr lang="en-US" smtClean="0"/>
+              <a:rPr lang="en-US"/>
               <a:t>Click to edit Master title style</a:t>
             </a:r>
             <a:endParaRPr lang="en-US" dirty="0"/>
@@ -6545,7 +6550,7 @@
           </a:lstStyle>
           <a:p>
             <a:r>
-              <a:rPr lang="en-US" smtClean="0"/>
+              <a:rPr lang="en-US"/>
               <a:t>Click icon to add picture</a:t>
             </a:r>
             <a:endParaRPr lang="en-US" dirty="0"/>
@@ -6613,7 +6618,7 @@
           <a:p>
             <a:pPr lvl="0"/>
             <a:r>
-              <a:rPr lang="en-US" smtClean="0"/>
+              <a:rPr lang="en-US"/>
               <a:t>Edit Master text styles</a:t>
             </a:r>
           </a:p>
@@ -6678,7 +6683,7 @@
           <a:p>
             <a:fld id="{32FA8481-49B5-4554-8783-D82DF5D35915}" type="datetimeFigureOut">
               <a:rPr lang="en-IN" smtClean="0"/>
-              <a:t>26-05-2022</a:t>
+              <a:t>29-05-2022</a:t>
             </a:fld>
             <a:endParaRPr lang="en-IN"/>
           </a:p>
@@ -7276,7 +7281,7 @@
           <a:lstStyle/>
           <a:p>
             <a:r>
-              <a:rPr lang="en-US" smtClean="0"/>
+              <a:rPr lang="en-US"/>
               <a:t>Click to edit Master title style</a:t>
             </a:r>
             <a:endParaRPr lang="en-US" dirty="0"/>
@@ -7380,7 +7385,7 @@
           <a:p>
             <a:fld id="{32FA8481-49B5-4554-8783-D82DF5D35915}" type="datetimeFigureOut">
               <a:rPr lang="en-IN" smtClean="0"/>
-              <a:t>26-05-2022</a:t>
+              <a:t>29-05-2022</a:t>
             </a:fld>
             <a:endParaRPr lang="en-IN"/>
           </a:p>
@@ -7932,14 +7937,7 @@
                 <a:latin typeface="Times New Roman" panose="02020603050405020304" pitchFamily="18" charset="0"/>
                 <a:cs typeface="Times New Roman" panose="02020603050405020304" pitchFamily="18" charset="0"/>
               </a:rPr>
-              <a:t>PROF. </a:t>
-            </a:r>
-            <a:r>
-              <a:rPr lang="en-US" sz="1800" b="1" dirty="0">
-                <a:latin typeface="Times New Roman" panose="02020603050405020304" pitchFamily="18" charset="0"/>
-                <a:cs typeface="Times New Roman" panose="02020603050405020304" pitchFamily="18" charset="0"/>
-              </a:rPr>
-              <a:t>RAM MEGHE INSTITUTE OF TECHNOLOGY AND RESEARCH BADNERA, AMRAVATI</a:t>
+              <a:t>PROF. RAM MEGHE INSTITUTE OF TECHNOLOGY AND RESEARCH BADNERA, AMRAVATI</a:t>
             </a:r>
             <a:br>
               <a:rPr lang="en-US" sz="1800" b="1" dirty="0">
@@ -7947,78 +7945,36 @@
                 <a:cs typeface="Times New Roman" panose="02020603050405020304" pitchFamily="18" charset="0"/>
               </a:rPr>
             </a:br>
-            <a:r>
-              <a:rPr lang="en-US" sz="1800" b="1" dirty="0">
-                <a:latin typeface="Times New Roman" panose="02020603050405020304" pitchFamily="18" charset="0"/>
-                <a:cs typeface="Times New Roman" panose="02020603050405020304" pitchFamily="18" charset="0"/>
-              </a:rPr>
-              <a:t/>
-            </a:r>
             <a:br>
               <a:rPr lang="en-US" sz="1800" b="1" dirty="0">
                 <a:latin typeface="Times New Roman" panose="02020603050405020304" pitchFamily="18" charset="0"/>
                 <a:cs typeface="Times New Roman" panose="02020603050405020304" pitchFamily="18" charset="0"/>
               </a:rPr>
             </a:br>
-            <a:r>
-              <a:rPr lang="en-US" sz="1800" b="1" dirty="0">
-                <a:latin typeface="Times New Roman" panose="02020603050405020304" pitchFamily="18" charset="0"/>
-                <a:cs typeface="Times New Roman" panose="02020603050405020304" pitchFamily="18" charset="0"/>
-              </a:rPr>
-              <a:t/>
-            </a:r>
             <a:br>
               <a:rPr lang="en-US" sz="1800" b="1" dirty="0">
                 <a:latin typeface="Times New Roman" panose="02020603050405020304" pitchFamily="18" charset="0"/>
                 <a:cs typeface="Times New Roman" panose="02020603050405020304" pitchFamily="18" charset="0"/>
               </a:rPr>
             </a:br>
-            <a:r>
-              <a:rPr lang="en-US" sz="1800" b="1" dirty="0">
-                <a:latin typeface="Times New Roman" panose="02020603050405020304" pitchFamily="18" charset="0"/>
-                <a:cs typeface="Times New Roman" panose="02020603050405020304" pitchFamily="18" charset="0"/>
-              </a:rPr>
-              <a:t/>
-            </a:r>
             <a:br>
               <a:rPr lang="en-US" sz="1800" b="1" dirty="0">
                 <a:latin typeface="Times New Roman" panose="02020603050405020304" pitchFamily="18" charset="0"/>
                 <a:cs typeface="Times New Roman" panose="02020603050405020304" pitchFamily="18" charset="0"/>
               </a:rPr>
             </a:br>
-            <a:r>
-              <a:rPr lang="en-US" sz="1800" b="1" dirty="0">
-                <a:latin typeface="Times New Roman" panose="02020603050405020304" pitchFamily="18" charset="0"/>
-                <a:cs typeface="Times New Roman" panose="02020603050405020304" pitchFamily="18" charset="0"/>
-              </a:rPr>
-              <a:t/>
-            </a:r>
             <a:br>
               <a:rPr lang="en-US" sz="1800" b="1" dirty="0">
                 <a:latin typeface="Times New Roman" panose="02020603050405020304" pitchFamily="18" charset="0"/>
                 <a:cs typeface="Times New Roman" panose="02020603050405020304" pitchFamily="18" charset="0"/>
               </a:rPr>
             </a:br>
-            <a:r>
-              <a:rPr lang="en-US" sz="1800" b="1" dirty="0">
-                <a:latin typeface="Times New Roman" panose="02020603050405020304" pitchFamily="18" charset="0"/>
-                <a:cs typeface="Times New Roman" panose="02020603050405020304" pitchFamily="18" charset="0"/>
-              </a:rPr>
-              <a:t/>
-            </a:r>
             <a:br>
               <a:rPr lang="en-US" sz="1800" b="1" dirty="0">
                 <a:latin typeface="Times New Roman" panose="02020603050405020304" pitchFamily="18" charset="0"/>
                 <a:cs typeface="Times New Roman" panose="02020603050405020304" pitchFamily="18" charset="0"/>
               </a:rPr>
             </a:br>
-            <a:r>
-              <a:rPr lang="en-US" sz="1800" b="1" dirty="0">
-                <a:latin typeface="Times New Roman" panose="02020603050405020304" pitchFamily="18" charset="0"/>
-                <a:cs typeface="Times New Roman" panose="02020603050405020304" pitchFamily="18" charset="0"/>
-              </a:rPr>
-              <a:t/>
-            </a:r>
             <a:br>
               <a:rPr lang="en-US" sz="1800" b="1" dirty="0">
                 <a:latin typeface="Times New Roman" panose="02020603050405020304" pitchFamily="18" charset="0"/>
@@ -8030,21 +7986,7 @@
                 <a:latin typeface="Times New Roman" panose="02020603050405020304" pitchFamily="18" charset="0"/>
                 <a:cs typeface="Times New Roman" panose="02020603050405020304" pitchFamily="18" charset="0"/>
               </a:rPr>
-              <a:t>A </a:t>
-            </a:r>
-            <a:r>
-              <a:rPr lang="en-US" sz="1800" dirty="0" smtClean="0">
-                <a:latin typeface="Times New Roman" panose="02020603050405020304" pitchFamily="18" charset="0"/>
-                <a:cs typeface="Times New Roman" panose="02020603050405020304" pitchFamily="18" charset="0"/>
-              </a:rPr>
-              <a:t>PRESENTATION </a:t>
-            </a:r>
-            <a:r>
-              <a:rPr lang="en-US" sz="1800" dirty="0">
-                <a:latin typeface="Times New Roman" panose="02020603050405020304" pitchFamily="18" charset="0"/>
-                <a:cs typeface="Times New Roman" panose="02020603050405020304" pitchFamily="18" charset="0"/>
-              </a:rPr>
-              <a:t>ON</a:t>
+              <a:t>A PRESENTATION ON</a:t>
             </a:r>
             <a:br>
               <a:rPr lang="en-US" sz="1800" dirty="0">
@@ -8052,19 +7994,6 @@
                 <a:cs typeface="Times New Roman" panose="02020603050405020304" pitchFamily="18" charset="0"/>
               </a:rPr>
             </a:br>
-            <a:r>
-              <a:rPr lang="en-US" sz="1800" b="1" dirty="0">
-                <a:solidFill>
-                  <a:schemeClr val="tx1">
-                    <a:lumMod val="95000"/>
-                    <a:lumOff val="5000"/>
-                  </a:schemeClr>
-                </a:solidFill>
-                <a:latin typeface="Times New Roman" panose="02020603050405020304" pitchFamily="18" charset="0"/>
-                <a:cs typeface="Times New Roman" panose="02020603050405020304" pitchFamily="18" charset="0"/>
-              </a:rPr>
-              <a:t/>
-            </a:r>
             <a:br>
               <a:rPr lang="en-US" sz="1800" b="1" dirty="0">
                 <a:solidFill>
@@ -8078,7 +8007,7 @@
               </a:rPr>
             </a:br>
             <a:r>
-              <a:rPr lang="en-US" sz="2100" dirty="0" smtClean="0">
+              <a:rPr lang="en-US" sz="2100" dirty="0">
                 <a:solidFill>
                   <a:schemeClr val="tx1">
                     <a:lumMod val="95000"/>
@@ -8099,131 +8028,10 @@
                   </a:schemeClr>
                 </a:solidFill>
               </a:rPr>
-              <a:t>Job Recommendation </a:t>
-            </a:r>
-            <a:r>
-              <a:rPr lang="en-US" sz="1800" b="1" dirty="0" smtClean="0">
-                <a:solidFill>
-                  <a:schemeClr val="tx1">
-                    <a:lumMod val="95000"/>
-                    <a:lumOff val="5000"/>
-                  </a:schemeClr>
-                </a:solidFill>
-              </a:rPr>
-              <a:t>Based </a:t>
+              <a:t>Job Recommendation Based on Job Profile Clustering and Job Seeker Behavior</a:t>
             </a:r>
             <a:r>
               <a:rPr lang="en-US" sz="1800" b="1" dirty="0">
-                <a:solidFill>
-                  <a:schemeClr val="tx1">
-                    <a:lumMod val="95000"/>
-                    <a:lumOff val="5000"/>
-                  </a:schemeClr>
-                </a:solidFill>
-              </a:rPr>
-              <a:t>on </a:t>
-            </a:r>
-            <a:r>
-              <a:rPr lang="en-US" sz="1800" b="1" dirty="0" smtClean="0">
-                <a:solidFill>
-                  <a:schemeClr val="tx1">
-                    <a:lumMod val="95000"/>
-                    <a:lumOff val="5000"/>
-                  </a:schemeClr>
-                </a:solidFill>
-              </a:rPr>
-              <a:t>Job </a:t>
-            </a:r>
-            <a:r>
-              <a:rPr lang="en-US" sz="1800" b="1" dirty="0">
-                <a:solidFill>
-                  <a:schemeClr val="tx1">
-                    <a:lumMod val="95000"/>
-                    <a:lumOff val="5000"/>
-                  </a:schemeClr>
-                </a:solidFill>
-              </a:rPr>
-              <a:t>P</a:t>
-            </a:r>
-            <a:r>
-              <a:rPr lang="en-US" sz="1800" b="1" dirty="0" smtClean="0">
-                <a:solidFill>
-                  <a:schemeClr val="tx1">
-                    <a:lumMod val="95000"/>
-                    <a:lumOff val="5000"/>
-                  </a:schemeClr>
-                </a:solidFill>
-              </a:rPr>
-              <a:t>rofile </a:t>
-            </a:r>
-            <a:r>
-              <a:rPr lang="en-US" sz="1800" b="1" dirty="0">
-                <a:solidFill>
-                  <a:schemeClr val="tx1">
-                    <a:lumMod val="95000"/>
-                    <a:lumOff val="5000"/>
-                  </a:schemeClr>
-                </a:solidFill>
-              </a:rPr>
-              <a:t>C</a:t>
-            </a:r>
-            <a:r>
-              <a:rPr lang="en-US" sz="1800" b="1" dirty="0" smtClean="0">
-                <a:solidFill>
-                  <a:schemeClr val="tx1">
-                    <a:lumMod val="95000"/>
-                    <a:lumOff val="5000"/>
-                  </a:schemeClr>
-                </a:solidFill>
-              </a:rPr>
-              <a:t>lustering </a:t>
-            </a:r>
-            <a:r>
-              <a:rPr lang="en-US" sz="1800" b="1" dirty="0">
-                <a:solidFill>
-                  <a:schemeClr val="tx1">
-                    <a:lumMod val="95000"/>
-                    <a:lumOff val="5000"/>
-                  </a:schemeClr>
-                </a:solidFill>
-              </a:rPr>
-              <a:t>and </a:t>
-            </a:r>
-            <a:r>
-              <a:rPr lang="en-US" sz="1800" b="1" dirty="0" smtClean="0">
-                <a:solidFill>
-                  <a:schemeClr val="tx1">
-                    <a:lumMod val="95000"/>
-                    <a:lumOff val="5000"/>
-                  </a:schemeClr>
-                </a:solidFill>
-              </a:rPr>
-              <a:t>Job </a:t>
-            </a:r>
-            <a:r>
-              <a:rPr lang="en-US" sz="1800" b="1" dirty="0">
-                <a:solidFill>
-                  <a:schemeClr val="tx1">
-                    <a:lumMod val="95000"/>
-                    <a:lumOff val="5000"/>
-                  </a:schemeClr>
-                </a:solidFill>
-              </a:rPr>
-              <a:t>S</a:t>
-            </a:r>
-            <a:r>
-              <a:rPr lang="en-US" sz="1800" b="1" dirty="0" smtClean="0">
-                <a:solidFill>
-                  <a:schemeClr val="tx1">
-                    <a:lumMod val="95000"/>
-                    <a:lumOff val="5000"/>
-                  </a:schemeClr>
-                </a:solidFill>
-              </a:rPr>
-              <a:t>eeker Behavior</a:t>
-            </a:r>
-            <a:r>
-              <a:rPr lang="en-US" sz="1800" b="1" dirty="0" smtClean="0">
                 <a:solidFill>
                   <a:schemeClr val="tx1">
                     <a:lumMod val="95000"/>
@@ -8234,19 +8042,6 @@
                 <a:cs typeface="Times New Roman" panose="02020603050405020304" pitchFamily="18" charset="0"/>
               </a:rPr>
               <a:t>”</a:t>
-            </a:r>
-            <a:r>
-              <a:rPr lang="en-US" sz="1800" dirty="0">
-                <a:solidFill>
-                  <a:schemeClr val="tx1">
-                    <a:lumMod val="95000"/>
-                    <a:lumOff val="5000"/>
-                  </a:schemeClr>
-                </a:solidFill>
-                <a:latin typeface="Times New Roman" panose="02020603050405020304" pitchFamily="18" charset="0"/>
-                <a:cs typeface="Times New Roman" panose="02020603050405020304" pitchFamily="18" charset="0"/>
-              </a:rPr>
-              <a:t/>
             </a:r>
             <a:br>
               <a:rPr lang="en-US" sz="1800" dirty="0">
@@ -8260,13 +8055,6 @@
                 <a:cs typeface="Times New Roman" panose="02020603050405020304" pitchFamily="18" charset="0"/>
               </a:rPr>
             </a:br>
-            <a:r>
-              <a:rPr lang="en-US" sz="1500" b="1" dirty="0">
-                <a:latin typeface="Times New Roman" panose="02020603050405020304" pitchFamily="18" charset="0"/>
-                <a:cs typeface="Times New Roman" panose="02020603050405020304" pitchFamily="18" charset="0"/>
-              </a:rPr>
-              <a:t/>
-            </a:r>
             <a:br>
               <a:rPr lang="en-US" sz="1500" b="1" dirty="0">
                 <a:latin typeface="Times New Roman" panose="02020603050405020304" pitchFamily="18" charset="0"/>
@@ -8335,7 +8123,7 @@
               <a:buChar char="•"/>
             </a:pPr>
             <a:r>
-              <a:rPr lang="en-US" dirty="0" smtClean="0">
+              <a:rPr lang="en-US" dirty="0">
                 <a:latin typeface="Times New Roman" panose="02020603050405020304" pitchFamily="18" charset="0"/>
                 <a:cs typeface="Times New Roman" panose="02020603050405020304" pitchFamily="18" charset="0"/>
               </a:rPr>
@@ -8348,7 +8136,7 @@
               <a:buChar char="•"/>
             </a:pPr>
             <a:r>
-              <a:rPr lang="en-US" dirty="0" smtClean="0">
+              <a:rPr lang="en-US" dirty="0">
                 <a:latin typeface="Times New Roman" panose="02020603050405020304" pitchFamily="18" charset="0"/>
                 <a:cs typeface="Times New Roman" panose="02020603050405020304" pitchFamily="18" charset="0"/>
               </a:rPr>
@@ -8361,7 +8149,7 @@
               <a:buChar char="•"/>
             </a:pPr>
             <a:r>
-              <a:rPr lang="en-US" dirty="0" smtClean="0">
+              <a:rPr lang="en-US" dirty="0">
                 <a:latin typeface="Times New Roman" panose="02020603050405020304" pitchFamily="18" charset="0"/>
                 <a:cs typeface="Times New Roman" panose="02020603050405020304" pitchFamily="18" charset="0"/>
               </a:rPr>
@@ -8374,7 +8162,7 @@
               <a:buChar char="•"/>
             </a:pPr>
             <a:r>
-              <a:rPr lang="en-US" dirty="0" smtClean="0">
+              <a:rPr lang="en-US" dirty="0">
                 <a:latin typeface="Times New Roman" panose="02020603050405020304" pitchFamily="18" charset="0"/>
                 <a:cs typeface="Times New Roman" panose="02020603050405020304" pitchFamily="18" charset="0"/>
               </a:rPr>
@@ -8435,21 +8223,7 @@
                 <a:latin typeface="Times New Roman" panose="02020603050405020304" pitchFamily="18" charset="0"/>
                 <a:cs typeface="Times New Roman" panose="02020603050405020304" pitchFamily="18" charset="0"/>
               </a:rPr>
-              <a:t>DR. V. H. </a:t>
-            </a:r>
-            <a:r>
-              <a:rPr lang="en-US" dirty="0">
-                <a:latin typeface="Times New Roman" panose="02020603050405020304" pitchFamily="18" charset="0"/>
-                <a:cs typeface="Times New Roman" panose="02020603050405020304" pitchFamily="18" charset="0"/>
-              </a:rPr>
-              <a:t>DESHMUKH</a:t>
-            </a:r>
-            <a:r>
-              <a:rPr lang="en-US" b="1" dirty="0">
-                <a:latin typeface="Times New Roman" panose="02020603050405020304" pitchFamily="18" charset="0"/>
-                <a:cs typeface="Times New Roman" panose="02020603050405020304" pitchFamily="18" charset="0"/>
-              </a:rPr>
-              <a:t/>
+              <a:t>DR. V. H. DESHMUKH</a:t>
             </a:r>
             <a:br>
               <a:rPr lang="en-US" b="1" dirty="0">
@@ -8457,13 +8231,6 @@
                 <a:cs typeface="Times New Roman" panose="02020603050405020304" pitchFamily="18" charset="0"/>
               </a:rPr>
             </a:br>
-            <a:r>
-              <a:rPr lang="en-US" b="1" dirty="0">
-                <a:latin typeface="Times New Roman" panose="02020603050405020304" pitchFamily="18" charset="0"/>
-                <a:cs typeface="Times New Roman" panose="02020603050405020304" pitchFamily="18" charset="0"/>
-              </a:rPr>
-              <a:t/>
-            </a:r>
             <a:br>
               <a:rPr lang="en-US" b="1" dirty="0">
                 <a:latin typeface="Times New Roman" panose="02020603050405020304" pitchFamily="18" charset="0"/>
@@ -8504,30 +8271,13 @@
                 <a:latin typeface="Times New Roman" panose="02020603050405020304" pitchFamily="18" charset="0"/>
                 <a:cs typeface="Times New Roman" panose="02020603050405020304" pitchFamily="18" charset="0"/>
               </a:rPr>
-              <a:t>PRESENTED </a:t>
-            </a:r>
-            <a:r>
-              <a:rPr lang="en-US" dirty="0" smtClean="0">
-                <a:solidFill>
-                  <a:schemeClr val="accent1"/>
-                </a:solidFill>
-                <a:latin typeface="Times New Roman" panose="02020603050405020304" pitchFamily="18" charset="0"/>
-                <a:cs typeface="Times New Roman" panose="02020603050405020304" pitchFamily="18" charset="0"/>
-              </a:rPr>
-              <a:t>BY</a:t>
-            </a:r>
-            <a:endParaRPr lang="en-US" dirty="0">
-              <a:solidFill>
-                <a:schemeClr val="accent1"/>
-              </a:solidFill>
-              <a:latin typeface="Times New Roman" panose="02020603050405020304" pitchFamily="18" charset="0"/>
-              <a:cs typeface="Times New Roman" panose="02020603050405020304" pitchFamily="18" charset="0"/>
-            </a:endParaRPr>
+              <a:t>PRESENTED BY</a:t>
+            </a:r>
           </a:p>
           <a:p>
             <a:pPr algn="ctr"/>
             <a:r>
-              <a:rPr lang="en-US" dirty="0" smtClean="0">
+              <a:rPr lang="en-US" dirty="0">
                 <a:latin typeface="Times New Roman" panose="02020603050405020304" pitchFamily="18" charset="0"/>
                 <a:cs typeface="Times New Roman" panose="02020603050405020304" pitchFamily="18" charset="0"/>
               </a:rPr>
@@ -8559,7 +8309,7 @@
           <a:lstStyle/>
           <a:p>
             <a:r>
-              <a:rPr lang="en-US" dirty="0" smtClean="0"/>
+              <a:rPr lang="en-US" dirty="0"/>
               <a:t>2021-2022</a:t>
             </a:r>
             <a:endParaRPr lang="en-IN" dirty="0"/>
@@ -8576,13 +8326,6 @@
   <p:clrMapOvr>
     <a:masterClrMapping/>
   </p:clrMapOvr>
-  <p:timing>
-    <p:tnLst>
-      <p:par>
-        <p:cTn id="1" dur="indefinite" restart="never" nodeType="tmRoot"/>
-      </p:par>
-    </p:tnLst>
-  </p:timing>
 </p:sld>
 </file>
 
@@ -8635,12 +8378,8 @@
               </a:rPr>
               <a:t>Communication Pen</a:t>
             </a:r>
-            <a:r>
-              <a:rPr lang="pl-PL" dirty="0" smtClean="0"/>
-              <a:t/>
-            </a:r>
             <a:br>
-              <a:rPr lang="pl-PL" dirty="0" smtClean="0"/>
+              <a:rPr lang="pl-PL" dirty="0"/>
             </a:br>
             <a:endParaRPr lang="en-US" dirty="0"/>
           </a:p>
@@ -8751,20 +8490,13 @@
               <a:buFont typeface="Wingdings 3" pitchFamily="18" charset="2"/>
               <a:buNone/>
             </a:pPr>
-            <a:r>
-              <a:rPr lang="en-US" dirty="0" smtClean="0">
-                <a:latin typeface="Times New Roman" pitchFamily="16" charset="0"/>
-                <a:cs typeface="Times New Roman" pitchFamily="16" charset="0"/>
-              </a:rPr>
-              <a:t/>
-            </a:r>
             <a:br>
-              <a:rPr lang="en-US" dirty="0" smtClean="0">
+              <a:rPr lang="en-US" dirty="0">
                 <a:latin typeface="Times New Roman" pitchFamily="16" charset="0"/>
                 <a:cs typeface="Times New Roman" pitchFamily="16" charset="0"/>
               </a:rPr>
             </a:br>
-            <a:endParaRPr lang="en-US" dirty="0" smtClean="0">
+            <a:endParaRPr lang="en-US" dirty="0">
               <a:latin typeface="Times New Roman" pitchFamily="16" charset="0"/>
               <a:cs typeface="Times New Roman" pitchFamily="16" charset="0"/>
             </a:endParaRPr>
@@ -8805,13 +8537,6 @@
   <p:clrMapOvr>
     <a:masterClrMapping/>
   </p:clrMapOvr>
-  <p:timing>
-    <p:tnLst>
-      <p:par>
-        <p:cTn id="1" dur="indefinite" restart="never" nodeType="tmRoot"/>
-      </p:par>
-    </p:tnLst>
-  </p:timing>
 </p:sld>
 </file>
 
@@ -8966,7 +8691,7 @@
               <a:buFont typeface="Wingdings 3" pitchFamily="18" charset="2"/>
               <a:buNone/>
             </a:pPr>
-            <a:endParaRPr lang="en-US" dirty="0" smtClean="0">
+            <a:endParaRPr lang="en-US" dirty="0">
               <a:latin typeface="Times New Roman" pitchFamily="16" charset="0"/>
               <a:cs typeface="Times New Roman" pitchFamily="16" charset="0"/>
             </a:endParaRPr>
@@ -9006,13 +8731,6 @@
   <p:clrMapOvr>
     <a:masterClrMapping/>
   </p:clrMapOvr>
-  <p:timing>
-    <p:tnLst>
-      <p:par>
-        <p:cTn id="1" dur="indefinite" restart="never" nodeType="tmRoot"/>
-      </p:par>
-    </p:tnLst>
-  </p:timing>
 </p:sld>
 </file>
 
@@ -9186,13 +8904,6 @@
   <p:clrMapOvr>
     <a:masterClrMapping/>
   </p:clrMapOvr>
-  <p:timing>
-    <p:tnLst>
-      <p:par>
-        <p:cTn id="1" dur="indefinite" restart="never" nodeType="tmRoot"/>
-      </p:par>
-    </p:tnLst>
-  </p:timing>
 </p:sld>
 </file>
 
@@ -9340,13 +9051,6 @@
   <p:clrMapOvr>
     <a:masterClrMapping/>
   </p:clrMapOvr>
-  <p:timing>
-    <p:tnLst>
-      <p:par>
-        <p:cTn id="1" dur="indefinite" restart="never" nodeType="tmRoot"/>
-      </p:par>
-    </p:tnLst>
-  </p:timing>
 </p:sld>
 </file>
 
@@ -9478,13 +9182,6 @@
   <p:clrMapOvr>
     <a:masterClrMapping/>
   </p:clrMapOvr>
-  <p:timing>
-    <p:tnLst>
-      <p:par>
-        <p:cTn id="1" dur="indefinite" restart="never" nodeType="tmRoot"/>
-      </p:par>
-    </p:tnLst>
-  </p:timing>
 </p:sld>
 </file>
 
@@ -9607,13 +9304,6 @@
   <p:clrMapOvr>
     <a:masterClrMapping/>
   </p:clrMapOvr>
-  <p:timing>
-    <p:tnLst>
-      <p:par>
-        <p:cTn id="1" dur="indefinite" restart="never" nodeType="tmRoot"/>
-      </p:par>
-    </p:tnLst>
-  </p:timing>
 </p:sld>
 </file>
 
@@ -9709,13 +9399,6 @@
   <p:clrMapOvr>
     <a:masterClrMapping/>
   </p:clrMapOvr>
-  <p:timing>
-    <p:tnLst>
-      <p:par>
-        <p:cTn id="1" dur="indefinite" restart="never" nodeType="tmRoot"/>
-      </p:par>
-    </p:tnLst>
-  </p:timing>
 </p:sld>
 </file>
 
@@ -9856,7 +9539,7 @@
               <a:buFont typeface="Wingdings" charset="2"/>
               <a:buChar char="Ø"/>
             </a:pPr>
-            <a:endParaRPr lang="en-US" dirty="0" smtClean="0">
+            <a:endParaRPr lang="en-US" dirty="0">
               <a:latin typeface="Times New Roman" pitchFamily="16" charset="0"/>
               <a:cs typeface="Times New Roman" pitchFamily="16" charset="0"/>
             </a:endParaRPr>
@@ -9873,13 +9556,6 @@
   <p:clrMapOvr>
     <a:masterClrMapping/>
   </p:clrMapOvr>
-  <p:timing>
-    <p:tnLst>
-      <p:par>
-        <p:cTn id="1" dur="indefinite" restart="never" nodeType="tmRoot"/>
-      </p:par>
-    </p:tnLst>
-  </p:timing>
 </p:sld>
 </file>
 
@@ -10035,13 +9711,6 @@
   <p:clrMapOvr>
     <a:masterClrMapping/>
   </p:clrMapOvr>
-  <p:timing>
-    <p:tnLst>
-      <p:par>
-        <p:cTn id="1" dur="indefinite" restart="never" nodeType="tmRoot"/>
-      </p:par>
-    </p:tnLst>
-  </p:timing>
 </p:sld>
 </file>
 
@@ -10135,20 +9804,7 @@
                 <a:latin typeface="Times New Roman" pitchFamily="18" charset="0"/>
                 <a:cs typeface="Times New Roman" pitchFamily="18" charset="0"/>
               </a:rPr>
-              <a:t>Many researches has been made but there is no clear result so far</a:t>
-            </a:r>
-            <a:r>
-              <a:rPr lang="en-US" dirty="0">
-                <a:solidFill>
-                  <a:schemeClr val="tx1">
-                    <a:lumMod val="95000"/>
-                    <a:lumOff val="5000"/>
-                  </a:schemeClr>
-                </a:solidFill>
-                <a:latin typeface="Times New Roman" pitchFamily="18" charset="0"/>
-                <a:cs typeface="Times New Roman" pitchFamily="18" charset="0"/>
-              </a:rPr>
-              <a:t>.</a:t>
+              <a:t>Many researches has been made but there is no clear result so far.</a:t>
             </a:r>
           </a:p>
           <a:p>
@@ -10231,13 +9887,6 @@
   <p:clrMapOvr>
     <a:masterClrMapping/>
   </p:clrMapOvr>
-  <p:timing>
-    <p:tnLst>
-      <p:par>
-        <p:cTn id="1" dur="indefinite" restart="never" nodeType="tmRoot"/>
-      </p:par>
-    </p:tnLst>
-  </p:timing>
 </p:sld>
 </file>
 
@@ -10290,10 +9939,6 @@
               </a:rPr>
               <a:t>Table of contents</a:t>
             </a:r>
-            <a:endParaRPr lang="en-US" sz="4800" dirty="0">
-              <a:latin typeface="Times New Roman" pitchFamily="18" charset="0"/>
-              <a:cs typeface="Times New Roman" pitchFamily="18" charset="0"/>
-            </a:endParaRPr>
           </a:p>
         </p:txBody>
       </p:sp>
@@ -10325,16 +9970,12 @@
               <a:defRPr/>
             </a:pPr>
             <a:r>
-              <a:rPr lang="en-US" sz="1800" dirty="0" smtClean="0">
+              <a:rPr lang="en-US" sz="1800" dirty="0">
                 <a:latin typeface="Times New Roman" pitchFamily="18" charset="0"/>
                 <a:cs typeface="Times New Roman" pitchFamily="18" charset="0"/>
               </a:rPr>
               <a:t>Introduction</a:t>
             </a:r>
-            <a:endParaRPr lang="en-US" sz="1800" dirty="0">
-              <a:latin typeface="Times New Roman" pitchFamily="18" charset="0"/>
-              <a:cs typeface="Times New Roman" pitchFamily="18" charset="0"/>
-            </a:endParaRPr>
           </a:p>
           <a:p>
             <a:pPr marL="274320" indent="-274320">
@@ -10343,16 +9984,12 @@
               <a:defRPr/>
             </a:pPr>
             <a:r>
-              <a:rPr lang="en-US" sz="1800" dirty="0" smtClean="0">
+              <a:rPr lang="en-US" sz="1800" dirty="0">
                 <a:latin typeface="Times New Roman" pitchFamily="18" charset="0"/>
                 <a:cs typeface="Times New Roman" pitchFamily="18" charset="0"/>
               </a:rPr>
               <a:t>Literature Review</a:t>
             </a:r>
-            <a:endParaRPr lang="en-US" sz="1800" dirty="0">
-              <a:latin typeface="Times New Roman" pitchFamily="18" charset="0"/>
-              <a:cs typeface="Times New Roman" pitchFamily="18" charset="0"/>
-            </a:endParaRPr>
           </a:p>
           <a:p>
             <a:pPr marL="274320" indent="-274320">
@@ -10361,16 +9998,12 @@
               <a:defRPr/>
             </a:pPr>
             <a:r>
-              <a:rPr lang="en-US" sz="1800" dirty="0" smtClean="0">
+              <a:rPr lang="en-US" sz="1800" dirty="0">
                 <a:latin typeface="Times New Roman" pitchFamily="18" charset="0"/>
                 <a:cs typeface="Times New Roman" pitchFamily="18" charset="0"/>
               </a:rPr>
               <a:t>Problem Statement </a:t>
             </a:r>
-            <a:endParaRPr lang="en-US" sz="1800" dirty="0">
-              <a:latin typeface="Times New Roman" pitchFamily="18" charset="0"/>
-              <a:cs typeface="Times New Roman" pitchFamily="18" charset="0"/>
-            </a:endParaRPr>
           </a:p>
           <a:p>
             <a:pPr marL="274320" indent="-274320">
@@ -10379,16 +10012,12 @@
               <a:defRPr/>
             </a:pPr>
             <a:r>
-              <a:rPr lang="en-US" sz="1800" dirty="0" smtClean="0">
+              <a:rPr lang="en-US" sz="1800" dirty="0">
                 <a:latin typeface="Times New Roman" pitchFamily="18" charset="0"/>
                 <a:cs typeface="Times New Roman" pitchFamily="18" charset="0"/>
               </a:rPr>
               <a:t>Problem Objective</a:t>
             </a:r>
-            <a:endParaRPr lang="en-US" sz="1800" dirty="0">
-              <a:latin typeface="Times New Roman" pitchFamily="18" charset="0"/>
-              <a:cs typeface="Times New Roman" pitchFamily="18" charset="0"/>
-            </a:endParaRPr>
           </a:p>
           <a:p>
             <a:pPr marL="274320" indent="-274320">
@@ -10397,16 +10026,12 @@
               <a:defRPr/>
             </a:pPr>
             <a:r>
-              <a:rPr lang="en-US" sz="1800" dirty="0" smtClean="0">
+              <a:rPr lang="en-US" sz="1800" dirty="0">
                 <a:latin typeface="Times New Roman" pitchFamily="18" charset="0"/>
                 <a:cs typeface="Times New Roman" pitchFamily="18" charset="0"/>
               </a:rPr>
               <a:t>Objectives</a:t>
             </a:r>
-            <a:endParaRPr lang="en-US" sz="1800" dirty="0">
-              <a:latin typeface="Times New Roman" pitchFamily="18" charset="0"/>
-              <a:cs typeface="Times New Roman" pitchFamily="18" charset="0"/>
-            </a:endParaRPr>
           </a:p>
           <a:p>
             <a:pPr marL="274320" indent="-274320">
@@ -10415,16 +10040,12 @@
               <a:defRPr/>
             </a:pPr>
             <a:r>
-              <a:rPr lang="en-US" sz="1800" dirty="0" smtClean="0">
+              <a:rPr lang="en-US" sz="1800" dirty="0">
                 <a:latin typeface="Times New Roman" pitchFamily="18" charset="0"/>
                 <a:cs typeface="Times New Roman" pitchFamily="18" charset="0"/>
               </a:rPr>
               <a:t>Software Requirements</a:t>
             </a:r>
-            <a:endParaRPr lang="en-US" sz="1800" dirty="0">
-              <a:latin typeface="Times New Roman" pitchFamily="18" charset="0"/>
-              <a:cs typeface="Times New Roman" pitchFamily="18" charset="0"/>
-            </a:endParaRPr>
           </a:p>
           <a:p>
             <a:pPr marL="274320" indent="-274320">
@@ -10433,16 +10054,12 @@
               <a:defRPr/>
             </a:pPr>
             <a:r>
-              <a:rPr lang="en-US" sz="1800" dirty="0" smtClean="0">
+              <a:rPr lang="en-US" sz="1800" dirty="0">
                 <a:latin typeface="Times New Roman" pitchFamily="18" charset="0"/>
                 <a:cs typeface="Times New Roman" pitchFamily="18" charset="0"/>
               </a:rPr>
               <a:t>Dataflow Diagram</a:t>
             </a:r>
-            <a:endParaRPr lang="en-US" sz="1800" dirty="0">
-              <a:latin typeface="Times New Roman" pitchFamily="18" charset="0"/>
-              <a:cs typeface="Times New Roman" pitchFamily="18" charset="0"/>
-            </a:endParaRPr>
           </a:p>
           <a:p>
             <a:pPr marL="274320" indent="-274320">
@@ -10451,16 +10068,12 @@
               <a:defRPr/>
             </a:pPr>
             <a:r>
-              <a:rPr lang="en-US" sz="1800" dirty="0" smtClean="0">
+              <a:rPr lang="en-US" sz="1800" dirty="0">
                 <a:latin typeface="Times New Roman" pitchFamily="18" charset="0"/>
                 <a:cs typeface="Times New Roman" pitchFamily="18" charset="0"/>
               </a:rPr>
               <a:t>Implementation</a:t>
             </a:r>
-            <a:endParaRPr lang="en-US" sz="1800" dirty="0">
-              <a:latin typeface="Times New Roman" pitchFamily="18" charset="0"/>
-              <a:cs typeface="Times New Roman" pitchFamily="18" charset="0"/>
-            </a:endParaRPr>
           </a:p>
           <a:p>
             <a:pPr marL="274320" indent="-274320">
@@ -10469,16 +10082,12 @@
               <a:defRPr/>
             </a:pPr>
             <a:r>
-              <a:rPr lang="en-US" sz="1800" dirty="0" smtClean="0">
+              <a:rPr lang="en-US" sz="1800" dirty="0">
                 <a:latin typeface="Times New Roman" pitchFamily="18" charset="0"/>
                 <a:cs typeface="Times New Roman" pitchFamily="18" charset="0"/>
               </a:rPr>
               <a:t>Results </a:t>
             </a:r>
-            <a:endParaRPr lang="en-US" sz="1800" dirty="0">
-              <a:latin typeface="Times New Roman" pitchFamily="18" charset="0"/>
-              <a:cs typeface="Times New Roman" pitchFamily="18" charset="0"/>
-            </a:endParaRPr>
           </a:p>
           <a:p>
             <a:pPr marL="274320" indent="-274320">
@@ -10501,7 +10110,7 @@
               <a:defRPr/>
             </a:pPr>
             <a:r>
-              <a:rPr lang="en-US" sz="1800" dirty="0" smtClean="0">
+              <a:rPr lang="en-US" sz="1800" dirty="0">
                 <a:latin typeface="Times New Roman" pitchFamily="18" charset="0"/>
                 <a:cs typeface="Times New Roman" pitchFamily="18" charset="0"/>
               </a:rPr>
@@ -10515,16 +10124,12 @@
               <a:defRPr/>
             </a:pPr>
             <a:r>
-              <a:rPr lang="en-US" sz="1800" dirty="0" smtClean="0">
+              <a:rPr lang="en-US" sz="1800" dirty="0">
                 <a:latin typeface="Times New Roman" pitchFamily="18" charset="0"/>
                 <a:cs typeface="Times New Roman" pitchFamily="18" charset="0"/>
               </a:rPr>
               <a:t>References</a:t>
             </a:r>
-            <a:endParaRPr lang="en-US" sz="1800" dirty="0">
-              <a:latin typeface="Times New Roman" pitchFamily="18" charset="0"/>
-              <a:cs typeface="Times New Roman" pitchFamily="18" charset="0"/>
-            </a:endParaRPr>
           </a:p>
         </p:txBody>
       </p:sp>
@@ -10570,13 +10175,6 @@
   <p:clrMapOvr>
     <a:masterClrMapping/>
   </p:clrMapOvr>
-  <p:timing>
-    <p:tnLst>
-      <p:par>
-        <p:cTn id="1" dur="indefinite" restart="never" nodeType="tmRoot"/>
-      </p:par>
-    </p:tnLst>
-  </p:timing>
 </p:sld>
 </file>
 
@@ -10773,13 +10371,6 @@
   <p:clrMapOvr>
     <a:masterClrMapping/>
   </p:clrMapOvr>
-  <p:timing>
-    <p:tnLst>
-      <p:par>
-        <p:cTn id="1" dur="indefinite" restart="never" nodeType="tmRoot"/>
-      </p:par>
-    </p:tnLst>
-  </p:timing>
 </p:sld>
 </file>
 
@@ -10817,7 +10408,7 @@
           <a:p>
             <a:pPr algn="ctr" eaLnBrk="1" hangingPunct="1"/>
             <a:r>
-              <a:rPr lang="en-US" smtClean="0">
+              <a:rPr lang="en-US">
                 <a:latin typeface="Times New Roman" pitchFamily="16" charset="0"/>
                 <a:cs typeface="Times New Roman" pitchFamily="16" charset="0"/>
               </a:rPr>
@@ -11192,13 +10783,6 @@
   <p:clrMapOvr>
     <a:masterClrMapping/>
   </p:clrMapOvr>
-  <p:timing>
-    <p:tnLst>
-      <p:par>
-        <p:cTn id="1" dur="indefinite" restart="never" nodeType="tmRoot"/>
-      </p:par>
-    </p:tnLst>
-  </p:timing>
 </p:sld>
 </file>
 
@@ -11291,50 +10875,6 @@
               </a:rPr>
               <a:t>Thank you!!!</a:t>
             </a:r>
-            <a:endParaRPr lang="en-US" sz="8800" b="1" cap="all" dirty="0">
-              <a:ln w="9000" cmpd="sng">
-                <a:solidFill>
-                  <a:schemeClr val="accent4">
-                    <a:shade val="50000"/>
-                    <a:satMod val="120000"/>
-                  </a:schemeClr>
-                </a:solidFill>
-                <a:prstDash val="solid"/>
-              </a:ln>
-              <a:gradFill>
-                <a:gsLst>
-                  <a:gs pos="0">
-                    <a:schemeClr val="accent4">
-                      <a:shade val="20000"/>
-                      <a:satMod val="245000"/>
-                    </a:schemeClr>
-                  </a:gs>
-                  <a:gs pos="43000">
-                    <a:schemeClr val="accent4">
-                      <a:satMod val="255000"/>
-                    </a:schemeClr>
-                  </a:gs>
-                  <a:gs pos="48000">
-                    <a:schemeClr val="accent4">
-                      <a:shade val="85000"/>
-                      <a:satMod val="255000"/>
-                    </a:schemeClr>
-                  </a:gs>
-                  <a:gs pos="100000">
-                    <a:schemeClr val="accent4">
-                      <a:shade val="20000"/>
-                      <a:satMod val="245000"/>
-                    </a:schemeClr>
-                  </a:gs>
-                </a:gsLst>
-                <a:lin ang="5400000"/>
-              </a:gradFill>
-              <a:effectLst>
-                <a:reflection blurRad="12700" stA="28000" endPos="45000" dist="1000" dir="5400000" sy="-100000" algn="bl" rotWithShape="0"/>
-              </a:effectLst>
-              <a:latin typeface="Times New Roman" pitchFamily="18" charset="0"/>
-              <a:cs typeface="Times New Roman" pitchFamily="18" charset="0"/>
-            </a:endParaRPr>
           </a:p>
         </p:txBody>
       </p:sp>
@@ -11348,13 +10888,6 @@
   <p:clrMapOvr>
     <a:masterClrMapping/>
   </p:clrMapOvr>
-  <p:timing>
-    <p:tnLst>
-      <p:par>
-        <p:cTn id="1" dur="indefinite" restart="never" nodeType="tmRoot"/>
-      </p:par>
-    </p:tnLst>
-  </p:timing>
 </p:sld>
 </file>
 
@@ -11397,16 +10930,12 @@
           <a:p>
             <a:pPr algn="ctr" eaLnBrk="1" hangingPunct="1"/>
             <a:r>
-              <a:rPr lang="en-US" sz="4800" dirty="0" smtClean="0">
+              <a:rPr lang="en-US" sz="4800" dirty="0">
                 <a:latin typeface="Times New Roman" pitchFamily="16" charset="0"/>
                 <a:cs typeface="Times New Roman" pitchFamily="16" charset="0"/>
               </a:rPr>
               <a:t>Introduction</a:t>
             </a:r>
-            <a:endParaRPr lang="en-US" sz="4800" dirty="0">
-              <a:latin typeface="Times New Roman" pitchFamily="16" charset="0"/>
-              <a:cs typeface="Times New Roman" pitchFamily="16" charset="0"/>
-            </a:endParaRPr>
           </a:p>
         </p:txBody>
       </p:sp>
@@ -11506,14 +11035,7 @@
                 <a:latin typeface="Times New Roman" pitchFamily="18" charset="0"/>
                 <a:cs typeface="Times New Roman" pitchFamily="18" charset="0"/>
               </a:rPr>
-              <a:t>	</a:t>
-            </a:r>
-            <a:r>
-              <a:rPr lang="en-US" sz="2600" dirty="0">
-                <a:latin typeface="Times New Roman" pitchFamily="18" charset="0"/>
-                <a:cs typeface="Times New Roman" pitchFamily="18" charset="0"/>
-              </a:rPr>
-              <a:t> Geneva, Switzerland.</a:t>
+              <a:t>	 Geneva, Switzerland.</a:t>
             </a:r>
           </a:p>
           <a:p>
@@ -11521,13 +11043,6 @@
               <a:buNone/>
               <a:defRPr/>
             </a:pPr>
-            <a:r>
-              <a:rPr lang="en-US" sz="1400" dirty="0">
-                <a:latin typeface="Times New Roman" pitchFamily="18" charset="0"/>
-                <a:cs typeface="Times New Roman" pitchFamily="18" charset="0"/>
-              </a:rPr>
-              <a:t/>
-            </a:r>
             <a:br>
               <a:rPr lang="en-US" sz="1400" dirty="0">
                 <a:latin typeface="Times New Roman" pitchFamily="18" charset="0"/>
@@ -11559,13 +11074,6 @@
   <p:clrMapOvr>
     <a:masterClrMapping/>
   </p:clrMapOvr>
-  <p:timing>
-    <p:tnLst>
-      <p:par>
-        <p:cTn id="1" dur="indefinite" restart="never" nodeType="tmRoot"/>
-      </p:par>
-    </p:tnLst>
-  </p:timing>
 </p:sld>
 </file>
 
@@ -11610,16 +11118,12 @@
           <a:p>
             <a:pPr algn="ctr" eaLnBrk="1" hangingPunct="1"/>
             <a:r>
-              <a:rPr lang="en-US" sz="4800" dirty="0" smtClean="0">
+              <a:rPr lang="en-US" sz="4800" dirty="0">
                 <a:latin typeface="Times New Roman" pitchFamily="16" charset="0"/>
                 <a:cs typeface="Times New Roman" pitchFamily="16" charset="0"/>
               </a:rPr>
               <a:t>Literature Review</a:t>
             </a:r>
-            <a:endParaRPr lang="en-US" sz="4800" dirty="0">
-              <a:latin typeface="Times New Roman" pitchFamily="16" charset="0"/>
-              <a:cs typeface="Times New Roman" pitchFamily="16" charset="0"/>
-            </a:endParaRPr>
           </a:p>
         </p:txBody>
       </p:sp>
@@ -11711,13 +11215,6 @@
               <a:buNone/>
               <a:defRPr/>
             </a:pPr>
-            <a:r>
-              <a:rPr lang="en-US" sz="4200" dirty="0">
-                <a:latin typeface="Times New Roman" pitchFamily="18" charset="0"/>
-                <a:cs typeface="Times New Roman" pitchFamily="18" charset="0"/>
-              </a:rPr>
-              <a:t/>
-            </a:r>
             <a:br>
               <a:rPr lang="en-US" sz="4200" dirty="0">
                 <a:latin typeface="Times New Roman" pitchFamily="18" charset="0"/>
@@ -11735,7 +11232,7 @@
               <a:buChar char=""/>
               <a:defRPr/>
             </a:pPr>
-            <a:endParaRPr lang="en-US" dirty="0" smtClean="0"/>
+            <a:endParaRPr lang="en-US" dirty="0"/>
           </a:p>
         </p:txBody>
       </p:sp>
@@ -11849,13 +11346,6 @@
   <p:clrMapOvr>
     <a:masterClrMapping/>
   </p:clrMapOvr>
-  <p:timing>
-    <p:tnLst>
-      <p:par>
-        <p:cTn id="1" dur="indefinite" restart="never" nodeType="tmRoot"/>
-      </p:par>
-    </p:tnLst>
-  </p:timing>
 </p:sld>
 </file>
 
@@ -11888,89 +11378,80 @@
         </p:nvSpPr>
         <p:spPr>
           <a:xfrm>
-            <a:off x="0" y="457200"/>
-            <a:ext cx="5562600" cy="2667000"/>
+            <a:off x="0" y="1843789"/>
+            <a:ext cx="12192000" cy="5014209"/>
           </a:xfrm>
         </p:spPr>
         <p:txBody>
           <a:bodyPr>
-            <a:normAutofit fontScale="92500" lnSpcReduction="10000"/>
+            <a:normAutofit/>
           </a:bodyPr>
           <a:lstStyle/>
           <a:p>
-            <a:pPr eaLnBrk="1" hangingPunct="1"/>
-            <a:endParaRPr lang="en-US" sz="1600" dirty="0">
+            <a:pPr eaLnBrk="1" hangingPunct="1">
+              <a:buFont typeface="Wingdings" panose="05000000000000000000" pitchFamily="2" charset="2"/>
+              <a:buChar char="Ø"/>
+            </a:pPr>
+            <a:r>
+              <a:rPr lang="en-US" sz="3200" dirty="0"/>
+              <a:t>In existing job recommendation sites, job offers which are matching with user’s profile used to recommend user. </a:t>
+            </a:r>
+          </a:p>
+          <a:p>
+            <a:pPr eaLnBrk="1" hangingPunct="1">
+              <a:buFont typeface="Wingdings" panose="05000000000000000000" pitchFamily="2" charset="2"/>
+              <a:buChar char="Ø"/>
+            </a:pPr>
+            <a:r>
+              <a:rPr lang="en-US" sz="3200" dirty="0"/>
+              <a:t>To improve this recommendation, we proposed machine learning algorithms which will find user’s preferences and recommend job offers as per the preferences, profile and requirements of the recruiters. </a:t>
+            </a:r>
+            <a:endParaRPr lang="en-US" sz="3200" dirty="0">
               <a:latin typeface="Times New Roman" panose="02020603050405020304" pitchFamily="18" charset="0"/>
               <a:cs typeface="Times New Roman" panose="02020603050405020304" pitchFamily="18" charset="0"/>
             </a:endParaRPr>
           </a:p>
-          <a:p>
-            <a:pPr eaLnBrk="1" hangingPunct="1"/>
-            <a:r>
-              <a:rPr lang="en-US" sz="2600" dirty="0">
-                <a:latin typeface="Times New Roman" panose="02020603050405020304" pitchFamily="18" charset="0"/>
-                <a:cs typeface="Times New Roman" panose="02020603050405020304" pitchFamily="18" charset="0"/>
-              </a:rPr>
-              <a:t>This 'pen sort of instrument' produces both the monitor  as well as the keyboard on any flat surfaces from where you can carry out functions you would normally do on your desktop computer.</a:t>
-            </a:r>
-          </a:p>
-          <a:p>
-            <a:pPr eaLnBrk="1" hangingPunct="1">
-              <a:buFont typeface="Wingdings 3" pitchFamily="18" charset="2"/>
-              <a:buNone/>
-            </a:pPr>
-            <a:r>
-              <a:rPr lang="en-US" sz="1600" dirty="0">
-                <a:latin typeface="Times New Roman" panose="02020603050405020304" pitchFamily="18" charset="0"/>
-                <a:cs typeface="Times New Roman" panose="02020603050405020304" pitchFamily="18" charset="0"/>
-              </a:rPr>
-              <a:t/>
-            </a:r>
-            <a:br>
-              <a:rPr lang="en-US" sz="1600" dirty="0">
-                <a:latin typeface="Times New Roman" panose="02020603050405020304" pitchFamily="18" charset="0"/>
-                <a:cs typeface="Times New Roman" panose="02020603050405020304" pitchFamily="18" charset="0"/>
-              </a:rPr>
-            </a:br>
-            <a:endParaRPr lang="en-US" sz="1600" dirty="0">
-              <a:latin typeface="Times New Roman" panose="02020603050405020304" pitchFamily="18" charset="0"/>
-              <a:cs typeface="Times New Roman" panose="02020603050405020304" pitchFamily="18" charset="0"/>
-            </a:endParaRPr>
-          </a:p>
-        </p:txBody>
-      </p:sp>
-      <p:pic>
-        <p:nvPicPr>
-          <p:cNvPr id="13316" name="Picture 4" descr="http://www.mobilemag.com/wp-content/uploads/2009/05/image_24642_largeimagefile.jpg"/>
-          <p:cNvPicPr>
-            <a:picLocks noChangeAspect="1" noChangeArrowheads="1"/>
-          </p:cNvPicPr>
+        </p:txBody>
+      </p:sp>
+      <p:sp>
+        <p:nvSpPr>
+          <p:cNvPr id="2" name="TextBox 1">
+            <a:extLst>
+              <a:ext uri="{FF2B5EF4-FFF2-40B4-BE49-F238E27FC236}">
+                <a16:creationId xmlns:a16="http://schemas.microsoft.com/office/drawing/2014/main" id="{A63EDE0D-324B-4DAA-C6E1-04992ED8BD5A}"/>
+              </a:ext>
+            </a:extLst>
+          </p:cNvPr>
+          <p:cNvSpPr txBox="1"/>
           <p:nvPr/>
-        </p:nvPicPr>
-        <p:blipFill>
-          <a:blip r:embed="rId3" cstate="print"/>
-          <a:srcRect/>
-          <a:stretch>
-            <a:fillRect/>
-          </a:stretch>
-        </p:blipFill>
-        <p:spPr bwMode="auto">
+        </p:nvSpPr>
+        <p:spPr>
           <a:xfrm>
-            <a:off x="3048000" y="2590800"/>
-            <a:ext cx="5753100" cy="3657600"/>
+            <a:off x="299803" y="209862"/>
+            <a:ext cx="11752289" cy="1046440"/>
           </a:xfrm>
           <a:prstGeom prst="rect">
             <a:avLst/>
           </a:prstGeom>
           <a:noFill/>
-          <a:ln w="9525">
-            <a:noFill/>
-            <a:miter lim="800000"/>
-            <a:headEnd/>
-            <a:tailEnd/>
-          </a:ln>
-        </p:spPr>
-      </p:pic>
+        </p:spPr>
+        <p:txBody>
+          <a:bodyPr wrap="square" rtlCol="0">
+            <a:spAutoFit/>
+          </a:bodyPr>
+          <a:lstStyle/>
+          <a:p>
+            <a:pPr algn="ctr"/>
+            <a:r>
+              <a:rPr lang="en-US" sz="4400" dirty="0"/>
+              <a:t>1.1 Problem Definition </a:t>
+            </a:r>
+          </a:p>
+          <a:p>
+            <a:endParaRPr lang="en-US" dirty="0"/>
+          </a:p>
+        </p:txBody>
+      </p:sp>
     </p:spTree>
     <p:extLst>
       <p:ext uri="{BB962C8B-B14F-4D97-AF65-F5344CB8AC3E}">
@@ -11981,13 +11462,6 @@
   <p:clrMapOvr>
     <a:masterClrMapping/>
   </p:clrMapOvr>
-  <p:timing>
-    <p:tnLst>
-      <p:par>
-        <p:cTn id="1" dur="indefinite" restart="never" nodeType="tmRoot"/>
-      </p:par>
-    </p:tnLst>
-  </p:timing>
 </p:sld>
 </file>
 
@@ -12018,8 +11492,8 @@
         </p:nvSpPr>
         <p:spPr>
           <a:xfrm>
-            <a:off x="1752600" y="1920876"/>
-            <a:ext cx="6858000" cy="4403725"/>
+            <a:off x="-1" y="0"/>
+            <a:ext cx="12306925" cy="6858000"/>
           </a:xfrm>
           <a:prstGeom prst="rect">
             <a:avLst/>
@@ -12256,56 +11730,6 @@
           </a:lstStyle>
           <a:p>
             <a:pPr>
-              <a:buFont typeface="Wingdings" charset="2"/>
-              <a:buChar char="Ø"/>
-            </a:pPr>
-            <a:r>
-              <a:rPr lang="en-US" sz="2600" dirty="0">
-                <a:latin typeface="Times New Roman" panose="02020603050405020304" pitchFamily="18" charset="0"/>
-                <a:cs typeface="Times New Roman" panose="02020603050405020304" pitchFamily="18" charset="0"/>
-              </a:rPr>
-              <a:t>A computer that utilizes an electronic pen (called a </a:t>
-            </a:r>
-            <a:r>
-              <a:rPr lang="en-US" sz="2600" i="1" dirty="0">
-                <a:latin typeface="Times New Roman" panose="02020603050405020304" pitchFamily="18" charset="0"/>
-                <a:cs typeface="Times New Roman" panose="02020603050405020304" pitchFamily="18" charset="0"/>
-              </a:rPr>
-              <a:t>stylus</a:t>
-            </a:r>
-            <a:r>
-              <a:rPr lang="en-US" sz="2600" dirty="0">
-                <a:latin typeface="Times New Roman" panose="02020603050405020304" pitchFamily="18" charset="0"/>
-                <a:cs typeface="Times New Roman" panose="02020603050405020304" pitchFamily="18" charset="0"/>
-              </a:rPr>
-              <a:t>) rather than a keyboard for input. Pen computers generally require special operating systems that support handwriting recognition so that users can write on the screen or on a tablet instead of typing on a keyboard. </a:t>
-            </a:r>
-          </a:p>
-          <a:p>
-            <a:pPr>
-              <a:buFont typeface="Wingdings 3" pitchFamily="18" charset="2"/>
-              <a:buNone/>
-            </a:pPr>
-            <a:endParaRPr lang="en-US" sz="2600" dirty="0">
-              <a:latin typeface="Times New Roman" panose="02020603050405020304" pitchFamily="18" charset="0"/>
-              <a:cs typeface="Times New Roman" panose="02020603050405020304" pitchFamily="18" charset="0"/>
-            </a:endParaRPr>
-          </a:p>
-          <a:p>
-            <a:pPr>
-              <a:buFont typeface="Wingdings" charset="2"/>
-              <a:buChar char="Ø"/>
-            </a:pPr>
-            <a:r>
-              <a:rPr lang="en-US" sz="2600" dirty="0">
-                <a:latin typeface="Times New Roman" panose="02020603050405020304" pitchFamily="18" charset="0"/>
-                <a:cs typeface="Times New Roman" panose="02020603050405020304" pitchFamily="18" charset="0"/>
-              </a:rPr>
-              <a:t>Most pen computers are hand-held devices, which are too small for a full-size keyboard. </a:t>
-            </a:r>
-          </a:p>
-          <a:p>
-            <a:pPr>
               <a:buFont typeface="Wingdings 3" pitchFamily="18" charset="2"/>
               <a:buNone/>
             </a:pPr>
@@ -12411,19 +11835,104 @@
           </a:lstStyle>
           <a:p>
             <a:pPr algn="ctr"/>
-            <a:r>
-              <a:rPr lang="en-US" sz="4800" dirty="0" smtClean="0">
-                <a:latin typeface="Times New Roman" pitchFamily="16" charset="0"/>
-                <a:cs typeface="Times New Roman" pitchFamily="16" charset="0"/>
-              </a:rPr>
-              <a:t>Working </a:t>
-            </a:r>
-            <a:r>
-              <a:rPr lang="en-US" sz="4800" dirty="0">
-                <a:latin typeface="Times New Roman" pitchFamily="16" charset="0"/>
-                <a:cs typeface="Times New Roman" pitchFamily="16" charset="0"/>
-              </a:rPr>
-              <a:t>Principle</a:t>
+            <a:endParaRPr lang="en-US" sz="4800" dirty="0">
+              <a:latin typeface="Times New Roman" pitchFamily="16" charset="0"/>
+              <a:cs typeface="Times New Roman" pitchFamily="16" charset="0"/>
+            </a:endParaRPr>
+          </a:p>
+        </p:txBody>
+      </p:sp>
+      <p:sp>
+        <p:nvSpPr>
+          <p:cNvPr id="5" name="TextBox 4">
+            <a:extLst>
+              <a:ext uri="{FF2B5EF4-FFF2-40B4-BE49-F238E27FC236}">
+                <a16:creationId xmlns:a16="http://schemas.microsoft.com/office/drawing/2014/main" id="{BBAF9B16-7F71-A06C-16F8-54BECBC3175C}"/>
+              </a:ext>
+            </a:extLst>
+          </p:cNvPr>
+          <p:cNvSpPr txBox="1"/>
+          <p:nvPr/>
+        </p:nvSpPr>
+        <p:spPr>
+          <a:xfrm rot="10800000" flipV="1">
+            <a:off x="0" y="2900245"/>
+            <a:ext cx="12306924" cy="2062103"/>
+          </a:xfrm>
+          <a:prstGeom prst="rect">
+            <a:avLst/>
+          </a:prstGeom>
+          <a:noFill/>
+        </p:spPr>
+        <p:txBody>
+          <a:bodyPr wrap="square">
+            <a:spAutoFit/>
+          </a:bodyPr>
+          <a:lstStyle/>
+          <a:p>
+            <a:pPr marL="457200" indent="-457200">
+              <a:buFont typeface="Arial" panose="020B0604020202020204" pitchFamily="34" charset="0"/>
+              <a:buChar char="•"/>
+            </a:pPr>
+            <a:r>
+              <a:rPr lang="en-US" sz="3200" dirty="0"/>
+              <a:t>To implement K means clustering algorithm.</a:t>
+            </a:r>
+          </a:p>
+          <a:p>
+            <a:pPr marL="457200" indent="-457200">
+              <a:buFont typeface="Arial" panose="020B0604020202020204" pitchFamily="34" charset="0"/>
+              <a:buChar char="•"/>
+            </a:pPr>
+            <a:r>
+              <a:rPr lang="en-US" sz="3200" dirty="0"/>
+              <a:t>To develop an online job recommendation application for job seekers .</a:t>
+            </a:r>
+          </a:p>
+          <a:p>
+            <a:pPr marL="457200" indent="-457200">
+              <a:buFont typeface="Arial" panose="020B0604020202020204" pitchFamily="34" charset="0"/>
+              <a:buChar char="•"/>
+            </a:pPr>
+            <a:r>
+              <a:rPr lang="en-US" sz="3200" dirty="0"/>
+              <a:t>To implement recommendation model .</a:t>
+            </a:r>
+          </a:p>
+        </p:txBody>
+      </p:sp>
+      <p:sp>
+        <p:nvSpPr>
+          <p:cNvPr id="2" name="TextBox 1">
+            <a:extLst>
+              <a:ext uri="{FF2B5EF4-FFF2-40B4-BE49-F238E27FC236}">
+                <a16:creationId xmlns:a16="http://schemas.microsoft.com/office/drawing/2014/main" id="{F6469D3D-4753-429A-14F8-AD61D19CF12C}"/>
+              </a:ext>
+            </a:extLst>
+          </p:cNvPr>
+          <p:cNvSpPr txBox="1"/>
+          <p:nvPr/>
+        </p:nvSpPr>
+        <p:spPr>
+          <a:xfrm>
+            <a:off x="839449" y="464695"/>
+            <a:ext cx="9904751" cy="830997"/>
+          </a:xfrm>
+          <a:prstGeom prst="rect">
+            <a:avLst/>
+          </a:prstGeom>
+          <a:noFill/>
+        </p:spPr>
+        <p:txBody>
+          <a:bodyPr wrap="square" rtlCol="0">
+            <a:spAutoFit/>
+          </a:bodyPr>
+          <a:lstStyle/>
+          <a:p>
+            <a:pPr algn="ctr"/>
+            <a:r>
+              <a:rPr lang="en-US" sz="4800" dirty="0"/>
+              <a:t>1.2 Problem Objectives </a:t>
             </a:r>
           </a:p>
         </p:txBody>
@@ -12438,13 +11947,6 @@
   <p:clrMapOvr>
     <a:masterClrMapping/>
   </p:clrMapOvr>
-  <p:timing>
-    <p:tnLst>
-      <p:par>
-        <p:cTn id="1" dur="indefinite" restart="never" nodeType="tmRoot"/>
-      </p:par>
-    </p:tnLst>
-  </p:timing>
 </p:sld>
 </file>
 
@@ -12483,25 +11985,11 @@
         </p:spPr>
         <p:txBody>
           <a:bodyPr>
-            <a:normAutofit fontScale="90000"/>
+            <a:normAutofit/>
           </a:bodyPr>
           <a:lstStyle/>
           <a:p>
             <a:pPr algn="ctr" eaLnBrk="1" hangingPunct="1"/>
-            <a:r>
-              <a:rPr lang="en-US" sz="4800" dirty="0">
-                <a:latin typeface="Times New Roman" pitchFamily="16" charset="0"/>
-                <a:cs typeface="Times New Roman" pitchFamily="16" charset="0"/>
-              </a:rPr>
-              <a:t>P-ISM includes 5 functions</a:t>
-            </a:r>
-            <a:r>
-              <a:rPr lang="en-US" sz="2800" dirty="0">
-                <a:latin typeface="Times New Roman" pitchFamily="16" charset="0"/>
-                <a:cs typeface="Times New Roman" pitchFamily="16" charset="0"/>
-              </a:rPr>
-              <a:t/>
-            </a:r>
             <a:br>
               <a:rPr lang="en-US" sz="2800" dirty="0">
                 <a:latin typeface="Times New Roman" pitchFamily="16" charset="0"/>
@@ -12517,143 +12005,116 @@
       </p:sp>
       <p:sp>
         <p:nvSpPr>
-          <p:cNvPr id="15363" name="Content Placeholder 3"/>
-          <p:cNvSpPr>
-            <a:spLocks noGrp="1"/>
-          </p:cNvSpPr>
-          <p:nvPr>
-            <p:ph sz="half" idx="1"/>
-          </p:nvPr>
+          <p:cNvPr id="6" name="TextBox 5">
+            <a:extLst>
+              <a:ext uri="{FF2B5EF4-FFF2-40B4-BE49-F238E27FC236}">
+                <a16:creationId xmlns:a16="http://schemas.microsoft.com/office/drawing/2014/main" id="{33D0236F-5760-C0DC-1391-938952B2B6BB}"/>
+              </a:ext>
+            </a:extLst>
+          </p:cNvPr>
+          <p:cNvSpPr txBox="1"/>
+          <p:nvPr/>
         </p:nvSpPr>
         <p:spPr>
           <a:xfrm>
-            <a:off x="2074572" y="1816100"/>
-            <a:ext cx="4038600" cy="4433888"/>
-          </a:xfrm>
-        </p:spPr>
-        <p:txBody>
-          <a:bodyPr>
-            <a:normAutofit/>
-          </a:bodyPr>
-          <a:lstStyle/>
-          <a:p>
-            <a:pPr eaLnBrk="1" hangingPunct="1"/>
-            <a:r>
-              <a:rPr lang="en-US" sz="2000" dirty="0">
-                <a:latin typeface="Times New Roman" pitchFamily="16" charset="0"/>
-                <a:cs typeface="Times New Roman" pitchFamily="16" charset="0"/>
-              </a:rPr>
-              <a:t>CPU PEN</a:t>
-            </a:r>
-          </a:p>
-          <a:p>
-            <a:pPr eaLnBrk="1" hangingPunct="1">
-              <a:buFont typeface="Wingdings 3" pitchFamily="18" charset="2"/>
-              <a:buNone/>
-            </a:pPr>
-            <a:endParaRPr lang="en-US" sz="2000" dirty="0">
-              <a:latin typeface="Times New Roman" pitchFamily="16" charset="0"/>
-              <a:cs typeface="Times New Roman" pitchFamily="16" charset="0"/>
-            </a:endParaRPr>
-          </a:p>
-          <a:p>
-            <a:pPr eaLnBrk="1" hangingPunct="1"/>
-            <a:r>
-              <a:rPr lang="en-US" sz="2000" dirty="0">
-                <a:latin typeface="Times New Roman" pitchFamily="16" charset="0"/>
-                <a:cs typeface="Times New Roman" pitchFamily="16" charset="0"/>
-              </a:rPr>
-              <a:t>COMMUNICATION PEN</a:t>
-            </a:r>
-          </a:p>
-          <a:p>
-            <a:pPr eaLnBrk="1" hangingPunct="1">
-              <a:buFont typeface="Wingdings 3" pitchFamily="18" charset="2"/>
-              <a:buNone/>
-            </a:pPr>
-            <a:endParaRPr lang="en-US" sz="2000" dirty="0">
-              <a:latin typeface="Times New Roman" pitchFamily="16" charset="0"/>
-              <a:cs typeface="Times New Roman" pitchFamily="16" charset="0"/>
-            </a:endParaRPr>
-          </a:p>
-          <a:p>
-            <a:pPr eaLnBrk="1" hangingPunct="1"/>
-            <a:r>
-              <a:rPr lang="en-US" sz="2000" dirty="0">
-                <a:latin typeface="Times New Roman" pitchFamily="16" charset="0"/>
-                <a:cs typeface="Times New Roman" pitchFamily="16" charset="0"/>
-              </a:rPr>
-              <a:t>VISUAL OUTPUT</a:t>
-            </a:r>
-          </a:p>
-          <a:p>
-            <a:pPr eaLnBrk="1" hangingPunct="1"/>
-            <a:endParaRPr lang="en-US" sz="2000" dirty="0">
-              <a:latin typeface="Times New Roman" pitchFamily="16" charset="0"/>
-              <a:cs typeface="Times New Roman" pitchFamily="16" charset="0"/>
-            </a:endParaRPr>
-          </a:p>
-          <a:p>
-            <a:pPr eaLnBrk="1" hangingPunct="1"/>
-            <a:r>
-              <a:rPr lang="en-US" sz="2000" dirty="0">
-                <a:latin typeface="Times New Roman" pitchFamily="16" charset="0"/>
-                <a:cs typeface="Times New Roman" pitchFamily="16" charset="0"/>
-              </a:rPr>
-              <a:t>VIRTUAL KEYBOARD</a:t>
-            </a:r>
-          </a:p>
-          <a:p>
-            <a:pPr eaLnBrk="1" hangingPunct="1"/>
-            <a:endParaRPr lang="en-US" sz="2000" dirty="0">
-              <a:latin typeface="Times New Roman" pitchFamily="16" charset="0"/>
-              <a:cs typeface="Times New Roman" pitchFamily="16" charset="0"/>
-            </a:endParaRPr>
-          </a:p>
-          <a:p>
-            <a:pPr eaLnBrk="1" hangingPunct="1"/>
-            <a:r>
-              <a:rPr lang="en-US" sz="2000" dirty="0">
-                <a:latin typeface="Times New Roman" pitchFamily="16" charset="0"/>
-                <a:cs typeface="Times New Roman" pitchFamily="16" charset="0"/>
-              </a:rPr>
-              <a:t> CAMERA</a:t>
-            </a:r>
-          </a:p>
-        </p:txBody>
-      </p:sp>
-      <p:pic>
-        <p:nvPicPr>
-          <p:cNvPr id="15364" name="Picture 1" descr="C:\Users\Sumit\Desktop\Photo Work\abc.jpg"/>
-          <p:cNvPicPr>
-            <a:picLocks noChangeAspect="1" noChangeArrowheads="1"/>
-          </p:cNvPicPr>
-          <p:nvPr/>
-        </p:nvPicPr>
-        <p:blipFill>
-          <a:blip r:embed="rId3" cstate="print"/>
-          <a:srcRect/>
-          <a:stretch>
-            <a:fillRect/>
-          </a:stretch>
-        </p:blipFill>
-        <p:spPr bwMode="auto">
-          <a:xfrm>
-            <a:off x="5791200" y="1245047"/>
-            <a:ext cx="4724400" cy="4497388"/>
+            <a:off x="104931" y="189158"/>
+            <a:ext cx="10972800" cy="646331"/>
           </a:xfrm>
           <a:prstGeom prst="rect">
             <a:avLst/>
           </a:prstGeom>
           <a:noFill/>
-          <a:ln w="9525">
-            <a:noFill/>
-            <a:miter lim="800000"/>
-            <a:headEnd/>
-            <a:tailEnd/>
-          </a:ln>
-        </p:spPr>
-      </p:pic>
+        </p:spPr>
+        <p:txBody>
+          <a:bodyPr wrap="square" rtlCol="0">
+            <a:spAutoFit/>
+          </a:bodyPr>
+          <a:lstStyle/>
+          <a:p>
+            <a:pPr algn="ctr"/>
+            <a:r>
+              <a:rPr lang="en-US" sz="3600" dirty="0"/>
+              <a:t>SYSTEM REQUIREMENTS: </a:t>
+            </a:r>
+          </a:p>
+        </p:txBody>
+      </p:sp>
+      <p:sp>
+        <p:nvSpPr>
+          <p:cNvPr id="9" name="TextBox 8">
+            <a:extLst>
+              <a:ext uri="{FF2B5EF4-FFF2-40B4-BE49-F238E27FC236}">
+                <a16:creationId xmlns:a16="http://schemas.microsoft.com/office/drawing/2014/main" id="{044D56B2-4003-2F99-F088-3F2431FEFDC6}"/>
+              </a:ext>
+            </a:extLst>
+          </p:cNvPr>
+          <p:cNvSpPr txBox="1"/>
+          <p:nvPr/>
+        </p:nvSpPr>
+        <p:spPr>
+          <a:xfrm>
+            <a:off x="659568" y="1257327"/>
+            <a:ext cx="11212642" cy="2031325"/>
+          </a:xfrm>
+          <a:prstGeom prst="rect">
+            <a:avLst/>
+          </a:prstGeom>
+          <a:noFill/>
+        </p:spPr>
+        <p:txBody>
+          <a:bodyPr wrap="square" rtlCol="0">
+            <a:spAutoFit/>
+          </a:bodyPr>
+          <a:lstStyle/>
+          <a:p>
+            <a:r>
+              <a:rPr lang="en-US" dirty="0"/>
+              <a:t>1 Eclipse Software:</a:t>
+            </a:r>
+          </a:p>
+          <a:p>
+            <a:r>
+              <a:rPr lang="en-US" dirty="0"/>
+              <a:t>2 Apache Tomcat Server:</a:t>
+            </a:r>
+          </a:p>
+          <a:p>
+            <a:r>
+              <a:rPr lang="en-US" dirty="0"/>
+              <a:t>3 MySQL </a:t>
+            </a:r>
+          </a:p>
+          <a:p>
+            <a:r>
+              <a:rPr lang="sv-SE" dirty="0"/>
+              <a:t>4 Jakarta Server Pages (JSP):</a:t>
+            </a:r>
+          </a:p>
+          <a:p>
+            <a:r>
+              <a:rPr lang="en-US" dirty="0"/>
+              <a:t>5 Bootstrap: </a:t>
+            </a:r>
+          </a:p>
+          <a:p>
+            <a:r>
+              <a:rPr lang="en-US" dirty="0"/>
+              <a:t>6 JavaScript </a:t>
+            </a:r>
+          </a:p>
+          <a:p>
+            <a:r>
+              <a:rPr lang="en-US" b="1" dirty="0"/>
+              <a:t>7 </a:t>
+            </a:r>
+            <a:r>
+              <a:rPr lang="en-US" dirty="0"/>
+              <a:t>Spring MVC </a:t>
+            </a:r>
+            <a:endParaRPr lang="en-US" b="1" dirty="0"/>
+          </a:p>
+        </p:txBody>
+      </p:sp>
     </p:spTree>
     <p:extLst>
       <p:ext uri="{BB962C8B-B14F-4D97-AF65-F5344CB8AC3E}">
@@ -12664,13 +12125,6 @@
   <p:clrMapOvr>
     <a:masterClrMapping/>
   </p:clrMapOvr>
-  <p:timing>
-    <p:tnLst>
-      <p:par>
-        <p:cTn id="1" dur="indefinite" restart="never" nodeType="tmRoot"/>
-      </p:par>
-    </p:tnLst>
-  </p:timing>
 </p:sld>
 </file>
 
@@ -12715,51 +12169,101 @@
           <a:p>
             <a:pPr algn="ctr" eaLnBrk="1" hangingPunct="1"/>
             <a:r>
-              <a:rPr lang="en-US" sz="4800" dirty="0">
-                <a:latin typeface="Times New Roman" pitchFamily="16" charset="0"/>
-                <a:cs typeface="Times New Roman" pitchFamily="16" charset="0"/>
-              </a:rPr>
-              <a:t>Block diagram of P- ISM</a:t>
+              <a:rPr lang="en-US" sz="3600" dirty="0"/>
+              <a:t>SYSTEM ARCHITECTURE </a:t>
             </a:r>
             <a:endParaRPr lang="en-US" sz="4800" dirty="0"/>
           </a:p>
         </p:txBody>
       </p:sp>
-      <p:pic>
-        <p:nvPicPr>
-          <p:cNvPr id="5" name="Picture 4" descr="http://hostfreeimages.info/wp-content/uploads/2012/11/pen.jpg"/>
-          <p:cNvPicPr/>
+      <p:sp>
+        <p:nvSpPr>
+          <p:cNvPr id="2" name="TextBox 1">
+            <a:extLst>
+              <a:ext uri="{FF2B5EF4-FFF2-40B4-BE49-F238E27FC236}">
+                <a16:creationId xmlns:a16="http://schemas.microsoft.com/office/drawing/2014/main" id="{F98D90D0-4284-D13D-C5B3-B4375A4456CB}"/>
+              </a:ext>
+            </a:extLst>
+          </p:cNvPr>
+          <p:cNvSpPr txBox="1"/>
           <p:nvPr/>
-        </p:nvPicPr>
-        <p:blipFill>
-          <a:blip r:embed="rId3" cstate="print"/>
-          <a:srcRect/>
-          <a:stretch>
-            <a:fillRect/>
-          </a:stretch>
-        </p:blipFill>
-        <p:spPr bwMode="auto">
+        </p:nvSpPr>
+        <p:spPr>
           <a:xfrm>
-            <a:off x="2286000" y="1828800"/>
-            <a:ext cx="7543800" cy="4724400"/>
+            <a:off x="269823" y="1259174"/>
+            <a:ext cx="11782269" cy="369332"/>
           </a:xfrm>
           <a:prstGeom prst="rect">
             <a:avLst/>
           </a:prstGeom>
           <a:noFill/>
-          <a:ln w="9525">
-            <a:solidFill>
-              <a:schemeClr val="tx1">
-                <a:lumMod val="95000"/>
-                <a:lumOff val="5000"/>
-              </a:schemeClr>
-            </a:solidFill>
-            <a:miter lim="800000"/>
-            <a:headEnd/>
-            <a:tailEnd/>
-          </a:ln>
-        </p:spPr>
-      </p:pic>
+        </p:spPr>
+        <p:txBody>
+          <a:bodyPr wrap="square" rtlCol="0">
+            <a:spAutoFit/>
+          </a:bodyPr>
+          <a:lstStyle/>
+          <a:p>
+            <a:r>
+              <a:rPr lang="en-US" dirty="0"/>
+              <a:t>1 K-MEANS CLUSTERING: </a:t>
+            </a:r>
+          </a:p>
+        </p:txBody>
+      </p:sp>
+      <p:sp>
+        <p:nvSpPr>
+          <p:cNvPr id="3" name="TextBox 2">
+            <a:extLst>
+              <a:ext uri="{FF2B5EF4-FFF2-40B4-BE49-F238E27FC236}">
+                <a16:creationId xmlns:a16="http://schemas.microsoft.com/office/drawing/2014/main" id="{93B9DB40-4329-E4D1-0B40-C9760F9DE041}"/>
+              </a:ext>
+            </a:extLst>
+          </p:cNvPr>
+          <p:cNvSpPr txBox="1"/>
+          <p:nvPr/>
+        </p:nvSpPr>
+        <p:spPr>
+          <a:xfrm>
+            <a:off x="269823" y="1858780"/>
+            <a:ext cx="11527436" cy="1477328"/>
+          </a:xfrm>
+          <a:prstGeom prst="rect">
+            <a:avLst/>
+          </a:prstGeom>
+          <a:noFill/>
+        </p:spPr>
+        <p:txBody>
+          <a:bodyPr wrap="square" rtlCol="0">
+            <a:spAutoFit/>
+          </a:bodyPr>
+          <a:lstStyle/>
+          <a:p>
+            <a:r>
+              <a:rPr lang="en-US" dirty="0"/>
+              <a:t>1: An initial clustering is created by choosing k random centroids from the dataset. </a:t>
+            </a:r>
+          </a:p>
+          <a:p>
+            <a:r>
+              <a:rPr lang="en-US" dirty="0"/>
+              <a:t>2: For each data point, calculate the distance from all centroids, and assign its membership to the nearest centroid. </a:t>
+            </a:r>
+          </a:p>
+          <a:p>
+            <a:r>
+              <a:rPr lang="en-US" dirty="0"/>
+              <a:t>3: Recalculate the new cluster centroids by the average of all data points that are assigned to the clusters. </a:t>
+            </a:r>
+          </a:p>
+          <a:p>
+            <a:r>
+              <a:rPr lang="en-US" dirty="0"/>
+              <a:t>4: Repeat step 2 until convergence.</a:t>
+            </a:r>
+          </a:p>
+        </p:txBody>
+      </p:sp>
     </p:spTree>
     <p:extLst>
       <p:ext uri="{BB962C8B-B14F-4D97-AF65-F5344CB8AC3E}">
@@ -12770,13 +12274,6 @@
   <p:clrMapOvr>
     <a:masterClrMapping/>
   </p:clrMapOvr>
-  <p:timing>
-    <p:tnLst>
-      <p:par>
-        <p:cTn id="1" dur="indefinite" restart="never" nodeType="tmRoot"/>
-      </p:par>
-    </p:tnLst>
-  </p:timing>
 </p:sld>
 </file>
 
@@ -12799,199 +12296,39 @@
       </p:grpSpPr>
       <p:sp>
         <p:nvSpPr>
-          <p:cNvPr id="2" name="Title 1"/>
-          <p:cNvSpPr>
-            <a:spLocks noGrp="1"/>
-          </p:cNvSpPr>
-          <p:nvPr>
-            <p:ph type="title"/>
-          </p:nvPr>
+          <p:cNvPr id="6" name="TextBox 5">
+            <a:extLst>
+              <a:ext uri="{FF2B5EF4-FFF2-40B4-BE49-F238E27FC236}">
+                <a16:creationId xmlns:a16="http://schemas.microsoft.com/office/drawing/2014/main" id="{54ACEBBF-63FB-F750-4E0C-9CD33A73054D}"/>
+              </a:ext>
+            </a:extLst>
+          </p:cNvPr>
+          <p:cNvSpPr txBox="1"/>
+          <p:nvPr/>
         </p:nvSpPr>
         <p:spPr>
           <a:xfrm>
-            <a:off x="1981200" y="457200"/>
-            <a:ext cx="8229600" cy="1143000"/>
+            <a:off x="254833" y="0"/>
+            <a:ext cx="11782269" cy="369332"/>
           </a:xfrm>
-        </p:spPr>
-        <p:txBody>
-          <a:bodyPr>
-            <a:normAutofit fontScale="90000"/>
+          <a:prstGeom prst="rect">
+            <a:avLst/>
+          </a:prstGeom>
+          <a:noFill/>
+        </p:spPr>
+        <p:txBody>
+          <a:bodyPr wrap="square" rtlCol="0">
+            <a:spAutoFit/>
           </a:bodyPr>
           <a:lstStyle/>
           <a:p>
-            <a:pPr algn="ctr">
-              <a:defRPr/>
-            </a:pPr>
-            <a:r>
-              <a:rPr lang="en-US" sz="5300" dirty="0">
-                <a:latin typeface="Times New Roman" pitchFamily="18" charset="0"/>
-                <a:cs typeface="Times New Roman" pitchFamily="18" charset="0"/>
-              </a:rPr>
-              <a:t>CPU Pen </a:t>
-            </a:r>
-            <a:r>
-              <a:rPr lang="en-US" dirty="0" smtClean="0"/>
-              <a:t/>
-            </a:r>
-            <a:br>
-              <a:rPr lang="en-US" dirty="0" smtClean="0"/>
-            </a:br>
-            <a:endParaRPr lang="en-US" dirty="0"/>
-          </a:p>
-        </p:txBody>
-      </p:sp>
-      <p:sp>
-        <p:nvSpPr>
-          <p:cNvPr id="4" name="Content Placeholder 3"/>
-          <p:cNvSpPr>
-            <a:spLocks noGrp="1"/>
-          </p:cNvSpPr>
-          <p:nvPr>
-            <p:ph sz="half" idx="1"/>
-          </p:nvPr>
-        </p:nvSpPr>
-        <p:spPr>
-          <a:xfrm>
-            <a:off x="1905000" y="1828801"/>
-            <a:ext cx="3733800" cy="4435475"/>
-          </a:xfrm>
-        </p:spPr>
-        <p:txBody>
-          <a:bodyPr>
-            <a:normAutofit/>
-          </a:bodyPr>
-          <a:lstStyle/>
-          <a:p>
-            <a:pPr marL="274320" indent="-274320">
-              <a:buFont typeface="Wingdings 3"/>
-              <a:buChar char=""/>
-              <a:defRPr/>
-            </a:pPr>
-            <a:r>
-              <a:rPr lang="en-US" sz="2000" dirty="0">
-                <a:latin typeface="Times New Roman" pitchFamily="18" charset="0"/>
-                <a:cs typeface="Times New Roman" pitchFamily="18" charset="0"/>
-              </a:rPr>
-              <a:t>The functionality of the CPU is done by </a:t>
-            </a:r>
-          </a:p>
-          <a:p>
-            <a:pPr marL="274320" indent="-274320">
-              <a:buNone/>
-              <a:defRPr/>
-            </a:pPr>
-            <a:r>
-              <a:rPr lang="en-US" sz="2000" dirty="0">
-                <a:latin typeface="Times New Roman" pitchFamily="18" charset="0"/>
-                <a:cs typeface="Times New Roman" pitchFamily="18" charset="0"/>
-              </a:rPr>
-              <a:t>    one of the pen.</a:t>
-            </a:r>
-          </a:p>
-          <a:p>
-            <a:pPr marL="274320" indent="-274320">
-              <a:buFont typeface="Wingdings 3"/>
-              <a:buChar char=""/>
-              <a:defRPr/>
-            </a:pPr>
-            <a:r>
-              <a:rPr lang="en-US" sz="2000" dirty="0">
-                <a:latin typeface="Times New Roman" pitchFamily="18" charset="0"/>
-                <a:cs typeface="Times New Roman" pitchFamily="18" charset="0"/>
-              </a:rPr>
-              <a:t>It is also known as computing engine.</a:t>
-            </a:r>
-          </a:p>
-          <a:p>
-            <a:pPr marL="274320" indent="-274320">
-              <a:buFont typeface="Wingdings 3"/>
-              <a:buChar char=""/>
-              <a:defRPr/>
-            </a:pPr>
-            <a:r>
-              <a:rPr lang="en-US" sz="2000" dirty="0">
-                <a:latin typeface="Times New Roman" pitchFamily="18" charset="0"/>
-                <a:cs typeface="Times New Roman" pitchFamily="18" charset="0"/>
-              </a:rPr>
-              <a:t>Dual Core processor</a:t>
-            </a:r>
-          </a:p>
-          <a:p>
-            <a:pPr marL="274320" indent="-274320">
-              <a:buNone/>
-              <a:defRPr/>
-            </a:pPr>
-            <a:r>
-              <a:rPr lang="en-US" sz="2000" dirty="0">
-                <a:latin typeface="Times New Roman" pitchFamily="18" charset="0"/>
-                <a:cs typeface="Times New Roman" pitchFamily="18" charset="0"/>
-              </a:rPr>
-              <a:t>    is used.</a:t>
-            </a:r>
-          </a:p>
-          <a:p>
-            <a:pPr marL="274320" indent="-274320">
-              <a:buFont typeface="Wingdings 3"/>
-              <a:buChar char=""/>
-              <a:defRPr/>
-            </a:pPr>
-            <a:r>
-              <a:rPr lang="en-US" sz="2000" dirty="0">
-                <a:latin typeface="Times New Roman" pitchFamily="18" charset="0"/>
-                <a:cs typeface="Times New Roman" pitchFamily="18" charset="0"/>
-              </a:rPr>
-              <a:t>Works with windows operating system.</a:t>
-            </a:r>
-          </a:p>
-          <a:p>
-            <a:pPr marL="274320" indent="-274320">
-              <a:buNone/>
-              <a:defRPr/>
-            </a:pPr>
-            <a:r>
-              <a:rPr lang="en-US" sz="2000" dirty="0">
-                <a:latin typeface="Times New Roman" pitchFamily="18" charset="0"/>
-                <a:cs typeface="Times New Roman" pitchFamily="18" charset="0"/>
-              </a:rPr>
-              <a:t/>
-            </a:r>
-            <a:br>
-              <a:rPr lang="en-US" sz="2000" dirty="0">
-                <a:latin typeface="Times New Roman" pitchFamily="18" charset="0"/>
-                <a:cs typeface="Times New Roman" pitchFamily="18" charset="0"/>
-              </a:rPr>
-            </a:br>
-            <a:endParaRPr lang="en-US" sz="2000" dirty="0">
-              <a:latin typeface="Times New Roman" pitchFamily="18" charset="0"/>
-              <a:cs typeface="Times New Roman" pitchFamily="18" charset="0"/>
-            </a:endParaRPr>
-          </a:p>
-        </p:txBody>
-      </p:sp>
-      <p:pic>
-        <p:nvPicPr>
-          <p:cNvPr id="17412" name="Content Placeholder 7" descr="cpupen1.jpg"/>
-          <p:cNvPicPr>
-            <a:picLocks noGrp="1" noChangeAspect="1"/>
-          </p:cNvPicPr>
-          <p:nvPr>
-            <p:ph sz="half" idx="2"/>
-          </p:nvPr>
-        </p:nvPicPr>
-        <p:blipFill>
-          <a:blip r:embed="rId2" cstate="print"/>
-          <a:srcRect/>
-          <a:stretch>
-            <a:fillRect/>
-          </a:stretch>
-        </p:blipFill>
-        <p:spPr>
-          <a:xfrm>
-            <a:off x="6248400" y="1981201"/>
-            <a:ext cx="3810000" cy="3641725"/>
-          </a:xfrm>
-        </p:spPr>
-      </p:pic>
+            <a:r>
+              <a:rPr lang="en-US" dirty="0"/>
+              <a:t>Algorithm 1 K-Means Clustering</a:t>
+            </a:r>
+          </a:p>
+        </p:txBody>
+      </p:sp>
     </p:spTree>
     <p:extLst>
       <p:ext uri="{BB962C8B-B14F-4D97-AF65-F5344CB8AC3E}">
@@ -13002,13 +12339,6 @@
   <p:clrMapOvr>
     <a:masterClrMapping/>
   </p:clrMapOvr>
-  <p:timing>
-    <p:tnLst>
-      <p:par>
-        <p:cTn id="1" dur="indefinite" restart="never" nodeType="tmRoot"/>
-      </p:par>
-    </p:tnLst>
-  </p:timing>
 </p:sld>
 </file>
 

</xml_diff>

<commit_message>
add data 2 in ppt
</commit_message>
<xml_diff>
--- a/final_submission_ppt.pptx
+++ b/final_submission_ppt.pptx
@@ -5,7 +5,7 @@
     <p:sldMasterId id="2147483660" r:id="rId1"/>
   </p:sldMasterIdLst>
   <p:notesMasterIdLst>
-    <p:notesMasterId r:id="rId24"/>
+    <p:notesMasterId r:id="rId23"/>
   </p:notesMasterIdLst>
   <p:sldIdLst>
     <p:sldId id="256" r:id="rId2"/>
@@ -28,8 +28,7 @@
     <p:sldId id="273" r:id="rId19"/>
     <p:sldId id="274" r:id="rId20"/>
     <p:sldId id="275" r:id="rId21"/>
-    <p:sldId id="276" r:id="rId22"/>
-    <p:sldId id="277" r:id="rId23"/>
+    <p:sldId id="277" r:id="rId22"/>
   </p:sldIdLst>
   <p:sldSz cx="12192000" cy="6858000"/>
   <p:notesSz cx="6858000" cy="9144000"/>
@@ -8348,183 +8347,138 @@
       </p:grpSpPr>
       <p:sp>
         <p:nvSpPr>
-          <p:cNvPr id="2" name="Title 1"/>
-          <p:cNvSpPr>
-            <a:spLocks noGrp="1"/>
-          </p:cNvSpPr>
-          <p:nvPr>
-            <p:ph type="title"/>
-          </p:nvPr>
+          <p:cNvPr id="9" name="TextBox 8">
+            <a:extLst>
+              <a:ext uri="{FF2B5EF4-FFF2-40B4-BE49-F238E27FC236}">
+                <a16:creationId xmlns:a16="http://schemas.microsoft.com/office/drawing/2014/main" id="{DDAF232A-AFFD-7968-5AF3-7B41B6048094}"/>
+              </a:ext>
+            </a:extLst>
+          </p:cNvPr>
+          <p:cNvSpPr txBox="1"/>
+          <p:nvPr/>
         </p:nvSpPr>
         <p:spPr>
           <a:xfrm>
-            <a:off x="1828800" y="304800"/>
-            <a:ext cx="8229600" cy="1143000"/>
+            <a:off x="119921" y="179882"/>
+            <a:ext cx="11362545" cy="369332"/>
           </a:xfrm>
-        </p:spPr>
-        <p:txBody>
-          <a:bodyPr>
-            <a:normAutofit fontScale="90000"/>
+          <a:prstGeom prst="rect">
+            <a:avLst/>
+          </a:prstGeom>
+          <a:noFill/>
+        </p:spPr>
+        <p:txBody>
+          <a:bodyPr wrap="square" rtlCol="0">
+            <a:spAutoFit/>
           </a:bodyPr>
           <a:lstStyle/>
           <a:p>
-            <a:pPr algn="ctr">
-              <a:defRPr/>
-            </a:pPr>
-            <a:r>
-              <a:rPr lang="en-US" sz="5300" dirty="0">
-                <a:latin typeface="Times New Roman" pitchFamily="18" charset="0"/>
-                <a:cs typeface="Times New Roman" pitchFamily="18" charset="0"/>
-              </a:rPr>
-              <a:t>Communication Pen</a:t>
-            </a:r>
-            <a:br>
-              <a:rPr lang="pl-PL" dirty="0"/>
-            </a:br>
-            <a:endParaRPr lang="en-US" dirty="0"/>
-          </a:p>
-        </p:txBody>
-      </p:sp>
-      <p:sp>
-        <p:nvSpPr>
-          <p:cNvPr id="18435" name="Content Placeholder 2"/>
-          <p:cNvSpPr>
-            <a:spLocks noGrp="1"/>
-          </p:cNvSpPr>
-          <p:nvPr>
-            <p:ph sz="half" idx="1"/>
-          </p:nvPr>
+            <a:r>
+              <a:rPr lang="en-US" dirty="0"/>
+              <a:t>IMPLIMENTATION AND RESULT </a:t>
+            </a:r>
+          </a:p>
+        </p:txBody>
+      </p:sp>
+      <p:sp>
+        <p:nvSpPr>
+          <p:cNvPr id="10" name="TextBox 9">
+            <a:extLst>
+              <a:ext uri="{FF2B5EF4-FFF2-40B4-BE49-F238E27FC236}">
+                <a16:creationId xmlns:a16="http://schemas.microsoft.com/office/drawing/2014/main" id="{131CCEE0-603A-76AB-0EE0-C2E614F9F5BF}"/>
+              </a:ext>
+            </a:extLst>
+          </p:cNvPr>
+          <p:cNvSpPr txBox="1"/>
+          <p:nvPr/>
         </p:nvSpPr>
         <p:spPr>
           <a:xfrm>
-            <a:off x="1981200" y="1920876"/>
-            <a:ext cx="4953000" cy="4632325"/>
+            <a:off x="0" y="549214"/>
+            <a:ext cx="11857220" cy="1754326"/>
           </a:xfrm>
-        </p:spPr>
-        <p:txBody>
-          <a:bodyPr>
-            <a:normAutofit/>
+          <a:prstGeom prst="rect">
+            <a:avLst/>
+          </a:prstGeom>
+          <a:noFill/>
+        </p:spPr>
+        <p:txBody>
+          <a:bodyPr wrap="square" rtlCol="0">
+            <a:spAutoFit/>
           </a:bodyPr>
           <a:lstStyle/>
           <a:p>
-            <a:pPr eaLnBrk="1" hangingPunct="1"/>
-            <a:r>
-              <a:rPr lang="en-US" sz="2600" dirty="0">
-                <a:latin typeface="Times New Roman" pitchFamily="16" charset="0"/>
-                <a:cs typeface="Times New Roman" pitchFamily="16" charset="0"/>
-              </a:rPr>
-              <a:t>Wireless Bluetooth Technology.</a:t>
-            </a:r>
-          </a:p>
-          <a:p>
-            <a:pPr eaLnBrk="1" hangingPunct="1"/>
-            <a:r>
-              <a:rPr lang="en-US" sz="2600" dirty="0">
-                <a:latin typeface="Times New Roman" pitchFamily="16" charset="0"/>
-                <a:cs typeface="Times New Roman" pitchFamily="16" charset="0"/>
-              </a:rPr>
-              <a:t>Connected to internet</a:t>
-            </a:r>
-          </a:p>
-          <a:p>
-            <a:pPr eaLnBrk="1" hangingPunct="1">
-              <a:buFont typeface="Wingdings 3" pitchFamily="18" charset="2"/>
-              <a:buNone/>
-            </a:pPr>
-            <a:r>
-              <a:rPr lang="en-US" sz="2600" dirty="0">
-                <a:latin typeface="Times New Roman" pitchFamily="16" charset="0"/>
-                <a:cs typeface="Times New Roman" pitchFamily="16" charset="0"/>
-              </a:rPr>
-              <a:t>    through cellular phone </a:t>
-            </a:r>
-          </a:p>
-          <a:p>
-            <a:pPr eaLnBrk="1" hangingPunct="1">
-              <a:buFont typeface="Wingdings 3" pitchFamily="18" charset="2"/>
-              <a:buNone/>
-            </a:pPr>
-            <a:r>
-              <a:rPr lang="en-US" sz="2600" dirty="0">
-                <a:latin typeface="Times New Roman" pitchFamily="16" charset="0"/>
-                <a:cs typeface="Times New Roman" pitchFamily="16" charset="0"/>
-              </a:rPr>
-              <a:t>    function.</a:t>
-            </a:r>
-          </a:p>
-          <a:p>
-            <a:pPr eaLnBrk="1" hangingPunct="1"/>
-            <a:r>
-              <a:rPr lang="en-US" sz="2600" dirty="0">
-                <a:latin typeface="Times New Roman" pitchFamily="16" charset="0"/>
-                <a:cs typeface="Times New Roman" pitchFamily="16" charset="0"/>
-              </a:rPr>
-              <a:t>Uses Wi-Fi technology.</a:t>
-            </a:r>
-          </a:p>
-          <a:p>
-            <a:pPr eaLnBrk="1" hangingPunct="1"/>
-            <a:r>
-              <a:rPr lang="en-US" sz="2600" dirty="0">
-                <a:latin typeface="Times New Roman" pitchFamily="16" charset="0"/>
-                <a:cs typeface="Times New Roman" pitchFamily="16" charset="0"/>
-              </a:rPr>
-              <a:t>Exchange information      </a:t>
-            </a:r>
-          </a:p>
-          <a:p>
-            <a:pPr eaLnBrk="1" hangingPunct="1">
-              <a:buFont typeface="Wingdings 3" pitchFamily="18" charset="2"/>
-              <a:buNone/>
-            </a:pPr>
-            <a:r>
-              <a:rPr lang="en-US" sz="2600" dirty="0">
-                <a:latin typeface="Times New Roman" pitchFamily="16" charset="0"/>
-                <a:cs typeface="Times New Roman" pitchFamily="16" charset="0"/>
-              </a:rPr>
-              <a:t>    with wireless connection.</a:t>
-            </a:r>
-          </a:p>
-          <a:p>
-            <a:pPr eaLnBrk="1" hangingPunct="1">
-              <a:buFont typeface="Wingdings 3" pitchFamily="18" charset="2"/>
-              <a:buNone/>
-            </a:pPr>
-            <a:br>
-              <a:rPr lang="en-US" dirty="0">
-                <a:latin typeface="Times New Roman" pitchFamily="16" charset="0"/>
-                <a:cs typeface="Times New Roman" pitchFamily="16" charset="0"/>
-              </a:rPr>
-            </a:br>
-            <a:endParaRPr lang="en-US" dirty="0">
-              <a:latin typeface="Times New Roman" pitchFamily="16" charset="0"/>
-              <a:cs typeface="Times New Roman" pitchFamily="16" charset="0"/>
-            </a:endParaRPr>
+            <a:r>
+              <a:rPr lang="en-US" dirty="0"/>
+              <a:t>5.1 IMPLEMENTATION </a:t>
+            </a:r>
+          </a:p>
+          <a:p>
+            <a:r>
+              <a:rPr lang="en-US" dirty="0"/>
+              <a:t>5.1.1 Database Connectivity to JAVA Application:</a:t>
+            </a:r>
+          </a:p>
+          <a:p>
+            <a:r>
+              <a:rPr lang="en-US" dirty="0"/>
+              <a:t>5.1.2 Web Scrapping: </a:t>
+            </a:r>
+          </a:p>
+          <a:p>
+            <a:r>
+              <a:rPr lang="en-US" dirty="0"/>
+              <a:t>5.1.3 User’s Data / Job’s Comparison: </a:t>
+            </a:r>
+          </a:p>
+          <a:p>
+            <a:r>
+              <a:rPr lang="en-US" dirty="0"/>
+              <a:t>5.1.4 K-Means Clustering Algorithm for Segmentation: </a:t>
+            </a:r>
+          </a:p>
+          <a:p>
+            <a:r>
+              <a:rPr lang="en-US" dirty="0"/>
+              <a:t> </a:t>
+            </a:r>
           </a:p>
         </p:txBody>
       </p:sp>
       <p:pic>
         <p:nvPicPr>
-          <p:cNvPr id="18436" name="Content Placeholder 5" descr="commpen.jpg"/>
+          <p:cNvPr id="12" name="Picture 11">
+            <a:extLst>
+              <a:ext uri="{FF2B5EF4-FFF2-40B4-BE49-F238E27FC236}">
+                <a16:creationId xmlns:a16="http://schemas.microsoft.com/office/drawing/2014/main" id="{3BA1B326-3B70-67AA-16BE-42A037D84957}"/>
+              </a:ext>
+            </a:extLst>
+          </p:cNvPr>
           <p:cNvPicPr>
-            <a:picLocks noGrp="1" noChangeAspect="1"/>
+            <a:picLocks noChangeAspect="1"/>
           </p:cNvPicPr>
-          <p:nvPr>
-            <p:ph sz="half" idx="2"/>
-          </p:nvPr>
+          <p:nvPr/>
         </p:nvPicPr>
         <p:blipFill>
-          <a:blip r:embed="rId2" cstate="print"/>
-          <a:srcRect/>
+          <a:blip r:embed="rId2">
+            <a:extLst>
+              <a:ext uri="{28A0092B-C50C-407E-A947-70E740481C1C}">
+                <a14:useLocalDpi xmlns:a14="http://schemas.microsoft.com/office/drawing/2010/main" val="0"/>
+              </a:ext>
+            </a:extLst>
+          </a:blip>
           <a:stretch>
             <a:fillRect/>
           </a:stretch>
         </p:blipFill>
         <p:spPr>
           <a:xfrm>
-            <a:off x="6629400" y="1828800"/>
-            <a:ext cx="2667000" cy="3962400"/>
+            <a:off x="3271135" y="3876206"/>
+            <a:ext cx="5314950" cy="2133600"/>
           </a:xfrm>
+          <a:prstGeom prst="rect">
+            <a:avLst/>
+          </a:prstGeom>
         </p:spPr>
       </p:pic>
     </p:spTree>
@@ -8559,168 +8513,72 @@
       </p:grpSpPr>
       <p:sp>
         <p:nvSpPr>
-          <p:cNvPr id="19458" name="Title 1"/>
-          <p:cNvSpPr>
-            <a:spLocks noGrp="1"/>
-          </p:cNvSpPr>
-          <p:nvPr>
-            <p:ph type="title"/>
-          </p:nvPr>
+          <p:cNvPr id="8" name="TextBox 7">
+            <a:extLst>
+              <a:ext uri="{FF2B5EF4-FFF2-40B4-BE49-F238E27FC236}">
+                <a16:creationId xmlns:a16="http://schemas.microsoft.com/office/drawing/2014/main" id="{7ABBA677-05FE-64BD-10BB-3070E75329C6}"/>
+              </a:ext>
+            </a:extLst>
+          </p:cNvPr>
+          <p:cNvSpPr txBox="1"/>
+          <p:nvPr/>
         </p:nvSpPr>
         <p:spPr>
           <a:xfrm>
-            <a:off x="2032001" y="228600"/>
-            <a:ext cx="8229600" cy="1066800"/>
+            <a:off x="0" y="194872"/>
+            <a:ext cx="12192000" cy="2031325"/>
           </a:xfrm>
-        </p:spPr>
-        <p:txBody>
-          <a:bodyPr>
-            <a:normAutofit fontScale="90000"/>
+          <a:prstGeom prst="rect">
+            <a:avLst/>
+          </a:prstGeom>
+          <a:noFill/>
+        </p:spPr>
+        <p:txBody>
+          <a:bodyPr wrap="square" rtlCol="0">
+            <a:spAutoFit/>
           </a:bodyPr>
           <a:lstStyle/>
           <a:p>
-            <a:pPr algn="ctr" eaLnBrk="1" hangingPunct="1"/>
-            <a:r>
-              <a:rPr lang="en-US" sz="4800" dirty="0">
-                <a:latin typeface="Times New Roman" pitchFamily="16" charset="0"/>
-                <a:cs typeface="Times New Roman" pitchFamily="16" charset="0"/>
-              </a:rPr>
-              <a:t>LED Projector</a:t>
-            </a:r>
-            <a:br>
-              <a:rPr lang="en-US" sz="4800" dirty="0">
-                <a:latin typeface="Times New Roman" pitchFamily="16" charset="0"/>
-                <a:cs typeface="Times New Roman" pitchFamily="16" charset="0"/>
-              </a:rPr>
-            </a:br>
-            <a:endParaRPr lang="en-US" sz="4800" dirty="0">
-              <a:latin typeface="Times New Roman" pitchFamily="16" charset="0"/>
-              <a:cs typeface="Times New Roman" pitchFamily="16" charset="0"/>
-            </a:endParaRPr>
-          </a:p>
-        </p:txBody>
-      </p:sp>
-      <p:sp>
-        <p:nvSpPr>
-          <p:cNvPr id="19459" name="Content Placeholder 2"/>
-          <p:cNvSpPr>
-            <a:spLocks noGrp="1"/>
-          </p:cNvSpPr>
-          <p:nvPr>
-            <p:ph sz="half" idx="1"/>
-          </p:nvPr>
-        </p:nvSpPr>
-        <p:spPr>
-          <a:xfrm>
-            <a:off x="2032001" y="1828800"/>
-            <a:ext cx="3138026" cy="3880772"/>
-          </a:xfrm>
-        </p:spPr>
-        <p:txBody>
-          <a:bodyPr/>
-          <a:lstStyle/>
-          <a:p>
-            <a:pPr eaLnBrk="1" hangingPunct="1"/>
-            <a:r>
-              <a:rPr lang="en-US" sz="2000" dirty="0">
-                <a:latin typeface="Times New Roman" pitchFamily="16" charset="0"/>
-                <a:cs typeface="Times New Roman" pitchFamily="16" charset="0"/>
-              </a:rPr>
-              <a:t>Monitor is LED Projector.</a:t>
-            </a:r>
-          </a:p>
-          <a:p>
-            <a:pPr eaLnBrk="1" hangingPunct="1">
-              <a:buFont typeface="Wingdings 3" pitchFamily="18" charset="2"/>
-              <a:buNone/>
+            <a:r>
+              <a:rPr lang="en-US" dirty="0"/>
+              <a:t>• Steps in K-Means algorithm: </a:t>
+            </a:r>
+          </a:p>
+          <a:p>
+            <a:pPr marL="342900" indent="-342900">
+              <a:buAutoNum type="arabicPeriod"/>
             </a:pPr>
-            <a:endParaRPr lang="en-US" sz="2000" dirty="0">
-              <a:latin typeface="Times New Roman" pitchFamily="16" charset="0"/>
-              <a:cs typeface="Times New Roman" pitchFamily="16" charset="0"/>
-            </a:endParaRPr>
-          </a:p>
-          <a:p>
-            <a:pPr eaLnBrk="1" hangingPunct="1"/>
-            <a:r>
-              <a:rPr lang="en-US" sz="2000" dirty="0">
-                <a:latin typeface="Times New Roman" pitchFamily="16" charset="0"/>
-                <a:cs typeface="Times New Roman" pitchFamily="16" charset="0"/>
-              </a:rPr>
-              <a:t>Size is A4.</a:t>
-            </a:r>
-          </a:p>
-          <a:p>
-            <a:pPr eaLnBrk="1" hangingPunct="1">
-              <a:buFont typeface="Wingdings 3" pitchFamily="18" charset="2"/>
-              <a:buNone/>
-            </a:pPr>
-            <a:endParaRPr lang="en-US" sz="2000" dirty="0">
-              <a:latin typeface="Times New Roman" pitchFamily="16" charset="0"/>
-              <a:cs typeface="Times New Roman" pitchFamily="16" charset="0"/>
-            </a:endParaRPr>
-          </a:p>
-          <a:p>
-            <a:pPr eaLnBrk="1" hangingPunct="1"/>
-            <a:r>
-              <a:rPr lang="en-US" sz="2000" dirty="0">
-                <a:latin typeface="Times New Roman" pitchFamily="16" charset="0"/>
-                <a:cs typeface="Times New Roman" pitchFamily="16" charset="0"/>
-              </a:rPr>
-              <a:t>Resolution capacity is1024x768 approx.</a:t>
-            </a:r>
-          </a:p>
-          <a:p>
-            <a:pPr eaLnBrk="1" hangingPunct="1"/>
-            <a:endParaRPr lang="en-US" sz="2000" dirty="0">
-              <a:latin typeface="Times New Roman" pitchFamily="16" charset="0"/>
-              <a:cs typeface="Times New Roman" pitchFamily="16" charset="0"/>
-            </a:endParaRPr>
-          </a:p>
-          <a:p>
-            <a:pPr eaLnBrk="1" hangingPunct="1"/>
-            <a:r>
-              <a:rPr lang="en-US" sz="2000" dirty="0">
-                <a:latin typeface="Times New Roman" pitchFamily="16" charset="0"/>
-                <a:cs typeface="Times New Roman" pitchFamily="16" charset="0"/>
-              </a:rPr>
-              <a:t>It gives more clarity and good picture.</a:t>
-            </a:r>
-          </a:p>
-          <a:p>
-            <a:pPr eaLnBrk="1" hangingPunct="1">
-              <a:buFont typeface="Wingdings 3" pitchFamily="18" charset="2"/>
-              <a:buNone/>
-            </a:pPr>
-            <a:endParaRPr lang="en-US" dirty="0">
-              <a:latin typeface="Times New Roman" pitchFamily="16" charset="0"/>
-              <a:cs typeface="Times New Roman" pitchFamily="16" charset="0"/>
-            </a:endParaRPr>
-          </a:p>
-        </p:txBody>
-      </p:sp>
-      <p:pic>
-        <p:nvPicPr>
-          <p:cNvPr id="19460" name="Content Placeholder 7" descr="pen-computer-4.jpg"/>
-          <p:cNvPicPr>
-            <a:picLocks noGrp="1" noChangeAspect="1"/>
-          </p:cNvPicPr>
-          <p:nvPr>
-            <p:ph sz="half" idx="2"/>
-          </p:nvPr>
-        </p:nvPicPr>
-        <p:blipFill>
-          <a:blip r:embed="rId3" cstate="print"/>
-          <a:stretch>
-            <a:fillRect/>
-          </a:stretch>
-        </p:blipFill>
-        <p:spPr>
-          <a:xfrm>
-            <a:off x="6146801" y="2667000"/>
-            <a:ext cx="3136900" cy="2403856"/>
-          </a:xfrm>
-        </p:spPr>
-      </p:pic>
+            <a:r>
+              <a:rPr lang="en-US" dirty="0"/>
+              <a:t>Choose the number of clusters K. </a:t>
+            </a:r>
+          </a:p>
+          <a:p>
+            <a:r>
+              <a:rPr lang="en-US" dirty="0"/>
+              <a:t>2. Select at random K points, the centroids (not necessarily from your dataset). </a:t>
+            </a:r>
+          </a:p>
+          <a:p>
+            <a:r>
+              <a:rPr lang="en-US" dirty="0"/>
+              <a:t>3. Assign each data point to the closest centroid → that forms K clusters. </a:t>
+            </a:r>
+          </a:p>
+          <a:p>
+            <a:r>
+              <a:rPr lang="en-US" dirty="0"/>
+              <a:t>4. Compute and place the new centroid of each cluster. </a:t>
+            </a:r>
+          </a:p>
+          <a:p>
+            <a:r>
+              <a:rPr lang="en-US" dirty="0"/>
+              <a:t>5. Reassign each data point to the new closest centroid. If any reassignment took place, go to step 4, otherwise, the model is ready. </a:t>
+            </a:r>
+          </a:p>
+        </p:txBody>
+      </p:sp>
     </p:spTree>
     <p:extLst>
       <p:ext uri="{BB962C8B-B14F-4D97-AF65-F5344CB8AC3E}">
@@ -8753,147 +8611,72 @@
       </p:grpSpPr>
       <p:sp>
         <p:nvSpPr>
-          <p:cNvPr id="20482" name="Title 1"/>
-          <p:cNvSpPr>
-            <a:spLocks noGrp="1"/>
-          </p:cNvSpPr>
-          <p:nvPr>
-            <p:ph type="title"/>
-          </p:nvPr>
+          <p:cNvPr id="7" name="TextBox 6">
+            <a:extLst>
+              <a:ext uri="{FF2B5EF4-FFF2-40B4-BE49-F238E27FC236}">
+                <a16:creationId xmlns:a16="http://schemas.microsoft.com/office/drawing/2014/main" id="{AFA8F3C9-BA5A-3910-C716-9B742DDF0BF1}"/>
+              </a:ext>
+            </a:extLst>
+          </p:cNvPr>
+          <p:cNvSpPr txBox="1"/>
+          <p:nvPr/>
         </p:nvSpPr>
         <p:spPr>
           <a:xfrm>
-            <a:off x="1828800" y="228600"/>
-            <a:ext cx="8229600" cy="1143000"/>
+            <a:off x="359764" y="179882"/>
+            <a:ext cx="11497456" cy="2031325"/>
           </a:xfrm>
-        </p:spPr>
-        <p:txBody>
-          <a:bodyPr/>
-          <a:lstStyle/>
-          <a:p>
-            <a:pPr algn="ctr" eaLnBrk="1" hangingPunct="1"/>
-            <a:r>
-              <a:rPr lang="en-US" sz="4800" dirty="0">
-                <a:latin typeface="Times New Roman" pitchFamily="16" charset="0"/>
-                <a:cs typeface="Times New Roman" pitchFamily="16" charset="0"/>
-              </a:rPr>
-              <a:t>Virtual Keyboard</a:t>
-            </a:r>
-          </a:p>
-        </p:txBody>
-      </p:sp>
-      <p:sp>
-        <p:nvSpPr>
-          <p:cNvPr id="20483" name="Content Placeholder 2"/>
-          <p:cNvSpPr>
-            <a:spLocks noGrp="1"/>
-          </p:cNvSpPr>
-          <p:nvPr>
-            <p:ph sz="half" idx="1"/>
-          </p:nvPr>
-        </p:nvSpPr>
-        <p:spPr>
-          <a:xfrm>
-            <a:off x="1981200" y="1905001"/>
-            <a:ext cx="4038600" cy="4435475"/>
-          </a:xfrm>
-        </p:spPr>
-        <p:txBody>
-          <a:bodyPr/>
-          <a:lstStyle/>
-          <a:p>
-            <a:pPr eaLnBrk="1" hangingPunct="1"/>
-            <a:r>
-              <a:rPr lang="en-US" sz="2400">
-                <a:latin typeface="Times New Roman" pitchFamily="16" charset="0"/>
-                <a:cs typeface="Times New Roman" pitchFamily="16" charset="0"/>
-              </a:rPr>
-              <a:t>Virtual laser keyboard is a new gadget.</a:t>
-            </a:r>
-          </a:p>
-          <a:p>
-            <a:pPr eaLnBrk="1" hangingPunct="1">
-              <a:buFont typeface="Wingdings 3" pitchFamily="18" charset="2"/>
-              <a:buNone/>
+          <a:prstGeom prst="rect">
+            <a:avLst/>
+          </a:prstGeom>
+          <a:noFill/>
+        </p:spPr>
+        <p:txBody>
+          <a:bodyPr wrap="square" rtlCol="0">
+            <a:spAutoFit/>
+          </a:bodyPr>
+          <a:lstStyle/>
+          <a:p>
+            <a:r>
+              <a:rPr lang="en-US" dirty="0"/>
+              <a:t>• Key Features of k-means Clustering Algorithm: </a:t>
+            </a:r>
+          </a:p>
+          <a:p>
+            <a:pPr marL="342900" indent="-342900">
+              <a:buAutoNum type="arabicPeriod"/>
             </a:pPr>
-            <a:endParaRPr lang="en-US" sz="2400">
-              <a:latin typeface="Times New Roman" pitchFamily="16" charset="0"/>
-              <a:cs typeface="Times New Roman" pitchFamily="16" charset="0"/>
-            </a:endParaRPr>
-          </a:p>
-          <a:p>
-            <a:pPr eaLnBrk="1" hangingPunct="1"/>
-            <a:r>
-              <a:rPr lang="en-US" sz="2400">
-                <a:latin typeface="Times New Roman" pitchFamily="16" charset="0"/>
-                <a:cs typeface="Times New Roman" pitchFamily="16" charset="0"/>
-              </a:rPr>
-              <a:t>It emits laser on desk.</a:t>
-            </a:r>
-          </a:p>
-          <a:p>
-            <a:pPr eaLnBrk="1" hangingPunct="1">
-              <a:buFont typeface="Wingdings 3" pitchFamily="18" charset="2"/>
-              <a:buNone/>
-            </a:pPr>
-            <a:endParaRPr lang="en-US" sz="2400">
-              <a:latin typeface="Times New Roman" pitchFamily="16" charset="0"/>
-              <a:cs typeface="Times New Roman" pitchFamily="16" charset="0"/>
-            </a:endParaRPr>
-          </a:p>
-          <a:p>
-            <a:pPr eaLnBrk="1" hangingPunct="1"/>
-            <a:r>
-              <a:rPr lang="en-US" sz="2400">
-                <a:latin typeface="Times New Roman" pitchFamily="16" charset="0"/>
-                <a:cs typeface="Times New Roman" pitchFamily="16" charset="0"/>
-              </a:rPr>
-              <a:t>Uses laser beam to generate full-size  perfect keyboard</a:t>
-            </a:r>
-            <a:r>
-              <a:rPr lang="en-US" sz="2400"/>
-              <a:t>.</a:t>
-            </a:r>
-          </a:p>
-          <a:p>
-            <a:pPr eaLnBrk="1" hangingPunct="1">
-              <a:buFont typeface="Wingdings 3" pitchFamily="18" charset="2"/>
-              <a:buNone/>
-            </a:pPr>
-            <a:endParaRPr lang="en-US" sz="2400"/>
-          </a:p>
-          <a:p>
-            <a:pPr eaLnBrk="1" hangingPunct="1"/>
-            <a:r>
-              <a:rPr lang="en-US" sz="2400"/>
-              <a:t>VKB settings can be changed. </a:t>
-            </a:r>
-          </a:p>
-        </p:txBody>
-      </p:sp>
-      <p:pic>
-        <p:nvPicPr>
-          <p:cNvPr id="20484" name="Content Placeholder 4" descr="pen-computer-5.jpg"/>
-          <p:cNvPicPr>
-            <a:picLocks noGrp="1" noChangeAspect="1"/>
-          </p:cNvPicPr>
-          <p:nvPr>
-            <p:ph sz="half" idx="2"/>
-          </p:nvPr>
-        </p:nvPicPr>
-        <p:blipFill>
-          <a:blip r:embed="rId3" cstate="print"/>
-          <a:stretch>
-            <a:fillRect/>
-          </a:stretch>
-        </p:blipFill>
-        <p:spPr>
-          <a:xfrm>
-            <a:off x="6248400" y="2362200"/>
-            <a:ext cx="3136900" cy="2674620"/>
-          </a:xfrm>
-        </p:spPr>
-      </p:pic>
+            <a:r>
+              <a:rPr lang="en-US" dirty="0"/>
+              <a:t>It is very smooth in terms of interpretation and resolution. </a:t>
+            </a:r>
+          </a:p>
+          <a:p>
+            <a:r>
+              <a:rPr lang="en-US" dirty="0"/>
+              <a:t>2. For a large number of variables present in the dataset, K-means operates quicker than Hierarchical clustering. </a:t>
+            </a:r>
+          </a:p>
+          <a:p>
+            <a:r>
+              <a:rPr lang="en-US" dirty="0"/>
+              <a:t>3. While re-determining the cluster center, an instance can modify the cluster. </a:t>
+            </a:r>
+          </a:p>
+          <a:p>
+            <a:r>
+              <a:rPr lang="en-US" dirty="0"/>
+              <a:t>4. K-means reforms compact clusters. </a:t>
+            </a:r>
+          </a:p>
+          <a:p>
+            <a:r>
+              <a:rPr lang="en-US" dirty="0"/>
+              <a:t>5. It can work on unlabeled numerical data. </a:t>
+            </a:r>
+          </a:p>
+        </p:txBody>
+      </p:sp>
     </p:spTree>
     <p:extLst>
       <p:ext uri="{BB962C8B-B14F-4D97-AF65-F5344CB8AC3E}">
@@ -8926,121 +8709,72 @@
       </p:grpSpPr>
       <p:sp>
         <p:nvSpPr>
-          <p:cNvPr id="21506" name="Title 1"/>
-          <p:cNvSpPr>
-            <a:spLocks noGrp="1"/>
-          </p:cNvSpPr>
-          <p:nvPr>
-            <p:ph type="title"/>
-          </p:nvPr>
+          <p:cNvPr id="9" name="TextBox 8">
+            <a:extLst>
+              <a:ext uri="{FF2B5EF4-FFF2-40B4-BE49-F238E27FC236}">
+                <a16:creationId xmlns:a16="http://schemas.microsoft.com/office/drawing/2014/main" id="{F29A5715-52F9-E83E-FDC7-B906BF2F191F}"/>
+              </a:ext>
+            </a:extLst>
+          </p:cNvPr>
+          <p:cNvSpPr txBox="1"/>
+          <p:nvPr/>
         </p:nvSpPr>
         <p:spPr>
           <a:xfrm>
-            <a:off x="1997299" y="228600"/>
-            <a:ext cx="8229600" cy="1143000"/>
+            <a:off x="389744" y="269823"/>
+            <a:ext cx="11437495" cy="2031325"/>
           </a:xfrm>
-        </p:spPr>
-        <p:txBody>
-          <a:bodyPr/>
-          <a:lstStyle/>
-          <a:p>
-            <a:pPr algn="ctr" eaLnBrk="1" hangingPunct="1"/>
-            <a:r>
-              <a:rPr lang="en-US" sz="4800" dirty="0">
-                <a:latin typeface="Times New Roman" pitchFamily="16" charset="0"/>
-                <a:cs typeface="Times New Roman" pitchFamily="16" charset="0"/>
-              </a:rPr>
-              <a:t>Digital Camera</a:t>
-            </a:r>
-          </a:p>
-        </p:txBody>
-      </p:sp>
-      <p:sp>
-        <p:nvSpPr>
-          <p:cNvPr id="21507" name="Content Placeholder 2"/>
-          <p:cNvSpPr>
-            <a:spLocks noGrp="1"/>
-          </p:cNvSpPr>
-          <p:nvPr>
-            <p:ph sz="half" idx="1"/>
-          </p:nvPr>
-        </p:nvSpPr>
-        <p:spPr>
-          <a:xfrm>
-            <a:off x="1981200" y="1920876"/>
-            <a:ext cx="5105400" cy="3184525"/>
-          </a:xfrm>
-        </p:spPr>
-        <p:txBody>
-          <a:bodyPr>
-            <a:normAutofit/>
+          <a:prstGeom prst="rect">
+            <a:avLst/>
+          </a:prstGeom>
+          <a:noFill/>
+        </p:spPr>
+        <p:txBody>
+          <a:bodyPr wrap="square" rtlCol="0">
+            <a:spAutoFit/>
           </a:bodyPr>
           <a:lstStyle/>
           <a:p>
-            <a:pPr eaLnBrk="1" hangingPunct="1"/>
-            <a:r>
-              <a:rPr lang="en-US" sz="2400" dirty="0">
-                <a:latin typeface="Times New Roman" panose="02020603050405020304" pitchFamily="18" charset="0"/>
-                <a:cs typeface="Times New Roman" panose="02020603050405020304" pitchFamily="18" charset="0"/>
-              </a:rPr>
-              <a:t>It is useful in video recording , video conferencing simply as a webcam.</a:t>
-            </a:r>
-          </a:p>
-          <a:p>
-            <a:pPr eaLnBrk="1" hangingPunct="1"/>
-            <a:r>
-              <a:rPr lang="en-US" sz="2400" dirty="0">
-                <a:latin typeface="Times New Roman" panose="02020603050405020304" pitchFamily="18" charset="0"/>
-                <a:cs typeface="Times New Roman" panose="02020603050405020304" pitchFamily="18" charset="0"/>
-              </a:rPr>
-              <a:t>Connected with other devices.</a:t>
-            </a:r>
-          </a:p>
-          <a:p>
-            <a:pPr eaLnBrk="1" hangingPunct="1"/>
-            <a:r>
-              <a:rPr lang="en-US" sz="2400" dirty="0">
-                <a:latin typeface="Times New Roman" panose="02020603050405020304" pitchFamily="18" charset="0"/>
-                <a:cs typeface="Times New Roman" panose="02020603050405020304" pitchFamily="18" charset="0"/>
-              </a:rPr>
-              <a:t>portable.</a:t>
-            </a:r>
-          </a:p>
-          <a:p>
-            <a:pPr eaLnBrk="1" hangingPunct="1"/>
-            <a:r>
-              <a:rPr lang="en-US" sz="2400" dirty="0">
-                <a:latin typeface="Times New Roman" panose="02020603050405020304" pitchFamily="18" charset="0"/>
-                <a:cs typeface="Times New Roman" panose="02020603050405020304" pitchFamily="18" charset="0"/>
-              </a:rPr>
-              <a:t>360 degree visual communication device.</a:t>
-            </a:r>
-          </a:p>
-        </p:txBody>
-      </p:sp>
-      <p:pic>
-        <p:nvPicPr>
-          <p:cNvPr id="21508" name="Content Placeholder 4" descr="camera.jpg"/>
-          <p:cNvPicPr>
-            <a:picLocks noGrp="1" noChangeAspect="1"/>
-          </p:cNvPicPr>
-          <p:nvPr>
-            <p:ph sz="half" idx="2"/>
-          </p:nvPr>
-        </p:nvPicPr>
-        <p:blipFill>
-          <a:blip r:embed="rId3" cstate="print"/>
-          <a:stretch>
-            <a:fillRect/>
-          </a:stretch>
-        </p:blipFill>
-        <p:spPr>
-          <a:xfrm>
-            <a:off x="7086600" y="2315369"/>
-            <a:ext cx="1104900" cy="3644900"/>
-          </a:xfrm>
-        </p:spPr>
-      </p:pic>
+            <a:r>
+              <a:rPr lang="en-US" dirty="0"/>
+              <a:t>• Limitations with K-means: </a:t>
+            </a:r>
+          </a:p>
+          <a:p>
+            <a:pPr marL="342900" indent="-342900">
+              <a:buAutoNum type="arabicPeriod"/>
+            </a:pPr>
+            <a:r>
+              <a:rPr lang="en-US" dirty="0"/>
+              <a:t>Sometimes, it is quite tough to forecast the number of clusters, or the value of k. </a:t>
+            </a:r>
+          </a:p>
+          <a:p>
+            <a:r>
+              <a:rPr lang="en-US" dirty="0"/>
+              <a:t>2. The output is highly influenced by original input, for example, the number of clusters. </a:t>
+            </a:r>
+          </a:p>
+          <a:p>
+            <a:r>
+              <a:rPr lang="en-US" dirty="0"/>
+              <a:t>3. An array of data substantially hits the concluding outcomes. </a:t>
+            </a:r>
+          </a:p>
+          <a:p>
+            <a:r>
+              <a:rPr lang="en-US" dirty="0"/>
+              <a:t>4. In some cases, clusters show complex spatial views, then executing clustering is not a good choice. </a:t>
+            </a:r>
+          </a:p>
+          <a:p>
+            <a:r>
+              <a:rPr lang="en-US" dirty="0"/>
+              <a:t>5. Also, rescaling is sometimes conscious, it can’t be done by normalization or standardization of data points, the output gets changed entirely</a:t>
+            </a:r>
+          </a:p>
+        </p:txBody>
+      </p:sp>
     </p:spTree>
     <p:extLst>
       <p:ext uri="{BB962C8B-B14F-4D97-AF65-F5344CB8AC3E}">
@@ -9071,104 +8805,75 @@
           <a:chExt cx="0" cy="0"/>
         </a:xfrm>
       </p:grpSpPr>
-      <p:sp>
-        <p:nvSpPr>
-          <p:cNvPr id="22530" name="Title 1"/>
-          <p:cNvSpPr>
-            <a:spLocks noGrp="1"/>
-          </p:cNvSpPr>
-          <p:nvPr>
-            <p:ph type="title"/>
-          </p:nvPr>
-        </p:nvSpPr>
+      <p:pic>
+        <p:nvPicPr>
+          <p:cNvPr id="3" name="Picture 2">
+            <a:extLst>
+              <a:ext uri="{FF2B5EF4-FFF2-40B4-BE49-F238E27FC236}">
+                <a16:creationId xmlns:a16="http://schemas.microsoft.com/office/drawing/2014/main" id="{016C4F2E-C0F8-675F-CD31-A3CF3007E300}"/>
+              </a:ext>
+            </a:extLst>
+          </p:cNvPr>
+          <p:cNvPicPr>
+            <a:picLocks noChangeAspect="1"/>
+          </p:cNvPicPr>
+          <p:nvPr/>
+        </p:nvPicPr>
+        <p:blipFill>
+          <a:blip r:embed="rId3">
+            <a:extLst>
+              <a:ext uri="{28A0092B-C50C-407E-A947-70E740481C1C}">
+                <a14:useLocalDpi xmlns:a14="http://schemas.microsoft.com/office/drawing/2010/main" val="0"/>
+              </a:ext>
+            </a:extLst>
+          </a:blip>
+          <a:stretch>
+            <a:fillRect/>
+          </a:stretch>
+        </p:blipFill>
         <p:spPr>
           <a:xfrm>
-            <a:off x="1524000" y="152400"/>
-            <a:ext cx="8229600" cy="1143000"/>
+            <a:off x="1663908" y="1038225"/>
+            <a:ext cx="8019737" cy="4781550"/>
           </a:xfrm>
-        </p:spPr>
-        <p:txBody>
-          <a:bodyPr/>
-          <a:lstStyle/>
-          <a:p>
-            <a:pPr algn="ctr" eaLnBrk="1" hangingPunct="1"/>
-            <a:r>
-              <a:rPr lang="en-US" sz="4800" dirty="0">
-                <a:latin typeface="Times New Roman" pitchFamily="16" charset="0"/>
-                <a:cs typeface="Times New Roman" pitchFamily="16" charset="0"/>
-              </a:rPr>
-              <a:t>Battery</a:t>
-            </a:r>
-          </a:p>
-        </p:txBody>
-      </p:sp>
-      <p:sp>
-        <p:nvSpPr>
-          <p:cNvPr id="22531" name="Content Placeholder 4"/>
-          <p:cNvSpPr>
-            <a:spLocks noGrp="1"/>
-          </p:cNvSpPr>
-          <p:nvPr>
-            <p:ph idx="1"/>
-          </p:nvPr>
+          <a:prstGeom prst="rect">
+            <a:avLst/>
+          </a:prstGeom>
+        </p:spPr>
+      </p:pic>
+      <p:sp>
+        <p:nvSpPr>
+          <p:cNvPr id="4" name="TextBox 3">
+            <a:extLst>
+              <a:ext uri="{FF2B5EF4-FFF2-40B4-BE49-F238E27FC236}">
+                <a16:creationId xmlns:a16="http://schemas.microsoft.com/office/drawing/2014/main" id="{7AFC352C-A768-C2CB-148B-ACE889D0D983}"/>
+              </a:ext>
+            </a:extLst>
+          </p:cNvPr>
+          <p:cNvSpPr txBox="1"/>
+          <p:nvPr/>
         </p:nvSpPr>
         <p:spPr>
           <a:xfrm>
-            <a:off x="1905000" y="1524001"/>
-            <a:ext cx="8153400" cy="4937125"/>
+            <a:off x="1948721" y="5996066"/>
+            <a:ext cx="8274571" cy="369332"/>
           </a:xfrm>
-        </p:spPr>
-        <p:txBody>
-          <a:bodyPr>
-            <a:normAutofit/>
+          <a:prstGeom prst="rect">
+            <a:avLst/>
+          </a:prstGeom>
+          <a:noFill/>
+        </p:spPr>
+        <p:txBody>
+          <a:bodyPr wrap="square" rtlCol="0">
+            <a:spAutoFit/>
           </a:bodyPr>
           <a:lstStyle/>
           <a:p>
-            <a:pPr eaLnBrk="1" hangingPunct="1"/>
-            <a:r>
-              <a:rPr lang="en-US" sz="2600" dirty="0">
-                <a:latin typeface="Times New Roman" pitchFamily="16" charset="0"/>
-                <a:cs typeface="Times New Roman" pitchFamily="16" charset="0"/>
-              </a:rPr>
-              <a:t>It is the most important part in the portable type of computers.</a:t>
-            </a:r>
-          </a:p>
-          <a:p>
-            <a:pPr eaLnBrk="1" hangingPunct="1"/>
-            <a:r>
-              <a:rPr lang="en-US" sz="2600" dirty="0">
-                <a:latin typeface="Times New Roman" pitchFamily="16" charset="0"/>
-                <a:cs typeface="Times New Roman" pitchFamily="16" charset="0"/>
-              </a:rPr>
-              <a:t>Usually batteries are small in size and work for a long time.</a:t>
-            </a:r>
-          </a:p>
-          <a:p>
-            <a:pPr eaLnBrk="1" hangingPunct="1"/>
-            <a:r>
-              <a:rPr lang="en-US" sz="2600" dirty="0">
-                <a:latin typeface="Times New Roman" pitchFamily="16" charset="0"/>
-                <a:cs typeface="Times New Roman" pitchFamily="16" charset="0"/>
-              </a:rPr>
-              <a:t>It comes with a battery life of 6+ (i.e. 6 days).</a:t>
-            </a:r>
-          </a:p>
-          <a:p>
-            <a:pPr eaLnBrk="1" hangingPunct="1"/>
-            <a:r>
-              <a:rPr lang="en-US" sz="2600" dirty="0">
-                <a:latin typeface="Times New Roman" pitchFamily="16" charset="0"/>
-                <a:cs typeface="Times New Roman" pitchFamily="16" charset="0"/>
-              </a:rPr>
-              <a:t>For normal use it can be used for 2 weeks.</a:t>
-            </a:r>
-          </a:p>
-          <a:p>
-            <a:pPr eaLnBrk="1" hangingPunct="1">
-              <a:buFont typeface="Wingdings 3" pitchFamily="18" charset="2"/>
-              <a:buNone/>
-            </a:pPr>
-            <a:endParaRPr lang="en-US" sz="2600" dirty="0"/>
+            <a:pPr algn="ctr"/>
+            <a:r>
+              <a:rPr lang="en-US" dirty="0"/>
+              <a:t>Entity Relationship Diagram</a:t>
+            </a:r>
           </a:p>
         </p:txBody>
       </p:sp>
@@ -9204,93 +8909,182 @@
       </p:grpSpPr>
       <p:sp>
         <p:nvSpPr>
-          <p:cNvPr id="23554" name="Title 1"/>
-          <p:cNvSpPr>
-            <a:spLocks noGrp="1"/>
-          </p:cNvSpPr>
-          <p:nvPr>
-            <p:ph type="title"/>
-          </p:nvPr>
+          <p:cNvPr id="2" name="TextBox 1">
+            <a:extLst>
+              <a:ext uri="{FF2B5EF4-FFF2-40B4-BE49-F238E27FC236}">
+                <a16:creationId xmlns:a16="http://schemas.microsoft.com/office/drawing/2014/main" id="{ADD435ED-8FF1-9CF6-A024-E65A80498042}"/>
+              </a:ext>
+            </a:extLst>
+          </p:cNvPr>
+          <p:cNvSpPr txBox="1"/>
+          <p:nvPr/>
         </p:nvSpPr>
         <p:spPr>
           <a:xfrm>
-            <a:off x="3024650" y="457200"/>
-            <a:ext cx="6447501" cy="1320800"/>
+            <a:off x="134911" y="0"/>
+            <a:ext cx="11872210" cy="369332"/>
           </a:xfrm>
-        </p:spPr>
-        <p:txBody>
-          <a:bodyPr/>
-          <a:lstStyle/>
-          <a:p>
-            <a:pPr eaLnBrk="1" hangingPunct="1"/>
-            <a:r>
-              <a:rPr lang="en-US" sz="4000" dirty="0"/>
-              <a:t>How it takes input</a:t>
-            </a:r>
-          </a:p>
-        </p:txBody>
-      </p:sp>
-      <p:sp>
-        <p:nvSpPr>
-          <p:cNvPr id="3" name="Content Placeholder 2"/>
-          <p:cNvSpPr>
-            <a:spLocks noGrp="1"/>
-          </p:cNvSpPr>
-          <p:nvPr>
-            <p:ph idx="1"/>
-          </p:nvPr>
-        </p:nvSpPr>
+          <a:prstGeom prst="rect">
+            <a:avLst/>
+          </a:prstGeom>
+          <a:noFill/>
+        </p:spPr>
+        <p:txBody>
+          <a:bodyPr wrap="square" rtlCol="0">
+            <a:spAutoFit/>
+          </a:bodyPr>
+          <a:lstStyle/>
+          <a:p>
+            <a:pPr algn="ctr"/>
+            <a:r>
+              <a:rPr lang="en-US" dirty="0"/>
+              <a:t>RESULT </a:t>
+            </a:r>
+          </a:p>
+        </p:txBody>
+      </p:sp>
+      <p:pic>
+        <p:nvPicPr>
+          <p:cNvPr id="5" name="Picture 4">
+            <a:extLst>
+              <a:ext uri="{FF2B5EF4-FFF2-40B4-BE49-F238E27FC236}">
+                <a16:creationId xmlns:a16="http://schemas.microsoft.com/office/drawing/2014/main" id="{00EDE5CE-012F-6418-BC73-71D4026B8964}"/>
+              </a:ext>
+            </a:extLst>
+          </p:cNvPr>
+          <p:cNvPicPr>
+            <a:picLocks noChangeAspect="1"/>
+          </p:cNvPicPr>
+          <p:nvPr/>
+        </p:nvPicPr>
+        <p:blipFill>
+          <a:blip r:embed="rId2">
+            <a:extLst>
+              <a:ext uri="{28A0092B-C50C-407E-A947-70E740481C1C}">
+                <a14:useLocalDpi xmlns:a14="http://schemas.microsoft.com/office/drawing/2010/main" val="0"/>
+              </a:ext>
+            </a:extLst>
+          </a:blip>
+          <a:stretch>
+            <a:fillRect/>
+          </a:stretch>
+        </p:blipFill>
         <p:spPr>
           <a:xfrm>
-            <a:off x="2133600" y="1965817"/>
-            <a:ext cx="8229600" cy="1996583"/>
+            <a:off x="0" y="719527"/>
+            <a:ext cx="6096000" cy="4532851"/>
           </a:xfrm>
-        </p:spPr>
-        <p:txBody>
-          <a:bodyPr>
-            <a:noAutofit/>
+          <a:prstGeom prst="rect">
+            <a:avLst/>
+          </a:prstGeom>
+        </p:spPr>
+      </p:pic>
+      <p:pic>
+        <p:nvPicPr>
+          <p:cNvPr id="7" name="Picture 6">
+            <a:extLst>
+              <a:ext uri="{FF2B5EF4-FFF2-40B4-BE49-F238E27FC236}">
+                <a16:creationId xmlns:a16="http://schemas.microsoft.com/office/drawing/2014/main" id="{5A759EB7-D327-73A1-0E61-D2B66C5B942A}"/>
+              </a:ext>
+            </a:extLst>
+          </p:cNvPr>
+          <p:cNvPicPr>
+            <a:picLocks noChangeAspect="1"/>
+          </p:cNvPicPr>
+          <p:nvPr/>
+        </p:nvPicPr>
+        <p:blipFill>
+          <a:blip r:embed="rId3">
+            <a:extLst>
+              <a:ext uri="{28A0092B-C50C-407E-A947-70E740481C1C}">
+                <a14:useLocalDpi xmlns:a14="http://schemas.microsoft.com/office/drawing/2010/main" val="0"/>
+              </a:ext>
+            </a:extLst>
+          </a:blip>
+          <a:stretch>
+            <a:fillRect/>
+          </a:stretch>
+        </p:blipFill>
+        <p:spPr>
+          <a:xfrm>
+            <a:off x="6280878" y="719527"/>
+            <a:ext cx="5911121" cy="4532851"/>
+          </a:xfrm>
+          <a:prstGeom prst="rect">
+            <a:avLst/>
+          </a:prstGeom>
+        </p:spPr>
+      </p:pic>
+      <p:sp>
+        <p:nvSpPr>
+          <p:cNvPr id="8" name="TextBox 7">
+            <a:extLst>
+              <a:ext uri="{FF2B5EF4-FFF2-40B4-BE49-F238E27FC236}">
+                <a16:creationId xmlns:a16="http://schemas.microsoft.com/office/drawing/2014/main" id="{12D6D0A1-D195-B2DE-26FD-020EF7E10799}"/>
+              </a:ext>
+            </a:extLst>
+          </p:cNvPr>
+          <p:cNvSpPr txBox="1"/>
+          <p:nvPr/>
+        </p:nvSpPr>
+        <p:spPr>
+          <a:xfrm>
+            <a:off x="134911" y="5456420"/>
+            <a:ext cx="5961089" cy="369332"/>
+          </a:xfrm>
+          <a:prstGeom prst="rect">
+            <a:avLst/>
+          </a:prstGeom>
+          <a:noFill/>
+        </p:spPr>
+        <p:txBody>
+          <a:bodyPr wrap="square" rtlCol="0">
+            <a:spAutoFit/>
           </a:bodyPr>
           <a:lstStyle/>
           <a:p>
-            <a:pPr marL="274320" indent="-274320">
-              <a:buNone/>
-              <a:defRPr/>
-            </a:pPr>
-            <a:r>
-              <a:rPr lang="en-US" sz="2600" dirty="0">
-                <a:latin typeface="Times New Roman" panose="02020603050405020304" pitchFamily="18" charset="0"/>
-                <a:cs typeface="Times New Roman" panose="02020603050405020304" pitchFamily="18" charset="0"/>
-              </a:rPr>
-              <a:t>It has two methods for input</a:t>
-            </a:r>
-          </a:p>
-          <a:p>
-            <a:pPr marL="514350" indent="-514350">
-              <a:buFont typeface="Wingdings 3"/>
-              <a:buAutoNum type="arabicPeriod"/>
-              <a:defRPr/>
-            </a:pPr>
-            <a:r>
-              <a:rPr lang="en-US" sz="2600" dirty="0">
-                <a:latin typeface="Times New Roman" panose="02020603050405020304" pitchFamily="18" charset="0"/>
-                <a:cs typeface="Times New Roman" panose="02020603050405020304" pitchFamily="18" charset="0"/>
-              </a:rPr>
-              <a:t>With the virtual keyboard.</a:t>
-            </a:r>
-          </a:p>
-          <a:p>
-            <a:pPr marL="514350" indent="-514350">
-              <a:buFont typeface="Wingdings 3"/>
-              <a:buAutoNum type="arabicPeriod"/>
-              <a:defRPr/>
-            </a:pPr>
-            <a:r>
-              <a:rPr lang="en-US" sz="2600" dirty="0">
-                <a:latin typeface="Times New Roman" panose="02020603050405020304" pitchFamily="18" charset="0"/>
-                <a:cs typeface="Times New Roman" panose="02020603050405020304" pitchFamily="18" charset="0"/>
-              </a:rPr>
-              <a:t>With digital camera.</a:t>
-            </a:r>
+            <a:pPr algn="ctr"/>
+            <a:r>
+              <a:rPr lang="en-US" dirty="0"/>
+              <a:t>Login (User and Admin) </a:t>
+            </a:r>
+          </a:p>
+        </p:txBody>
+      </p:sp>
+      <p:sp>
+        <p:nvSpPr>
+          <p:cNvPr id="10" name="TextBox 9">
+            <a:extLst>
+              <a:ext uri="{FF2B5EF4-FFF2-40B4-BE49-F238E27FC236}">
+                <a16:creationId xmlns:a16="http://schemas.microsoft.com/office/drawing/2014/main" id="{D150375F-9E90-2939-DE09-D0B5F846ED00}"/>
+              </a:ext>
+            </a:extLst>
+          </p:cNvPr>
+          <p:cNvSpPr txBox="1"/>
+          <p:nvPr/>
+        </p:nvSpPr>
+        <p:spPr>
+          <a:xfrm>
+            <a:off x="6280878" y="5456420"/>
+            <a:ext cx="5911121" cy="369332"/>
+          </a:xfrm>
+          <a:prstGeom prst="rect">
+            <a:avLst/>
+          </a:prstGeom>
+          <a:noFill/>
+        </p:spPr>
+        <p:txBody>
+          <a:bodyPr wrap="square" rtlCol="0">
+            <a:spAutoFit/>
+          </a:bodyPr>
+          <a:lstStyle/>
+          <a:p>
+            <a:pPr algn="ctr"/>
+            <a:r>
+              <a:rPr lang="en-US"/>
+              <a:t>User Registration </a:t>
+            </a:r>
+            <a:endParaRPr lang="en-US" dirty="0"/>
           </a:p>
         </p:txBody>
       </p:sp>
@@ -9324,69 +9118,148 @@
           <a:chExt cx="0" cy="0"/>
         </a:xfrm>
       </p:grpSpPr>
-      <p:sp>
-        <p:nvSpPr>
-          <p:cNvPr id="2" name="Title 1"/>
-          <p:cNvSpPr>
-            <a:spLocks noGrp="1"/>
-          </p:cNvSpPr>
-          <p:nvPr>
-            <p:ph type="title"/>
-          </p:nvPr>
-        </p:nvSpPr>
-        <p:spPr>
-          <a:xfrm>
-            <a:off x="2286001" y="372772"/>
-            <a:ext cx="6447501" cy="1320800"/>
-          </a:xfrm>
-        </p:spPr>
-        <p:txBody>
-          <a:bodyPr>
-            <a:normAutofit/>
-          </a:bodyPr>
-          <a:lstStyle/>
-          <a:p>
-            <a:pPr>
-              <a:defRPr/>
-            </a:pPr>
-            <a:r>
-              <a:rPr lang="en-US" sz="3200" b="1" i="1" dirty="0"/>
-              <a:t>Connectivity 802.11B/G and Bluetooth</a:t>
-            </a:r>
-            <a:endParaRPr lang="en-US" sz="3200" dirty="0"/>
-          </a:p>
-        </p:txBody>
-      </p:sp>
       <p:pic>
         <p:nvPicPr>
-          <p:cNvPr id="25603" name="BLOGGER_PHOTO_ID_5188162530137773378" descr="http://2.bp.blogspot.com/_aLo580BGJNs/SAAOVUXalUI/AAAAAAAAADQ/Z3KhHysS7cc/s400/clip_image002.gif"/>
+          <p:cNvPr id="6" name="Picture 5">
+            <a:extLst>
+              <a:ext uri="{FF2B5EF4-FFF2-40B4-BE49-F238E27FC236}">
+                <a16:creationId xmlns:a16="http://schemas.microsoft.com/office/drawing/2014/main" id="{9608285B-07ED-EE0F-BB60-E4C35F23FC90}"/>
+              </a:ext>
+            </a:extLst>
+          </p:cNvPr>
           <p:cNvPicPr>
-            <a:picLocks noChangeAspect="1" noChangeArrowheads="1"/>
+            <a:picLocks noChangeAspect="1"/>
           </p:cNvPicPr>
           <p:nvPr/>
         </p:nvPicPr>
         <p:blipFill>
-          <a:blip r:embed="rId2" cstate="print"/>
-          <a:srcRect/>
+          <a:blip r:embed="rId2">
+            <a:extLst>
+              <a:ext uri="{28A0092B-C50C-407E-A947-70E740481C1C}">
+                <a14:useLocalDpi xmlns:a14="http://schemas.microsoft.com/office/drawing/2010/main" val="0"/>
+              </a:ext>
+            </a:extLst>
+          </a:blip>
           <a:stretch>
             <a:fillRect/>
           </a:stretch>
         </p:blipFill>
-        <p:spPr bwMode="auto">
+        <p:spPr>
           <a:xfrm>
-            <a:off x="2032001" y="1676400"/>
-            <a:ext cx="7848600" cy="4730750"/>
+            <a:off x="-1" y="466368"/>
+            <a:ext cx="6096001" cy="4795179"/>
+          </a:xfrm>
+          <a:prstGeom prst="rect">
+            <a:avLst/>
+          </a:prstGeom>
+        </p:spPr>
+      </p:pic>
+      <p:sp>
+        <p:nvSpPr>
+          <p:cNvPr id="9" name="TextBox 8">
+            <a:extLst>
+              <a:ext uri="{FF2B5EF4-FFF2-40B4-BE49-F238E27FC236}">
+                <a16:creationId xmlns:a16="http://schemas.microsoft.com/office/drawing/2014/main" id="{D61BF807-5E1A-426E-4832-BDABBCDF5E95}"/>
+              </a:ext>
+            </a:extLst>
+          </p:cNvPr>
+          <p:cNvSpPr txBox="1"/>
+          <p:nvPr/>
+        </p:nvSpPr>
+        <p:spPr>
+          <a:xfrm>
+            <a:off x="0" y="5576341"/>
+            <a:ext cx="6096000" cy="369332"/>
           </a:xfrm>
           <a:prstGeom prst="rect">
             <a:avLst/>
           </a:prstGeom>
           <a:noFill/>
-          <a:ln w="9525">
-            <a:noFill/>
-            <a:miter lim="800000"/>
-            <a:headEnd/>
-            <a:tailEnd/>
-          </a:ln>
+        </p:spPr>
+        <p:txBody>
+          <a:bodyPr wrap="square" rtlCol="0">
+            <a:spAutoFit/>
+          </a:bodyPr>
+          <a:lstStyle/>
+          <a:p>
+            <a:pPr algn="ctr"/>
+            <a:r>
+              <a:rPr lang="en-US" dirty="0"/>
+              <a:t>User Educational Details </a:t>
+            </a:r>
+          </a:p>
+        </p:txBody>
+      </p:sp>
+      <p:sp>
+        <p:nvSpPr>
+          <p:cNvPr id="10" name="TextBox 9">
+            <a:extLst>
+              <a:ext uri="{FF2B5EF4-FFF2-40B4-BE49-F238E27FC236}">
+                <a16:creationId xmlns:a16="http://schemas.microsoft.com/office/drawing/2014/main" id="{67328E18-203E-315D-5F7F-6C8DFD59E2E3}"/>
+              </a:ext>
+            </a:extLst>
+          </p:cNvPr>
+          <p:cNvSpPr txBox="1"/>
+          <p:nvPr/>
+        </p:nvSpPr>
+        <p:spPr>
+          <a:xfrm>
+            <a:off x="6220918" y="5576341"/>
+            <a:ext cx="5971082" cy="369332"/>
+          </a:xfrm>
+          <a:prstGeom prst="rect">
+            <a:avLst/>
+          </a:prstGeom>
+          <a:noFill/>
+        </p:spPr>
+        <p:txBody>
+          <a:bodyPr wrap="square" rtlCol="0">
+            <a:spAutoFit/>
+          </a:bodyPr>
+          <a:lstStyle/>
+          <a:p>
+            <a:pPr algn="ctr"/>
+            <a:r>
+              <a:rPr lang="en-US" dirty="0"/>
+              <a:t>Admin Registered Users </a:t>
+            </a:r>
+          </a:p>
+        </p:txBody>
+      </p:sp>
+      <p:pic>
+        <p:nvPicPr>
+          <p:cNvPr id="16" name="Picture 15">
+            <a:extLst>
+              <a:ext uri="{FF2B5EF4-FFF2-40B4-BE49-F238E27FC236}">
+                <a16:creationId xmlns:a16="http://schemas.microsoft.com/office/drawing/2014/main" id="{E6B2E619-6D8A-C731-07F0-0EE5A6748203}"/>
+              </a:ext>
+            </a:extLst>
+          </p:cNvPr>
+          <p:cNvPicPr>
+            <a:picLocks noChangeAspect="1"/>
+          </p:cNvPicPr>
+          <p:nvPr/>
+        </p:nvPicPr>
+        <p:blipFill>
+          <a:blip r:embed="rId3">
+            <a:extLst>
+              <a:ext uri="{28A0092B-C50C-407E-A947-70E740481C1C}">
+                <a14:useLocalDpi xmlns:a14="http://schemas.microsoft.com/office/drawing/2010/main" val="0"/>
+              </a:ext>
+            </a:extLst>
+          </a:blip>
+          <a:stretch>
+            <a:fillRect/>
+          </a:stretch>
+        </p:blipFill>
+        <p:spPr>
+          <a:xfrm>
+            <a:off x="6220916" y="466368"/>
+            <a:ext cx="5971083" cy="4795180"/>
+          </a:xfrm>
+          <a:prstGeom prst="rect">
+            <a:avLst/>
+          </a:prstGeom>
         </p:spPr>
       </p:pic>
     </p:spTree>
@@ -9419,130 +9292,147 @@
           <a:chExt cx="0" cy="0"/>
         </a:xfrm>
       </p:grpSpPr>
-      <p:sp>
-        <p:nvSpPr>
-          <p:cNvPr id="26626" name="Title 1"/>
-          <p:cNvSpPr>
-            <a:spLocks noGrp="1"/>
-          </p:cNvSpPr>
-          <p:nvPr>
-            <p:ph type="title"/>
-          </p:nvPr>
-        </p:nvSpPr>
+      <p:pic>
+        <p:nvPicPr>
+          <p:cNvPr id="7" name="Picture 6">
+            <a:extLst>
+              <a:ext uri="{FF2B5EF4-FFF2-40B4-BE49-F238E27FC236}">
+                <a16:creationId xmlns:a16="http://schemas.microsoft.com/office/drawing/2014/main" id="{388A9B88-5A38-4973-78BD-F7B45DF5CE89}"/>
+              </a:ext>
+            </a:extLst>
+          </p:cNvPr>
+          <p:cNvPicPr>
+            <a:picLocks noChangeAspect="1"/>
+          </p:cNvPicPr>
+          <p:nvPr/>
+        </p:nvPicPr>
+        <p:blipFill>
+          <a:blip r:embed="rId3">
+            <a:extLst>
+              <a:ext uri="{28A0092B-C50C-407E-A947-70E740481C1C}">
+                <a14:useLocalDpi xmlns:a14="http://schemas.microsoft.com/office/drawing/2010/main" val="0"/>
+              </a:ext>
+            </a:extLst>
+          </a:blip>
+          <a:stretch>
+            <a:fillRect/>
+          </a:stretch>
+        </p:blipFill>
         <p:spPr>
           <a:xfrm>
-            <a:off x="1544392" y="228600"/>
-            <a:ext cx="8229600" cy="1143000"/>
+            <a:off x="0" y="766172"/>
+            <a:ext cx="6096000" cy="4510366"/>
           </a:xfrm>
-        </p:spPr>
-        <p:txBody>
-          <a:bodyPr/>
-          <a:lstStyle/>
-          <a:p>
-            <a:pPr algn="ctr" eaLnBrk="1" hangingPunct="1"/>
-            <a:r>
-              <a:rPr lang="en-US" sz="4800" dirty="0">
-                <a:latin typeface="Times New Roman" pitchFamily="16" charset="0"/>
-                <a:cs typeface="Times New Roman" pitchFamily="16" charset="0"/>
-              </a:rPr>
-              <a:t>Merits</a:t>
-            </a:r>
-          </a:p>
-        </p:txBody>
-      </p:sp>
-      <p:sp>
-        <p:nvSpPr>
-          <p:cNvPr id="26627" name="Content Placeholder 2"/>
-          <p:cNvSpPr>
-            <a:spLocks noGrp="1"/>
-          </p:cNvSpPr>
-          <p:nvPr>
-            <p:ph idx="1"/>
-          </p:nvPr>
-        </p:nvSpPr>
+          <a:prstGeom prst="rect">
+            <a:avLst/>
+          </a:prstGeom>
+        </p:spPr>
+      </p:pic>
+      <p:pic>
+        <p:nvPicPr>
+          <p:cNvPr id="9" name="Picture 8">
+            <a:extLst>
+              <a:ext uri="{FF2B5EF4-FFF2-40B4-BE49-F238E27FC236}">
+                <a16:creationId xmlns:a16="http://schemas.microsoft.com/office/drawing/2014/main" id="{17E4DCC9-58A1-BFAA-A50B-BCF63889843B}"/>
+              </a:ext>
+            </a:extLst>
+          </p:cNvPr>
+          <p:cNvPicPr>
+            <a:picLocks noChangeAspect="1"/>
+          </p:cNvPicPr>
+          <p:nvPr/>
+        </p:nvPicPr>
+        <p:blipFill>
+          <a:blip r:embed="rId4">
+            <a:extLst>
+              <a:ext uri="{28A0092B-C50C-407E-A947-70E740481C1C}">
+                <a14:useLocalDpi xmlns:a14="http://schemas.microsoft.com/office/drawing/2010/main" val="0"/>
+              </a:ext>
+            </a:extLst>
+          </a:blip>
+          <a:stretch>
+            <a:fillRect/>
+          </a:stretch>
+        </p:blipFill>
         <p:spPr>
           <a:xfrm>
-            <a:off x="2057401" y="1752601"/>
-            <a:ext cx="6447501" cy="3880773"/>
+            <a:off x="6235908" y="766172"/>
+            <a:ext cx="5956092" cy="4510366"/>
           </a:xfrm>
-        </p:spPr>
-        <p:txBody>
-          <a:bodyPr/>
-          <a:lstStyle/>
-          <a:p>
-            <a:pPr eaLnBrk="1" hangingPunct="1">
-              <a:buFont typeface="Wingdings" charset="2"/>
-              <a:buChar char="Ø"/>
-            </a:pPr>
-            <a:r>
-              <a:rPr lang="en-US" dirty="0">
-                <a:latin typeface="Times New Roman" pitchFamily="16" charset="0"/>
-                <a:cs typeface="Times New Roman" pitchFamily="16" charset="0"/>
-              </a:rPr>
-              <a:t>Portable</a:t>
-            </a:r>
-          </a:p>
-          <a:p>
-            <a:pPr eaLnBrk="1" hangingPunct="1">
-              <a:buFont typeface="Wingdings" charset="2"/>
-              <a:buChar char="Ø"/>
-            </a:pPr>
-            <a:r>
-              <a:rPr lang="en-US" dirty="0">
-                <a:latin typeface="Times New Roman" pitchFamily="16" charset="0"/>
-                <a:cs typeface="Times New Roman" pitchFamily="16" charset="0"/>
-              </a:rPr>
-              <a:t>Feasible</a:t>
-            </a:r>
-          </a:p>
-          <a:p>
-            <a:pPr eaLnBrk="1" hangingPunct="1">
-              <a:buFont typeface="Wingdings" charset="2"/>
-              <a:buChar char="Ø"/>
-            </a:pPr>
-            <a:r>
-              <a:rPr lang="en-US" dirty="0">
-                <a:latin typeface="Times New Roman" pitchFamily="16" charset="0"/>
-                <a:cs typeface="Times New Roman" pitchFamily="16" charset="0"/>
-              </a:rPr>
-              <a:t>Ubiquitous computing is done</a:t>
-            </a:r>
-          </a:p>
-          <a:p>
-            <a:pPr eaLnBrk="1" hangingPunct="1">
-              <a:buFont typeface="Wingdings" charset="2"/>
-              <a:buChar char="Ø"/>
-            </a:pPr>
-            <a:r>
-              <a:rPr lang="en-US" dirty="0">
-                <a:latin typeface="Times New Roman" pitchFamily="16" charset="0"/>
-                <a:cs typeface="Times New Roman" pitchFamily="16" charset="0"/>
-              </a:rPr>
-              <a:t>Wi-Fi technology</a:t>
-            </a:r>
-          </a:p>
-          <a:p>
-            <a:pPr eaLnBrk="1" hangingPunct="1">
-              <a:buFont typeface="Wingdings" charset="2"/>
-              <a:buChar char="Ø"/>
-            </a:pPr>
-            <a:r>
-              <a:rPr lang="en-US" dirty="0">
-                <a:latin typeface="Times New Roman" pitchFamily="16" charset="0"/>
-                <a:cs typeface="Times New Roman" pitchFamily="16" charset="0"/>
-              </a:rPr>
-              <a:t>Pens produces both the monitor as well as the keyboard on any flat surfaces from where you can carry out functions.</a:t>
-            </a:r>
-          </a:p>
-          <a:p>
-            <a:pPr eaLnBrk="1" hangingPunct="1">
-              <a:buFont typeface="Wingdings" charset="2"/>
-              <a:buChar char="Ø"/>
-            </a:pPr>
-            <a:endParaRPr lang="en-US" dirty="0">
-              <a:latin typeface="Times New Roman" pitchFamily="16" charset="0"/>
-              <a:cs typeface="Times New Roman" pitchFamily="16" charset="0"/>
-            </a:endParaRPr>
+          <a:prstGeom prst="rect">
+            <a:avLst/>
+          </a:prstGeom>
+        </p:spPr>
+      </p:pic>
+      <p:sp>
+        <p:nvSpPr>
+          <p:cNvPr id="10" name="TextBox 9">
+            <a:extLst>
+              <a:ext uri="{FF2B5EF4-FFF2-40B4-BE49-F238E27FC236}">
+                <a16:creationId xmlns:a16="http://schemas.microsoft.com/office/drawing/2014/main" id="{392E17FA-EA18-9A0D-88E6-0A17C26B2D54}"/>
+              </a:ext>
+            </a:extLst>
+          </p:cNvPr>
+          <p:cNvSpPr txBox="1"/>
+          <p:nvPr/>
+        </p:nvSpPr>
+        <p:spPr>
+          <a:xfrm>
+            <a:off x="0" y="5651292"/>
+            <a:ext cx="6096000" cy="369332"/>
+          </a:xfrm>
+          <a:prstGeom prst="rect">
+            <a:avLst/>
+          </a:prstGeom>
+          <a:noFill/>
+        </p:spPr>
+        <p:txBody>
+          <a:bodyPr wrap="square" rtlCol="0">
+            <a:spAutoFit/>
+          </a:bodyPr>
+          <a:lstStyle/>
+          <a:p>
+            <a:pPr algn="ctr"/>
+            <a:r>
+              <a:rPr lang="en-US" dirty="0"/>
+              <a:t>Admin Jobs Registration</a:t>
+            </a:r>
+          </a:p>
+        </p:txBody>
+      </p:sp>
+      <p:sp>
+        <p:nvSpPr>
+          <p:cNvPr id="11" name="TextBox 10">
+            <a:extLst>
+              <a:ext uri="{FF2B5EF4-FFF2-40B4-BE49-F238E27FC236}">
+                <a16:creationId xmlns:a16="http://schemas.microsoft.com/office/drawing/2014/main" id="{A9E26A33-C39F-EE4D-111B-5316DB21687B}"/>
+              </a:ext>
+            </a:extLst>
+          </p:cNvPr>
+          <p:cNvSpPr txBox="1"/>
+          <p:nvPr/>
+        </p:nvSpPr>
+        <p:spPr>
+          <a:xfrm>
+            <a:off x="6235908" y="5651292"/>
+            <a:ext cx="5956092" cy="369332"/>
+          </a:xfrm>
+          <a:prstGeom prst="rect">
+            <a:avLst/>
+          </a:prstGeom>
+          <a:noFill/>
+        </p:spPr>
+        <p:txBody>
+          <a:bodyPr wrap="square" rtlCol="0">
+            <a:spAutoFit/>
+          </a:bodyPr>
+          <a:lstStyle/>
+          <a:p>
+            <a:pPr algn="ctr"/>
+            <a:r>
+              <a:rPr lang="en-US" dirty="0"/>
+              <a:t>Admin Registered Jobs</a:t>
+            </a:r>
           </a:p>
         </p:txBody>
       </p:sp>
@@ -9576,127 +9466,74 @@
           <a:chExt cx="0" cy="0"/>
         </a:xfrm>
       </p:grpSpPr>
-      <p:sp>
-        <p:nvSpPr>
-          <p:cNvPr id="27650" name="Title 1"/>
-          <p:cNvSpPr>
-            <a:spLocks noGrp="1"/>
-          </p:cNvSpPr>
-          <p:nvPr>
-            <p:ph type="title"/>
-          </p:nvPr>
-        </p:nvSpPr>
+      <p:pic>
+        <p:nvPicPr>
+          <p:cNvPr id="13" name="Picture 12">
+            <a:extLst>
+              <a:ext uri="{FF2B5EF4-FFF2-40B4-BE49-F238E27FC236}">
+                <a16:creationId xmlns:a16="http://schemas.microsoft.com/office/drawing/2014/main" id="{6FD7216F-E78C-00B0-C5EB-C91595C0BD9C}"/>
+              </a:ext>
+            </a:extLst>
+          </p:cNvPr>
+          <p:cNvPicPr>
+            <a:picLocks noChangeAspect="1"/>
+          </p:cNvPicPr>
+          <p:nvPr/>
+        </p:nvPicPr>
+        <p:blipFill>
+          <a:blip r:embed="rId2">
+            <a:extLst>
+              <a:ext uri="{28A0092B-C50C-407E-A947-70E740481C1C}">
+                <a14:useLocalDpi xmlns:a14="http://schemas.microsoft.com/office/drawing/2010/main" val="0"/>
+              </a:ext>
+            </a:extLst>
+          </a:blip>
+          <a:stretch>
+            <a:fillRect/>
+          </a:stretch>
+        </p:blipFill>
         <p:spPr>
           <a:xfrm>
-            <a:off x="1371600" y="98738"/>
-            <a:ext cx="8229600" cy="1066800"/>
+            <a:off x="1289154" y="419725"/>
+            <a:ext cx="9173980" cy="4661941"/>
           </a:xfrm>
-        </p:spPr>
-        <p:txBody>
-          <a:bodyPr>
-            <a:normAutofit/>
-          </a:bodyPr>
-          <a:lstStyle/>
-          <a:p>
-            <a:pPr algn="ctr" eaLnBrk="1" hangingPunct="1"/>
-            <a:r>
-              <a:rPr lang="en-US" sz="4800" dirty="0">
-                <a:latin typeface="Times New Roman" pitchFamily="16" charset="0"/>
-                <a:cs typeface="Times New Roman" pitchFamily="16" charset="0"/>
-              </a:rPr>
-              <a:t>Demerits</a:t>
-            </a:r>
-          </a:p>
-        </p:txBody>
-      </p:sp>
-      <p:sp>
-        <p:nvSpPr>
-          <p:cNvPr id="27651" name="Text Placeholder 13"/>
-          <p:cNvSpPr>
-            <a:spLocks noGrp="1"/>
-          </p:cNvSpPr>
-          <p:nvPr>
-            <p:ph type="body" idx="1"/>
-          </p:nvPr>
+          <a:prstGeom prst="rect">
+            <a:avLst/>
+          </a:prstGeom>
+        </p:spPr>
+      </p:pic>
+      <p:sp>
+        <p:nvSpPr>
+          <p:cNvPr id="14" name="TextBox 13">
+            <a:extLst>
+              <a:ext uri="{FF2B5EF4-FFF2-40B4-BE49-F238E27FC236}">
+                <a16:creationId xmlns:a16="http://schemas.microsoft.com/office/drawing/2014/main" id="{FC519AD9-E938-4F2D-DC31-64F5E4BCFB2F}"/>
+              </a:ext>
+            </a:extLst>
+          </p:cNvPr>
+          <p:cNvSpPr txBox="1"/>
+          <p:nvPr/>
         </p:nvSpPr>
         <p:spPr>
           <a:xfrm>
-            <a:off x="1828800" y="1143000"/>
-            <a:ext cx="5410200" cy="2819400"/>
+            <a:off x="419725" y="5306518"/>
+            <a:ext cx="11242623" cy="369332"/>
           </a:xfrm>
-        </p:spPr>
-        <p:txBody>
-          <a:bodyPr/>
-          <a:lstStyle/>
-          <a:p>
-            <a:pPr eaLnBrk="1" hangingPunct="1">
-              <a:buSzPct val="140000"/>
-              <a:buFont typeface="Wingdings" charset="2"/>
-              <a:buChar char="Ø"/>
-            </a:pPr>
-            <a:r>
-              <a:rPr lang="en-US" sz="2600" b="0" dirty="0">
-                <a:latin typeface="Times New Roman" pitchFamily="16" charset="0"/>
-                <a:cs typeface="Times New Roman" pitchFamily="16" charset="0"/>
-              </a:rPr>
-              <a:t> Cost</a:t>
-            </a:r>
-          </a:p>
-          <a:p>
-            <a:pPr eaLnBrk="1" hangingPunct="1">
-              <a:buSzPct val="140000"/>
-              <a:buFont typeface="Wingdings" charset="2"/>
-              <a:buChar char="Ø"/>
-            </a:pPr>
-            <a:r>
-              <a:rPr lang="en-US" sz="2600" b="0" dirty="0">
-                <a:latin typeface="Times New Roman" pitchFamily="16" charset="0"/>
-                <a:cs typeface="Times New Roman" pitchFamily="16" charset="0"/>
-              </a:rPr>
-              <a:t> Battery </a:t>
-            </a:r>
-          </a:p>
-          <a:p>
-            <a:pPr eaLnBrk="1" hangingPunct="1">
-              <a:buSzPct val="140000"/>
-              <a:buFont typeface="Wingdings" charset="2"/>
-              <a:buChar char="Ø"/>
-            </a:pPr>
-            <a:r>
-              <a:rPr lang="en-US" sz="2600" b="0" dirty="0">
-                <a:latin typeface="Times New Roman" pitchFamily="16" charset="0"/>
-                <a:cs typeface="Times New Roman" pitchFamily="16" charset="0"/>
-              </a:rPr>
-              <a:t> Keyboard concept is not new</a:t>
-            </a:r>
-          </a:p>
-          <a:p>
-            <a:pPr eaLnBrk="1" hangingPunct="1">
-              <a:buSzPct val="140000"/>
-              <a:buFont typeface="Wingdings" charset="2"/>
-              <a:buChar char="Ø"/>
-            </a:pPr>
-            <a:r>
-              <a:rPr lang="en-US" sz="2600" b="0" dirty="0">
-                <a:latin typeface="Times New Roman" pitchFamily="16" charset="0"/>
-                <a:cs typeface="Times New Roman" pitchFamily="16" charset="0"/>
-              </a:rPr>
-              <a:t> Positioning is mai</a:t>
-            </a:r>
-            <a:r>
-              <a:rPr lang="en-US" sz="2600" b="0" dirty="0"/>
-              <a:t>n</a:t>
-            </a:r>
-          </a:p>
-          <a:p>
-            <a:pPr eaLnBrk="1" hangingPunct="1">
-              <a:buSzPct val="140000"/>
-              <a:buFont typeface="Wingdings" charset="2"/>
-              <a:buChar char="Ø"/>
-            </a:pPr>
-            <a:r>
-              <a:rPr lang="en-US" sz="2600" b="0" dirty="0"/>
-              <a:t>Currently  un-clear.</a:t>
+          <a:prstGeom prst="rect">
+            <a:avLst/>
+          </a:prstGeom>
+          <a:noFill/>
+        </p:spPr>
+        <p:txBody>
+          <a:bodyPr wrap="square" rtlCol="0">
+            <a:spAutoFit/>
+          </a:bodyPr>
+          <a:lstStyle/>
+          <a:p>
+            <a:pPr algn="ctr"/>
+            <a:r>
+              <a:rPr lang="en-US" dirty="0"/>
+              <a:t>Recommended Jobs to User </a:t>
             </a:r>
           </a:p>
         </p:txBody>
@@ -9733,146 +9570,42 @@
       </p:grpSpPr>
       <p:sp>
         <p:nvSpPr>
-          <p:cNvPr id="28674" name="Title 1"/>
-          <p:cNvSpPr>
-            <a:spLocks noGrp="1"/>
-          </p:cNvSpPr>
-          <p:nvPr>
-            <p:ph type="title"/>
-          </p:nvPr>
+          <p:cNvPr id="7" name="TextBox 6">
+            <a:extLst>
+              <a:ext uri="{FF2B5EF4-FFF2-40B4-BE49-F238E27FC236}">
+                <a16:creationId xmlns:a16="http://schemas.microsoft.com/office/drawing/2014/main" id="{45775C71-00D8-6534-0BCC-01E6706FD19F}"/>
+              </a:ext>
+            </a:extLst>
+          </p:cNvPr>
+          <p:cNvSpPr txBox="1"/>
+          <p:nvPr/>
         </p:nvSpPr>
         <p:spPr>
           <a:xfrm>
-            <a:off x="3581401" y="304800"/>
-            <a:ext cx="6447501" cy="1320800"/>
+            <a:off x="359764" y="329784"/>
+            <a:ext cx="10747947" cy="1477328"/>
           </a:xfrm>
-        </p:spPr>
-        <p:txBody>
-          <a:bodyPr>
-            <a:normAutofit/>
+          <a:prstGeom prst="rect">
+            <a:avLst/>
+          </a:prstGeom>
+          <a:noFill/>
+        </p:spPr>
+        <p:txBody>
+          <a:bodyPr wrap="square" rtlCol="0">
+            <a:spAutoFit/>
           </a:bodyPr>
           <a:lstStyle/>
           <a:p>
-            <a:pPr eaLnBrk="1" hangingPunct="1"/>
-            <a:r>
-              <a:rPr lang="en-US" sz="4000" dirty="0"/>
-              <a:t>Applications</a:t>
-            </a:r>
-          </a:p>
-        </p:txBody>
-      </p:sp>
-      <p:sp>
-        <p:nvSpPr>
-          <p:cNvPr id="6" name="Text Placeholder 13"/>
-          <p:cNvSpPr>
-            <a:spLocks noGrp="1"/>
-          </p:cNvSpPr>
-          <p:nvPr>
-            <p:ph type="body" idx="1"/>
-          </p:nvPr>
-        </p:nvSpPr>
-        <p:spPr>
-          <a:xfrm>
-            <a:off x="2286000" y="457200"/>
-            <a:ext cx="5715000" cy="4572000"/>
-          </a:xfrm>
-        </p:spPr>
-        <p:txBody>
-          <a:bodyPr/>
-          <a:lstStyle/>
-          <a:p>
-            <a:pPr marL="457200" indent="-457200">
-              <a:buSzPct val="140000"/>
-              <a:buFont typeface="Wingdings" panose="05000000000000000000" pitchFamily="2" charset="2"/>
-              <a:buChar char="Ø"/>
-            </a:pPr>
-            <a:r>
-              <a:rPr lang="en-US" sz="2600" b="0" dirty="0">
-                <a:latin typeface="Times New Roman" pitchFamily="16" charset="0"/>
-                <a:cs typeface="Times New Roman" pitchFamily="16" charset="0"/>
-              </a:rPr>
-              <a:t> </a:t>
-            </a:r>
-            <a:r>
-              <a:rPr lang="en-US" dirty="0">
-                <a:solidFill>
-                  <a:schemeClr val="tx1">
-                    <a:lumMod val="95000"/>
-                    <a:lumOff val="5000"/>
-                  </a:schemeClr>
-                </a:solidFill>
-                <a:latin typeface="Times New Roman" pitchFamily="18" charset="0"/>
-                <a:cs typeface="Times New Roman" pitchFamily="18" charset="0"/>
-              </a:rPr>
-              <a:t>Many researches has been made but there is no clear result so far.</a:t>
-            </a:r>
-          </a:p>
-          <a:p>
-            <a:pPr>
-              <a:buSzPct val="140000"/>
-            </a:pPr>
-            <a:endParaRPr lang="en-US" dirty="0">
-              <a:solidFill>
-                <a:schemeClr val="tx1">
-                  <a:lumMod val="95000"/>
-                  <a:lumOff val="5000"/>
-                </a:schemeClr>
-              </a:solidFill>
-              <a:latin typeface="Times New Roman" pitchFamily="18" charset="0"/>
-              <a:cs typeface="Times New Roman" pitchFamily="18" charset="0"/>
-            </a:endParaRPr>
-          </a:p>
-          <a:p>
-            <a:pPr marL="342900" indent="-342900">
-              <a:buSzPct val="140000"/>
-              <a:buFont typeface="Wingdings" panose="05000000000000000000" pitchFamily="2" charset="2"/>
-              <a:buChar char="Ø"/>
-            </a:pPr>
-            <a:r>
-              <a:rPr lang="en-US" b="0" dirty="0">
-                <a:latin typeface="Times New Roman" pitchFamily="16" charset="0"/>
-                <a:cs typeface="Times New Roman" pitchFamily="16" charset="0"/>
-              </a:rPr>
-              <a:t>  </a:t>
-            </a:r>
-            <a:r>
-              <a:rPr lang="en-US" dirty="0">
-                <a:solidFill>
-                  <a:schemeClr val="tx1">
-                    <a:lumMod val="95000"/>
-                    <a:lumOff val="5000"/>
-                  </a:schemeClr>
-                </a:solidFill>
-                <a:latin typeface="Times New Roman" pitchFamily="18" charset="0"/>
-                <a:cs typeface="Times New Roman" pitchFamily="18" charset="0"/>
-              </a:rPr>
-              <a:t>Only One that uses it is E-fingerprinting the gadget will be more secure, which allows only owner to activate the Pc. So even if we loose it, no one else </a:t>
-            </a:r>
-            <a:r>
-              <a:rPr lang="en-US" dirty="0" err="1">
-                <a:solidFill>
-                  <a:schemeClr val="tx1">
-                    <a:lumMod val="95000"/>
-                    <a:lumOff val="5000"/>
-                  </a:schemeClr>
-                </a:solidFill>
-                <a:latin typeface="Times New Roman" pitchFamily="18" charset="0"/>
-                <a:cs typeface="Times New Roman" pitchFamily="18" charset="0"/>
-              </a:rPr>
-              <a:t>cal</a:t>
-            </a:r>
-            <a:r>
-              <a:rPr lang="en-US" dirty="0">
-                <a:solidFill>
-                  <a:schemeClr val="tx1">
-                    <a:lumMod val="95000"/>
-                    <a:lumOff val="5000"/>
-                  </a:schemeClr>
-                </a:solidFill>
-                <a:latin typeface="Times New Roman" pitchFamily="18" charset="0"/>
-                <a:cs typeface="Times New Roman" pitchFamily="18" charset="0"/>
-              </a:rPr>
-              <a:t> access the gadget.</a:t>
+            <a:pPr algn="ctr"/>
+            <a:r>
+              <a:rPr lang="en-US" sz="3600" dirty="0"/>
+              <a:t>CONCLUSION </a:t>
+            </a:r>
+          </a:p>
+          <a:p>
+            <a:r>
+              <a:rPr lang="en-US" dirty="0"/>
+              <a:t>In this Project, we presented a job recommender model aiming to extract meaningful data from job postings using data-clustering methods. As a result, job offers are divided into job clusters based on their common features and job offers are matched to job seekers according to their interactions. </a:t>
             </a:r>
           </a:p>
         </p:txBody>
@@ -10195,169 +9928,49 @@
           <a:chExt cx="0" cy="0"/>
         </a:xfrm>
       </p:grpSpPr>
-      <p:pic>
-        <p:nvPicPr>
-          <p:cNvPr id="29698" name="Picture 2" descr="http://biz-store.com/wp-content/uploads/2013/02/conclusion-introduction-starter-plenary.jpg"/>
-          <p:cNvPicPr>
-            <a:picLocks noChangeAspect="1" noChangeArrowheads="1"/>
-          </p:cNvPicPr>
+      <p:sp>
+        <p:nvSpPr>
+          <p:cNvPr id="2" name="TextBox 1">
+            <a:extLst>
+              <a:ext uri="{FF2B5EF4-FFF2-40B4-BE49-F238E27FC236}">
+                <a16:creationId xmlns:a16="http://schemas.microsoft.com/office/drawing/2014/main" id="{C718E91B-451A-0AB7-0B38-395080851ACE}"/>
+              </a:ext>
+            </a:extLst>
+          </p:cNvPr>
+          <p:cNvSpPr txBox="1"/>
           <p:nvPr/>
-        </p:nvPicPr>
-        <p:blipFill>
-          <a:blip r:embed="rId3" cstate="print"/>
-          <a:srcRect/>
-          <a:stretch>
-            <a:fillRect/>
-          </a:stretch>
-        </p:blipFill>
-        <p:spPr bwMode="auto">
+        </p:nvSpPr>
+        <p:spPr>
           <a:xfrm>
-            <a:off x="1828801" y="1676400"/>
-            <a:ext cx="2726619" cy="2286000"/>
+            <a:off x="374754" y="194872"/>
+            <a:ext cx="10897849" cy="2031325"/>
           </a:xfrm>
           <a:prstGeom prst="rect">
             <a:avLst/>
           </a:prstGeom>
           <a:noFill/>
-          <a:ln w="9525">
-            <a:noFill/>
-            <a:miter lim="800000"/>
-            <a:headEnd/>
-            <a:tailEnd/>
-          </a:ln>
-        </p:spPr>
-      </p:pic>
-      <p:sp>
-        <p:nvSpPr>
-          <p:cNvPr id="29699" name="Rectangle 1"/>
-          <p:cNvSpPr>
-            <a:spLocks noChangeArrowheads="1"/>
-          </p:cNvSpPr>
-          <p:nvPr/>
-        </p:nvSpPr>
-        <p:spPr bwMode="auto">
-          <a:xfrm>
-            <a:off x="4819919" y="1905000"/>
-            <a:ext cx="4905375" cy="1754188"/>
-          </a:xfrm>
-          <a:prstGeom prst="rect">
-            <a:avLst/>
-          </a:prstGeom>
-          <a:noFill/>
-          <a:ln w="9525">
-            <a:noFill/>
-            <a:miter lim="800000"/>
-            <a:headEnd/>
-            <a:tailEnd/>
-          </a:ln>
-        </p:spPr>
-        <p:txBody>
-          <a:bodyPr anchor="ctr">
+        </p:spPr>
+        <p:txBody>
+          <a:bodyPr wrap="square" rtlCol="0">
             <a:spAutoFit/>
           </a:bodyPr>
           <a:lstStyle/>
           <a:p>
-            <a:pPr marL="285750" indent="-285750" algn="just">
-              <a:buClr>
-                <a:schemeClr val="accent1"/>
-              </a:buClr>
-              <a:buFont typeface="Wingdings" panose="05000000000000000000" pitchFamily="2" charset="2"/>
-              <a:buChar char="Ø"/>
-            </a:pPr>
-            <a:r>
-              <a:rPr lang="en-US" i="1" dirty="0">
-                <a:cs typeface="Times New Roman" pitchFamily="16" charset="0"/>
-              </a:rPr>
-              <a:t>The communication devices are becoming smaller and compact.</a:t>
-            </a:r>
-          </a:p>
-          <a:p>
-            <a:pPr marL="285750" indent="-285750" algn="just">
-              <a:buClr>
-                <a:schemeClr val="accent1"/>
-              </a:buClr>
-              <a:buFont typeface="Wingdings" panose="05000000000000000000" pitchFamily="2" charset="2"/>
-              <a:buChar char="Ø"/>
-            </a:pPr>
-            <a:r>
-              <a:rPr lang="en-US" i="1" dirty="0">
-                <a:cs typeface="Times New Roman" pitchFamily="16" charset="0"/>
-              </a:rPr>
-              <a:t> 5 Pen PC is only an example for the start of this new technology. </a:t>
-            </a:r>
-          </a:p>
-          <a:p>
-            <a:pPr marL="285750" indent="-285750" algn="just">
-              <a:buClr>
-                <a:schemeClr val="accent1"/>
-              </a:buClr>
-              <a:buFont typeface="Wingdings" panose="05000000000000000000" pitchFamily="2" charset="2"/>
-              <a:buChar char="Ø"/>
-            </a:pPr>
-            <a:r>
-              <a:rPr lang="en-US" i="1" dirty="0">
-                <a:cs typeface="Times New Roman" pitchFamily="16" charset="0"/>
-              </a:rPr>
-              <a:t>We can expect more such developments in the future.</a:t>
-            </a:r>
-            <a:endParaRPr lang="en-US" dirty="0">
-              <a:cs typeface="Times New Roman" pitchFamily="16" charset="0"/>
-            </a:endParaRPr>
-          </a:p>
-        </p:txBody>
-      </p:sp>
-      <p:sp>
-        <p:nvSpPr>
-          <p:cNvPr id="5122" name="Rectangle 2"/>
-          <p:cNvSpPr>
-            <a:spLocks noChangeArrowheads="1"/>
-          </p:cNvSpPr>
-          <p:nvPr/>
-        </p:nvSpPr>
-        <p:spPr bwMode="auto">
-          <a:xfrm>
-            <a:off x="4800600" y="381001"/>
-            <a:ext cx="3505200" cy="646113"/>
-          </a:xfrm>
-          <a:prstGeom prst="rect">
-            <a:avLst/>
-          </a:prstGeom>
-          <a:noFill/>
-          <a:ln w="9525">
-            <a:noFill/>
-            <a:miter lim="800000"/>
-            <a:headEnd/>
-            <a:tailEnd/>
-          </a:ln>
-          <a:effectLst/>
-        </p:spPr>
-        <p:txBody>
-          <a:bodyPr anchor="ctr">
-            <a:spAutoFit/>
-          </a:bodyPr>
-          <a:lstStyle/>
-          <a:p>
-            <a:pPr>
-              <a:defRPr/>
-            </a:pPr>
-            <a:r>
-              <a:rPr lang="en-US" sz="3600" b="1" i="1" dirty="0">
-                <a:solidFill>
-                  <a:schemeClr val="accent1"/>
-                </a:solidFill>
-                <a:latin typeface="Arial" pitchFamily="34" charset="0"/>
-                <a:ea typeface="Times New Roman" pitchFamily="18" charset="0"/>
-                <a:cs typeface="Arial" pitchFamily="34" charset="0"/>
-              </a:rPr>
-              <a:t>Conclusion</a:t>
-            </a:r>
-            <a:endParaRPr lang="en-US" dirty="0">
-              <a:solidFill>
-                <a:schemeClr val="accent1"/>
-              </a:solidFill>
-              <a:latin typeface="Arial" pitchFamily="34" charset="0"/>
-              <a:cs typeface="Arial" pitchFamily="34" charset="0"/>
-            </a:endParaRPr>
+            <a:pPr algn="ctr"/>
+            <a:r>
+              <a:rPr lang="en-US" sz="3600" dirty="0"/>
+              <a:t>FUTURE SCOPE </a:t>
+            </a:r>
+          </a:p>
+          <a:p>
+            <a:pPr algn="ctr"/>
+            <a:endParaRPr lang="en-US" dirty="0"/>
+          </a:p>
+          <a:p>
+            <a:r>
+              <a:rPr lang="en-US" dirty="0"/>
+              <a:t>Our future Work will focus on training and evaluating our model using Word2vec method and k -means clustering algorithms used to capture and represent the context of job profiles. Subsequently, it will be easy to match set of job offers to a given job seeker based on its past interactions toward specific job offers. The dataset that will be used is built from scraping job search websites.</a:t>
+            </a:r>
           </a:p>
         </p:txBody>
       </p:sp>
@@ -10375,418 +9988,6 @@
 </file>
 
 <file path=ppt/slides/slide21.xml><?xml version="1.0" encoding="utf-8"?>
-<p:sld xmlns:a="http://schemas.openxmlformats.org/drawingml/2006/main" xmlns:r="http://schemas.openxmlformats.org/officeDocument/2006/relationships" xmlns:p="http://schemas.openxmlformats.org/presentationml/2006/main">
-  <p:cSld>
-    <p:spTree>
-      <p:nvGrpSpPr>
-        <p:cNvPr id="1" name=""/>
-        <p:cNvGrpSpPr/>
-        <p:nvPr/>
-      </p:nvGrpSpPr>
-      <p:grpSpPr>
-        <a:xfrm>
-          <a:off x="0" y="0"/>
-          <a:ext cx="0" cy="0"/>
-          <a:chOff x="0" y="0"/>
-          <a:chExt cx="0" cy="0"/>
-        </a:xfrm>
-      </p:grpSpPr>
-      <p:sp>
-        <p:nvSpPr>
-          <p:cNvPr id="30722" name="Title 1"/>
-          <p:cNvSpPr>
-            <a:spLocks noGrp="1"/>
-          </p:cNvSpPr>
-          <p:nvPr>
-            <p:ph type="title"/>
-          </p:nvPr>
-        </p:nvSpPr>
-        <p:spPr/>
-        <p:txBody>
-          <a:bodyPr/>
-          <a:lstStyle/>
-          <a:p>
-            <a:pPr algn="ctr" eaLnBrk="1" hangingPunct="1"/>
-            <a:r>
-              <a:rPr lang="en-US">
-                <a:latin typeface="Times New Roman" pitchFamily="16" charset="0"/>
-                <a:cs typeface="Times New Roman" pitchFamily="16" charset="0"/>
-              </a:rPr>
-              <a:t>REFERENCES</a:t>
-            </a:r>
-          </a:p>
-        </p:txBody>
-      </p:sp>
-      <p:sp>
-        <p:nvSpPr>
-          <p:cNvPr id="4" name="Content Placeholder 2"/>
-          <p:cNvSpPr txBox="1">
-            <a:spLocks/>
-          </p:cNvSpPr>
-          <p:nvPr/>
-        </p:nvSpPr>
-        <p:spPr>
-          <a:xfrm>
-            <a:off x="2032001" y="1600201"/>
-            <a:ext cx="6447501" cy="3880773"/>
-          </a:xfrm>
-          <a:prstGeom prst="rect">
-            <a:avLst/>
-          </a:prstGeom>
-        </p:spPr>
-        <p:txBody>
-          <a:bodyPr vert="horz" lIns="91440" tIns="45720" rIns="91440" bIns="45720" rtlCol="0">
-            <a:normAutofit/>
-          </a:bodyPr>
-          <a:lstStyle>
-            <a:lvl1pPr marL="257175" indent="-257175" algn="l" defTabSz="342900" rtl="0" eaLnBrk="1" latinLnBrk="0" hangingPunct="1">
-              <a:spcBef>
-                <a:spcPts val="750"/>
-              </a:spcBef>
-              <a:spcAft>
-                <a:spcPts val="0"/>
-              </a:spcAft>
-              <a:buClr>
-                <a:schemeClr val="accent1"/>
-              </a:buClr>
-              <a:buSzPct val="80000"/>
-              <a:buFont typeface="Wingdings 3" charset="2"/>
-              <a:buChar char=""/>
-              <a:defRPr sz="1350" kern="1200">
-                <a:solidFill>
-                  <a:schemeClr val="tx1">
-                    <a:lumMod val="75000"/>
-                    <a:lumOff val="25000"/>
-                  </a:schemeClr>
-                </a:solidFill>
-                <a:latin typeface="+mn-lt"/>
-                <a:ea typeface="+mn-ea"/>
-                <a:cs typeface="+mn-cs"/>
-              </a:defRPr>
-            </a:lvl1pPr>
-            <a:lvl2pPr marL="557213" indent="-214313" algn="l" defTabSz="342900" rtl="0" eaLnBrk="1" latinLnBrk="0" hangingPunct="1">
-              <a:spcBef>
-                <a:spcPts val="750"/>
-              </a:spcBef>
-              <a:spcAft>
-                <a:spcPts val="0"/>
-              </a:spcAft>
-              <a:buClr>
-                <a:schemeClr val="accent1"/>
-              </a:buClr>
-              <a:buSzPct val="80000"/>
-              <a:buFont typeface="Wingdings 3" charset="2"/>
-              <a:buChar char=""/>
-              <a:defRPr sz="1200" kern="1200">
-                <a:solidFill>
-                  <a:schemeClr val="tx1">
-                    <a:lumMod val="75000"/>
-                    <a:lumOff val="25000"/>
-                  </a:schemeClr>
-                </a:solidFill>
-                <a:latin typeface="+mn-lt"/>
-                <a:ea typeface="+mn-ea"/>
-                <a:cs typeface="+mn-cs"/>
-              </a:defRPr>
-            </a:lvl2pPr>
-            <a:lvl3pPr marL="857250" indent="-171450" algn="l" defTabSz="342900" rtl="0" eaLnBrk="1" latinLnBrk="0" hangingPunct="1">
-              <a:spcBef>
-                <a:spcPts val="750"/>
-              </a:spcBef>
-              <a:spcAft>
-                <a:spcPts val="0"/>
-              </a:spcAft>
-              <a:buClr>
-                <a:schemeClr val="accent1"/>
-              </a:buClr>
-              <a:buSzPct val="80000"/>
-              <a:buFont typeface="Wingdings 3" charset="2"/>
-              <a:buChar char=""/>
-              <a:defRPr sz="1050" kern="1200">
-                <a:solidFill>
-                  <a:schemeClr val="tx1">
-                    <a:lumMod val="75000"/>
-                    <a:lumOff val="25000"/>
-                  </a:schemeClr>
-                </a:solidFill>
-                <a:latin typeface="+mn-lt"/>
-                <a:ea typeface="+mn-ea"/>
-                <a:cs typeface="+mn-cs"/>
-              </a:defRPr>
-            </a:lvl3pPr>
-            <a:lvl4pPr marL="1200150" indent="-171450" algn="l" defTabSz="342900" rtl="0" eaLnBrk="1" latinLnBrk="0" hangingPunct="1">
-              <a:spcBef>
-                <a:spcPts val="750"/>
-              </a:spcBef>
-              <a:spcAft>
-                <a:spcPts val="0"/>
-              </a:spcAft>
-              <a:buClr>
-                <a:schemeClr val="accent1"/>
-              </a:buClr>
-              <a:buSzPct val="80000"/>
-              <a:buFont typeface="Wingdings 3" charset="2"/>
-              <a:buChar char=""/>
-              <a:defRPr sz="900" kern="1200">
-                <a:solidFill>
-                  <a:schemeClr val="tx1">
-                    <a:lumMod val="75000"/>
-                    <a:lumOff val="25000"/>
-                  </a:schemeClr>
-                </a:solidFill>
-                <a:latin typeface="+mn-lt"/>
-                <a:ea typeface="+mn-ea"/>
-                <a:cs typeface="+mn-cs"/>
-              </a:defRPr>
-            </a:lvl4pPr>
-            <a:lvl5pPr marL="1543050" indent="-171450" algn="l" defTabSz="342900" rtl="0" eaLnBrk="1" latinLnBrk="0" hangingPunct="1">
-              <a:spcBef>
-                <a:spcPts val="750"/>
-              </a:spcBef>
-              <a:spcAft>
-                <a:spcPts val="0"/>
-              </a:spcAft>
-              <a:buClr>
-                <a:schemeClr val="accent1"/>
-              </a:buClr>
-              <a:buSzPct val="80000"/>
-              <a:buFont typeface="Wingdings 3" charset="2"/>
-              <a:buChar char=""/>
-              <a:defRPr sz="900" kern="1200">
-                <a:solidFill>
-                  <a:schemeClr val="tx1">
-                    <a:lumMod val="75000"/>
-                    <a:lumOff val="25000"/>
-                  </a:schemeClr>
-                </a:solidFill>
-                <a:latin typeface="+mn-lt"/>
-                <a:ea typeface="+mn-ea"/>
-                <a:cs typeface="+mn-cs"/>
-              </a:defRPr>
-            </a:lvl5pPr>
-            <a:lvl6pPr marL="1885950" indent="-171450" algn="l" defTabSz="342900" rtl="0" eaLnBrk="1" latinLnBrk="0" hangingPunct="1">
-              <a:spcBef>
-                <a:spcPts val="750"/>
-              </a:spcBef>
-              <a:spcAft>
-                <a:spcPts val="0"/>
-              </a:spcAft>
-              <a:buClr>
-                <a:schemeClr val="accent1"/>
-              </a:buClr>
-              <a:buSzPct val="80000"/>
-              <a:buFont typeface="Wingdings 3" charset="2"/>
-              <a:buChar char=""/>
-              <a:defRPr sz="900" kern="1200">
-                <a:solidFill>
-                  <a:schemeClr val="tx1">
-                    <a:lumMod val="75000"/>
-                    <a:lumOff val="25000"/>
-                  </a:schemeClr>
-                </a:solidFill>
-                <a:latin typeface="+mn-lt"/>
-                <a:ea typeface="+mn-ea"/>
-                <a:cs typeface="+mn-cs"/>
-              </a:defRPr>
-            </a:lvl6pPr>
-            <a:lvl7pPr marL="2228850" indent="-171450" algn="l" defTabSz="342900" rtl="0" eaLnBrk="1" latinLnBrk="0" hangingPunct="1">
-              <a:spcBef>
-                <a:spcPts val="750"/>
-              </a:spcBef>
-              <a:spcAft>
-                <a:spcPts val="0"/>
-              </a:spcAft>
-              <a:buClr>
-                <a:schemeClr val="accent1"/>
-              </a:buClr>
-              <a:buSzPct val="80000"/>
-              <a:buFont typeface="Wingdings 3" charset="2"/>
-              <a:buChar char=""/>
-              <a:defRPr sz="900" kern="1200">
-                <a:solidFill>
-                  <a:schemeClr val="tx1">
-                    <a:lumMod val="75000"/>
-                    <a:lumOff val="25000"/>
-                  </a:schemeClr>
-                </a:solidFill>
-                <a:latin typeface="+mn-lt"/>
-                <a:ea typeface="+mn-ea"/>
-                <a:cs typeface="+mn-cs"/>
-              </a:defRPr>
-            </a:lvl7pPr>
-            <a:lvl8pPr marL="2571750" indent="-171450" algn="l" defTabSz="342900" rtl="0" eaLnBrk="1" latinLnBrk="0" hangingPunct="1">
-              <a:spcBef>
-                <a:spcPts val="750"/>
-              </a:spcBef>
-              <a:spcAft>
-                <a:spcPts val="0"/>
-              </a:spcAft>
-              <a:buClr>
-                <a:schemeClr val="accent1"/>
-              </a:buClr>
-              <a:buSzPct val="80000"/>
-              <a:buFont typeface="Wingdings 3" charset="2"/>
-              <a:buChar char=""/>
-              <a:defRPr sz="900" kern="1200">
-                <a:solidFill>
-                  <a:schemeClr val="tx1">
-                    <a:lumMod val="75000"/>
-                    <a:lumOff val="25000"/>
-                  </a:schemeClr>
-                </a:solidFill>
-                <a:latin typeface="+mn-lt"/>
-                <a:ea typeface="+mn-ea"/>
-                <a:cs typeface="+mn-cs"/>
-              </a:defRPr>
-            </a:lvl8pPr>
-            <a:lvl9pPr marL="2914650" indent="-171450" algn="l" defTabSz="342900" rtl="0" eaLnBrk="1" latinLnBrk="0" hangingPunct="1">
-              <a:spcBef>
-                <a:spcPts val="750"/>
-              </a:spcBef>
-              <a:spcAft>
-                <a:spcPts val="0"/>
-              </a:spcAft>
-              <a:buClr>
-                <a:schemeClr val="accent1"/>
-              </a:buClr>
-              <a:buSzPct val="80000"/>
-              <a:buFont typeface="Wingdings 3" charset="2"/>
-              <a:buChar char=""/>
-              <a:defRPr sz="900" kern="1200">
-                <a:solidFill>
-                  <a:schemeClr val="tx1">
-                    <a:lumMod val="75000"/>
-                    <a:lumOff val="25000"/>
-                  </a:schemeClr>
-                </a:solidFill>
-                <a:latin typeface="+mn-lt"/>
-                <a:ea typeface="+mn-ea"/>
-                <a:cs typeface="+mn-cs"/>
-              </a:defRPr>
-            </a:lvl9pPr>
-          </a:lstStyle>
-          <a:p>
-            <a:pPr>
-              <a:buFont typeface="Wingdings" panose="05000000000000000000" pitchFamily="2" charset="2"/>
-              <a:buChar char="Ø"/>
-            </a:pPr>
-            <a:r>
-              <a:rPr lang="en-IN" sz="2000" dirty="0">
-                <a:solidFill>
-                  <a:schemeClr val="tx1"/>
-                </a:solidFill>
-                <a:latin typeface="Times New Roman" panose="02020603050405020304" pitchFamily="18" charset="0"/>
-                <a:cs typeface="Times New Roman" panose="02020603050405020304" pitchFamily="18" charset="0"/>
-                <a:hlinkClick r:id="rId2"/>
-              </a:rPr>
-              <a:t>www.google.com</a:t>
-            </a:r>
-            <a:endParaRPr lang="en-US" sz="2000" dirty="0">
-              <a:solidFill>
-                <a:schemeClr val="tx1"/>
-              </a:solidFill>
-              <a:latin typeface="Times New Roman" panose="02020603050405020304" pitchFamily="18" charset="0"/>
-              <a:cs typeface="Times New Roman" panose="02020603050405020304" pitchFamily="18" charset="0"/>
-            </a:endParaRPr>
-          </a:p>
-          <a:p>
-            <a:pPr>
-              <a:buFont typeface="Wingdings" panose="05000000000000000000" pitchFamily="2" charset="2"/>
-              <a:buChar char="Ø"/>
-            </a:pPr>
-            <a:r>
-              <a:rPr lang="en-IN" sz="2000" dirty="0">
-                <a:solidFill>
-                  <a:schemeClr val="tx1"/>
-                </a:solidFill>
-                <a:latin typeface="Times New Roman" panose="02020603050405020304" pitchFamily="18" charset="0"/>
-                <a:cs typeface="Times New Roman" panose="02020603050405020304" pitchFamily="18" charset="0"/>
-                <a:hlinkClick r:id="rId3"/>
-              </a:rPr>
-              <a:t>https://ieeexplore.ieee.org/</a:t>
-            </a:r>
-            <a:endParaRPr lang="en-IN" sz="2000" dirty="0">
-              <a:solidFill>
-                <a:schemeClr val="tx1"/>
-              </a:solidFill>
-              <a:latin typeface="Times New Roman" panose="02020603050405020304" pitchFamily="18" charset="0"/>
-              <a:cs typeface="Times New Roman" panose="02020603050405020304" pitchFamily="18" charset="0"/>
-            </a:endParaRPr>
-          </a:p>
-          <a:p>
-            <a:pPr>
-              <a:buFont typeface="Wingdings" panose="05000000000000000000" pitchFamily="2" charset="2"/>
-              <a:buChar char="Ø"/>
-            </a:pPr>
-            <a:r>
-              <a:rPr lang="en-IN" sz="2000" dirty="0">
-                <a:solidFill>
-                  <a:schemeClr val="tx1"/>
-                </a:solidFill>
-                <a:latin typeface="Times New Roman" panose="02020603050405020304" pitchFamily="18" charset="0"/>
-                <a:cs typeface="Times New Roman" panose="02020603050405020304" pitchFamily="18" charset="0"/>
-                <a:hlinkClick r:id="rId4"/>
-              </a:rPr>
-              <a:t>https://www.ijser.org/researchpaper/5-Pen-PC-Technology.pdf</a:t>
-            </a:r>
-            <a:endParaRPr lang="en-US" sz="2000" u="sng" dirty="0">
-              <a:solidFill>
-                <a:schemeClr val="tx1"/>
-              </a:solidFill>
-              <a:latin typeface="Times New Roman" panose="02020603050405020304" pitchFamily="18" charset="0"/>
-              <a:cs typeface="Times New Roman" panose="02020603050405020304" pitchFamily="18" charset="0"/>
-            </a:endParaRPr>
-          </a:p>
-          <a:p>
-            <a:pPr>
-              <a:buFont typeface="Wingdings" panose="05000000000000000000" pitchFamily="2" charset="2"/>
-              <a:buChar char="Ø"/>
-            </a:pPr>
-            <a:r>
-              <a:rPr lang="en-US" sz="2000" u="sng" dirty="0">
-                <a:solidFill>
-                  <a:schemeClr val="tx1"/>
-                </a:solidFill>
-                <a:latin typeface="Times New Roman" panose="02020603050405020304" pitchFamily="18" charset="0"/>
-                <a:cs typeface="Times New Roman" panose="02020603050405020304" pitchFamily="18" charset="0"/>
-                <a:hlinkClick r:id="rId5"/>
-              </a:rPr>
-              <a:t>www.studymafia.org</a:t>
-            </a:r>
-            <a:endParaRPr lang="en-US" sz="2000" u="sng" dirty="0">
-              <a:solidFill>
-                <a:schemeClr val="tx1"/>
-              </a:solidFill>
-              <a:latin typeface="Times New Roman" panose="02020603050405020304" pitchFamily="18" charset="0"/>
-              <a:cs typeface="Times New Roman" panose="02020603050405020304" pitchFamily="18" charset="0"/>
-            </a:endParaRPr>
-          </a:p>
-          <a:p>
-            <a:pPr>
-              <a:buFont typeface="Wingdings" charset="2"/>
-              <a:buChar char="Ø"/>
-            </a:pPr>
-            <a:endParaRPr lang="en-US" dirty="0">
-              <a:latin typeface="Times New Roman" pitchFamily="16" charset="0"/>
-              <a:cs typeface="Times New Roman" pitchFamily="16" charset="0"/>
-            </a:endParaRPr>
-          </a:p>
-        </p:txBody>
-      </p:sp>
-    </p:spTree>
-    <p:extLst>
-      <p:ext uri="{BB962C8B-B14F-4D97-AF65-F5344CB8AC3E}">
-        <p14:creationId xmlns:p14="http://schemas.microsoft.com/office/powerpoint/2010/main" val="1573934963"/>
-      </p:ext>
-    </p:extLst>
-  </p:cSld>
-  <p:clrMapOvr>
-    <a:masterClrMapping/>
-  </p:clrMapOvr>
-</p:sld>
-</file>
-
-<file path=ppt/slides/slide22.xml><?xml version="1.0" encoding="utf-8"?>
 <p:sld xmlns:a="http://schemas.openxmlformats.org/drawingml/2006/main" xmlns:r="http://schemas.openxmlformats.org/officeDocument/2006/relationships" xmlns:p="http://schemas.openxmlformats.org/presentationml/2006/main">
   <p:cSld>
     <p:spTree>
@@ -10939,131 +10140,6 @@
           </a:p>
         </p:txBody>
       </p:sp>
-      <p:sp>
-        <p:nvSpPr>
-          <p:cNvPr id="6" name="Content Placeholder 5"/>
-          <p:cNvSpPr>
-            <a:spLocks noGrp="1"/>
-          </p:cNvSpPr>
-          <p:nvPr>
-            <p:ph idx="1"/>
-          </p:nvPr>
-        </p:nvSpPr>
-        <p:spPr>
-          <a:xfrm>
-            <a:off x="1981200" y="1524001"/>
-            <a:ext cx="5715000" cy="4389437"/>
-          </a:xfrm>
-        </p:spPr>
-        <p:txBody>
-          <a:bodyPr>
-            <a:normAutofit lnSpcReduction="10000"/>
-          </a:bodyPr>
-          <a:lstStyle/>
-          <a:p>
-            <a:pPr marL="274320" indent="-274320">
-              <a:buFont typeface="Wingdings 3"/>
-              <a:buChar char=""/>
-              <a:defRPr/>
-            </a:pPr>
-            <a:r>
-              <a:rPr lang="en-US" sz="2600" dirty="0">
-                <a:latin typeface="Times New Roman" pitchFamily="18" charset="0"/>
-                <a:cs typeface="Times New Roman" pitchFamily="18" charset="0"/>
-              </a:rPr>
-              <a:t>"Pen-style Personal Networking Gadget" created in 2012 by Japanese technology company NEC.</a:t>
-            </a:r>
-          </a:p>
-          <a:p>
-            <a:pPr marL="274320" indent="-274320">
-              <a:buNone/>
-              <a:defRPr/>
-            </a:pPr>
-            <a:r>
-              <a:rPr lang="en-US" sz="2600" dirty="0">
-                <a:latin typeface="Times New Roman" pitchFamily="18" charset="0"/>
-                <a:cs typeface="Times New Roman" pitchFamily="18" charset="0"/>
-              </a:rPr>
-              <a:t> </a:t>
-            </a:r>
-          </a:p>
-          <a:p>
-            <a:pPr marL="274320" indent="-274320">
-              <a:buFont typeface="Wingdings 3"/>
-              <a:buChar char=""/>
-              <a:defRPr/>
-            </a:pPr>
-            <a:r>
-              <a:rPr lang="en-US" sz="2600" dirty="0">
-                <a:latin typeface="Times New Roman" pitchFamily="18" charset="0"/>
-                <a:cs typeface="Times New Roman" pitchFamily="18" charset="0"/>
-              </a:rPr>
-              <a:t>Its designer Tour Ichihash.</a:t>
-            </a:r>
-          </a:p>
-          <a:p>
-            <a:pPr marL="274320" indent="-274320">
-              <a:buNone/>
-              <a:defRPr/>
-            </a:pPr>
-            <a:endParaRPr lang="en-US" sz="2600" dirty="0">
-              <a:latin typeface="Times New Roman" pitchFamily="18" charset="0"/>
-              <a:cs typeface="Times New Roman" pitchFamily="18" charset="0"/>
-            </a:endParaRPr>
-          </a:p>
-          <a:p>
-            <a:pPr marL="274320" indent="-274320">
-              <a:buFont typeface="Wingdings 3"/>
-              <a:buChar char=""/>
-              <a:defRPr/>
-            </a:pPr>
-            <a:r>
-              <a:rPr lang="en-US" sz="2600" dirty="0">
-                <a:latin typeface="Times New Roman" pitchFamily="18" charset="0"/>
-                <a:cs typeface="Times New Roman" pitchFamily="18" charset="0"/>
-              </a:rPr>
-              <a:t>P-ISM was first featured at the 2011 ITU Telecom world held in</a:t>
-            </a:r>
-          </a:p>
-          <a:p>
-            <a:pPr marL="0" indent="0">
-              <a:buNone/>
-              <a:defRPr/>
-            </a:pPr>
-            <a:r>
-              <a:rPr lang="en-US" sz="2600" dirty="0">
-                <a:latin typeface="Times New Roman" pitchFamily="18" charset="0"/>
-                <a:cs typeface="Times New Roman" pitchFamily="18" charset="0"/>
-              </a:rPr>
-              <a:t>	 Geneva, Switzerland.</a:t>
-            </a:r>
-          </a:p>
-          <a:p>
-            <a:pPr marL="274320" indent="-274320">
-              <a:buNone/>
-              <a:defRPr/>
-            </a:pPr>
-            <a:br>
-              <a:rPr lang="en-US" sz="1400" dirty="0">
-                <a:latin typeface="Times New Roman" pitchFamily="18" charset="0"/>
-                <a:cs typeface="Times New Roman" pitchFamily="18" charset="0"/>
-              </a:rPr>
-            </a:br>
-            <a:endParaRPr lang="en-US" sz="1400" dirty="0">
-              <a:latin typeface="Times New Roman" pitchFamily="18" charset="0"/>
-              <a:cs typeface="Times New Roman" pitchFamily="18" charset="0"/>
-            </a:endParaRPr>
-          </a:p>
-          <a:p>
-            <a:pPr marL="274320" indent="-274320">
-              <a:buFont typeface="Wingdings 3"/>
-              <a:buChar char=""/>
-              <a:defRPr/>
-            </a:pPr>
-            <a:endParaRPr lang="en-US" dirty="0"/>
-          </a:p>
-        </p:txBody>
-      </p:sp>
     </p:spTree>
     <p:extLst>
       <p:ext uri="{BB962C8B-B14F-4D97-AF65-F5344CB8AC3E}">
@@ -11129,115 +10205,6 @@
       </p:sp>
       <p:sp>
         <p:nvSpPr>
-          <p:cNvPr id="4" name="Content Placeholder 3"/>
-          <p:cNvSpPr>
-            <a:spLocks noGrp="1"/>
-          </p:cNvSpPr>
-          <p:nvPr>
-            <p:ph sz="half" idx="1"/>
-          </p:nvPr>
-        </p:nvSpPr>
-        <p:spPr>
-          <a:xfrm>
-            <a:off x="1981200" y="1981201"/>
-            <a:ext cx="3810000" cy="4435475"/>
-          </a:xfrm>
-        </p:spPr>
-        <p:txBody>
-          <a:bodyPr>
-            <a:normAutofit fontScale="62500" lnSpcReduction="20000"/>
-          </a:bodyPr>
-          <a:lstStyle/>
-          <a:p>
-            <a:pPr marL="274320" indent="-274320">
-              <a:buFont typeface="Wingdings 3"/>
-              <a:buChar char=""/>
-              <a:defRPr/>
-            </a:pPr>
-            <a:r>
-              <a:rPr lang="en-US" sz="4200" dirty="0">
-                <a:latin typeface="Times New Roman" pitchFamily="18" charset="0"/>
-                <a:cs typeface="Times New Roman" pitchFamily="18" charset="0"/>
-              </a:rPr>
-              <a:t>P-ISM (“Pen-style Personal Networking Gadget Package”).</a:t>
-            </a:r>
-          </a:p>
-          <a:p>
-            <a:pPr marL="274320" indent="-274320">
-              <a:buNone/>
-              <a:defRPr/>
-            </a:pPr>
-            <a:endParaRPr lang="en-US" sz="4200" dirty="0">
-              <a:latin typeface="Times New Roman" pitchFamily="18" charset="0"/>
-              <a:cs typeface="Times New Roman" pitchFamily="18" charset="0"/>
-            </a:endParaRPr>
-          </a:p>
-          <a:p>
-            <a:pPr marL="274320" indent="-274320">
-              <a:buFont typeface="Wingdings 3"/>
-              <a:buChar char=""/>
-              <a:defRPr/>
-            </a:pPr>
-            <a:r>
-              <a:rPr lang="en-US" sz="4200" dirty="0">
-                <a:latin typeface="Times New Roman" pitchFamily="18" charset="0"/>
-                <a:cs typeface="Times New Roman" pitchFamily="18" charset="0"/>
-              </a:rPr>
-              <a:t>Connected With A Wireless Technology.</a:t>
-            </a:r>
-          </a:p>
-          <a:p>
-            <a:pPr marL="274320" indent="-274320">
-              <a:buNone/>
-              <a:defRPr/>
-            </a:pPr>
-            <a:endParaRPr lang="en-US" sz="4200" dirty="0">
-              <a:latin typeface="Times New Roman" pitchFamily="18" charset="0"/>
-              <a:cs typeface="Times New Roman" pitchFamily="18" charset="0"/>
-            </a:endParaRPr>
-          </a:p>
-          <a:p>
-            <a:pPr marL="274320" indent="-274320">
-              <a:buFont typeface="Wingdings 3"/>
-              <a:buChar char=""/>
-              <a:defRPr/>
-            </a:pPr>
-            <a:r>
-              <a:rPr lang="en-US" sz="4200" dirty="0">
-                <a:latin typeface="Times New Roman" pitchFamily="18" charset="0"/>
-                <a:cs typeface="Times New Roman" pitchFamily="18" charset="0"/>
-              </a:rPr>
-              <a:t>Whole Set Is Connected To Internet Through Cellular Phone Function.</a:t>
-            </a:r>
-          </a:p>
-          <a:p>
-            <a:pPr marL="274320" indent="-274320">
-              <a:buNone/>
-              <a:defRPr/>
-            </a:pPr>
-            <a:br>
-              <a:rPr lang="en-US" sz="4200" dirty="0">
-                <a:latin typeface="Times New Roman" pitchFamily="18" charset="0"/>
-                <a:cs typeface="Times New Roman" pitchFamily="18" charset="0"/>
-              </a:rPr>
-            </a:br>
-            <a:endParaRPr lang="en-US" sz="4200" dirty="0">
-              <a:latin typeface="Times New Roman" pitchFamily="18" charset="0"/>
-              <a:cs typeface="Times New Roman" pitchFamily="18" charset="0"/>
-            </a:endParaRPr>
-          </a:p>
-          <a:p>
-            <a:pPr marL="274320" indent="-274320">
-              <a:buFont typeface="Wingdings 3"/>
-              <a:buChar char=""/>
-              <a:defRPr/>
-            </a:pPr>
-            <a:endParaRPr lang="en-US" dirty="0"/>
-          </a:p>
-        </p:txBody>
-      </p:sp>
-      <p:sp>
-        <p:nvSpPr>
           <p:cNvPr id="12292" name="AutoShape 4" descr="data:image/jpeg;base64,/9j/4AAQSkZJRgABAQAAAQABAAD/2wCEAAkGBxQTEhUUExQVFhUVGBgYGBcXFxQXHBgXFxcWHBgXHBgZHSgiHRonHBQXIjEhJSkrLi4uFx8zODMsNygtLiwBCgoKDg0OGhAQGywlHyQsLCwvLCwsLC0vLCwsLCwsLCwsLCwsLCwsLCwsLCwsLCwsLCwsLCwsLCwsLCwsLCwsLP/AABEIAK4ArAMBIgACEQEDEQH/xAAbAAACAwEBAQAAAAAAAAAAAAAABgQFBwMCAf/EAEIQAAEDAQUEBwUGBAUFAQAAAAEAAgMRBAUGEiExQVFxEyJhgZGhwTJScrHRFCM0QpKygqLh8AcWM0NiJFNjwuIV/8QAGQEAAgMBAAAAAAAAAAAAAAAAAAIBAwQF/8QAJxEAAwACAgEDBAIDAAAAAAAAAAECAxESMSEEIlEyM0FhE6EUI4H/2gAMAwEAAhEDEQA/ANxQhCABCEIAEL5VUF74ojjq2P7x/Pqjmd/IKG9C1SlbZfl1NSqe24lgj0zZzwZr57Ek3heksx+8cSPdGjfBe7Dc80oqxhy+8dB4nak5/BmfqG3qEXVpxm4/6cQHa4k+Qp81XzYntDvzBvJo9VYWbBzv9yUDsa2vmforGHCkA253c3U+SPcw45q7FV1+Wg/7rvIei6R4htI/3SeYafRNv+WrN/2/5nfVeX4Zs5HsEcnORxYfw5fn+yghxdOPaDHdxHmFaWTGMZ0kY5naDmHoV8nwdGfYke3mA4eiqrVhSZvslrx2aHwKPcg/3SOdivCOUfdvDuyuo7tqlLKJY3xuo4OY4cagjtCvLrxVJHQSfeN47HDv396lX8jT6hdUPaFEu+8Y5m5o3V4jeOYUtOaE99AhCEEghCEACEIQALlaJ2saXPIDRtJX20TNY0ucaNaKkrPL9vl1odwjHst/9j2pW9FWTIoX7JF+4idNVrKtj83c+A7FBuu6ZJz1BoNC46AfU9isLgw8ZqPkq2PwLvoO1O8UYaA1oAA2AJUt+WURirI+VlPdmG4oqF33juLhoOTVdIS3iLF8dnqxgEkvCvVaf+R9Am8I1zCXhIZFW2u/7NGaPmYDwBzHwFVl16X9PaP9SQ5fdb1W+A296r44SdgKV2PrXZqX+dbH/wBx36HfRdIcYWRxp0tPia4eiy37G/3fkg2V/ulRzYvKPn+zaLJbo5RWORj/AIXA+S7rDGOcw1BLXDeKg+KZrmxvNEQJfvWdujxyO/vUqxtGj2uyMkFHtDh27uR3JWvXCZFXQGo9w7e470yXZecc7M8Tg4bxvaeBG4qWmaTKrxzXZl0Ez4n1aSx7dOB5EeieLgxC2fqPo2Thud2j6LpfdyMnFfZkGx3oeISJarM+J+VwLXDX6EH1S+ZMvuwv9GqIS/hm/umHRyH7wDQ++OPNMCdPZrmlS2gQhCkYEIVHiu9OhiytPXkqB2D8x8/NQ3oWqUrbF/Fd8dK/o2H7th1/5OHoF8wxcvTOzvH3bdx/OeHIKtui7zNI1g0G1x4NG1aRBC1jQ1oo0CgCRLb2zLih5K5UewEIS5ja/Ps8ORh+9lqBxa3e70Cdm0qcZ4rLSYIDQjR8g3H3W+pSNBCXGg7yvtnhLzTxKuI4w0UGxVN7Ks2ZY/C7OEFja3tPb9FJCF9a6hB4GvgoOfVOntsY7PhB7mVdIGuIrloTTsJqqC1Wd0b3McKOaaFPFnxNAWBznZXU1bQk17KbUm3rbOmmfJSgcdB2AAD5JqS/BblnGkuJCewHQiqg2iwb2+H0VghKJGWo6Ku67xks8gfGaEbRucOBG8LWLgvplqjzt0cNHt3tPqOBWYW6y1GYbfn/AFXnD97Os0wkGzY8cWk69+8Jpejo47WSdo2RV99XU2dlDo4ey7geHIqbBMHta9pq1wBB4gioXtWEtJrTMue18UlNWvYfAhaFcN6C0Rh2xw0eOB48iq3Ft1Z2dK0ddm2m9v1CWrhvLoJQ78p0d8PHu2pF7WY1vFen0aUhfAa7F9VhsBZriC39NO535R1W8hv7zUp4xBa+is73DbTKObtEgXVZOllZHucdfhG3ySW/wZfUPbUoccJXf0cOc+1JrybuHr3q8XxraCg2DRfUyNMTxWgWPYovHp7TI+tWg5W/C3Z51PetSxBa+is0zxtax1OZFB5lY7ZY6uaP70SWx96TZZ2KHK3tOpXdCEhyap09sCm+x4Sjcxpc9+YgHq5QNRuqClBSW3hKG5RI8NG4OKlNfkaKlfUtjU3B0ddZJCP4R6JXvax9DM+OtQ0ih7CAfVO2FrS6SztLiSWlzanfQ6eRSjiY/wDVS8x+xqakteC3LM8FUorEIQkMwKqt8OV1RsPz3q1Ua3sqw9mqC/BfG1+xx/w5vLPE6F22Khb8Dq6dxr4pvWV4BtOS2NG6RrmH9w82rVFbL8HRfYLOsQWDoZnNHsnrN5Hd3bFoqX8Z2PNEHgaxnX4Tt86KKXgz545Tv4O2D7f0kOQnrR6fw/l9R3K+WfYRteS0AbpBlPPaPl5rQFMvaDBXKBVx5P1YmcSXH+GgH7vJQsEWesr3n8jQBzdX0BXjG8lZ2j3WDzJKs8DR0ikdxfT9I/ql7oqXuzDIhCE5sKPG34Kbk397VmF2+33FahjRtbFNTg09wc2qy67T1+4qu+xcn22WqEISnKBCEIAesF/h/wCN3olfEn4qX4h+1qaMF/h/43eiV8SfipfiH7Wp30jVk+1JWoQhIZQXif2Xciva52g9V3IoGntHnB342D4j+0rXVkWDR/1sHxH9pWuqyOjrUC4W6DPG9nvNI8tF3QmFa2ZVDKWOa4bWkHwNVq7HVAI2HXxWYXsyk0o4Pd8ytCuKTNZ4j/wHlp6JIMnpvDaEzFzq2p3YGjyV/gr8Ofjd8mqixi2lpPa1p/vwV5gk/cH4z8moX1Bj+8/+jAhCE5sOF4WYSxSRn87HN8QQsVZVj6HQtND3GhW4rMMfXV0Vo6Ro6k3W5P8AzD5HvKW0SvPgjhCiXfNVtDtHyUtVnKuHNaYIQU2WbCLXMa4yuzEA6AU1ClLYRDronYM/Dfxu9Er4k/FS/EP2tT5dtiEMbY21IbXU7yTUnzVZemGmTSmQvc2oFQANSBStT2AJ2no13jp40kIiFZ39dYs8gaHZgRUVpUa76KsVZjaaemCiXlJRtOJ8lLKp7ZNmdXcNAgu9PHK9/Ayf4c2PNaXSU0jYf1O0HlmWlqgwVdXQWYZhR8nXcDtFR1WnkPmr9WytI6DBCEKSDNb6/ES/G75p5wu6tlj5H5lIt9fiJvjd8094ZbSyxfDXxJST2YsH3GLuOoqSxu95pHe0/wD0pOBJdJW8C13iCD8gpWNrNmhD97HeTtD6KhwjacloA3PBb37R8kdUS/bmH1CEJzYCr79uptphdG7QnVrvdcNh5cexWCEAYnarPJBIWPBa9p8e3tBU+zTh47d4Wh4lw6y1N92Ro6jvR3ELL7fYZbPJlkaWuGzgRxB3hVNaEy4lkX7LNTIr1ma0NbK8NGwVVJBeG53iPopjJQdhBUGCsd4yY63ynbI/9Tl0jvaduyV/jX5qFVFUbE5UdJ5nPcXPcXE7zqua4S2trd9TwCgWi2F2mwf3tQWxgu2dbda69VuzeeP9Fd4Iw+ZpBLIPumHSv53DdyG9c8M4TfaCHyAsh47C/sbXd2rTbNZ2xtDGANa0UAG4Jpk3zKhcUdEIQrCQQTTU7kKDftp6OCR1aHKQOZ0CCG9LZndsnzve/wB5zneJqtMu2HJFG33WtHfTVZvdlm6SWNnFwryGp8gtRSwZfTLtnG3WYSRvYfzAj6FZe0ujfXY9jvBzT/RaukXGd35JRIB1ZNvY4fUfIotfkn1E+OS/A4WO0iRjXjY4A/ULslHBd40JhcdvWZz3j18U3FSnsux3ynYISxYMVvknEH2WRrgQH1c3qA06xHDVX77fEBUyxgA01e0a8Nu1CZZokKNeFgjmZklYHN7do7QdoKhXrf8AHBLDG7UymlQW0aCQMzqnZrt7CrAWuPTrs1FR1m6jXUa7ND4KQEe9P8PyKmzyAj3X6H9Q2+CWbbcFpirnheAN4GYeLarXZbdE0AukY0O2EuaAeRJ1XQzty58zctK5qilONdlErlE7ZiX2Z/uP/S76L7HY5XGgjkJOwBrj6LUhiQG2Ms7AxzHsLukD67A4000/Lx3q4FrZlLs7co0LswoDwrWijiidmXWDBtqk2sEY4vIH8o1TfcuCoYaOk+9eOOjQexu/vTFNamMbmc9rWnYS4AHvKrL1xFFD0WoeJXZQWOaQNnWOuzVTpIjbZcBCq57yf00TI2sfG/2pOlYCKV2NrV3cpsluia7I6Rgd7pc0Hwqm2Qd0LnJO1po5zQTsBIBpyKLPaGPFWOa4bKtIcK9yAOiUcb22pZEN3WdzOgHz8U0Wy0tjY57tjRX6BZparQ6WQuOrnHYPID5JaZm9Relx+RgwPY6yPlI0YMo+J23wHzTqoFyWDoYWs37XfEdqnppWkWYo4ykCiXpYRNG6N2/YeBGwqWhSO1taMqkjfE8g1a9h8CNhC0C470E8ebQObo8cDx5FQ8VXL0rekYPvGjUe83hzCTrvtz4Xh7Nuwg7CN4Kr+lmNN4b0+i0uO8Ijek7hIzLIMrDUUcTkoBxOiqYLuifBeEjmgvje7Ianq6k7NieLnjssrRJHFGHNIr1Ggtdt4easG2GMBzRGyj/aGUUdz4o47N6tPyjOLbFGW3a+QDK4BsjnbCxr26E8ACVOt132eW8bPE0AwGHQRuoCB0poCN1QniW74nMDHRsLG7GlooOQ3L7Fd8TS0tjYC0UaQ0AtGugO4anxRxJ5CK2yWdl4SRWnKIo4g2ESHqhoa2lCd/td9VTF7vsgbV32b7TQbaZafLfzWpWy74padLGx9NmZoNF6dYoyzoyxpj9zKMvgjiHIQ7G2zi9IxZcnR9E72DUZujfXv2Krit0YuyeEuAkMoIZvIDmEn+U+C02C7omEFkTGlooCGgEDgD3leTdMFXHoY6u9o5G661170cQ5CNKIza7KLVToPs7MmbRmbJv3bfRfMTWayNEDoAzo+nLXkVLdjS5oPu79O1P1osET2hr42OaNgLQQOXBef/zYcnR9EzJWuXKKV404o4hyE+2NhFusQs2To6Py5CC2tXVoR2qlszbObLa3Wgt+05zTMevm3UG3bWq0uK7om5csTBkrlo0DLXbTgvE11QPfndFG5/vFoJ8UcQ5CGLP0st3MnBdmioQ6tS2rstd+wBWuCIRHardGzRjHgAcAHPp5aJufZWFweWNLm+y4gVHI7kp4hvdjS9lnDQX/AOrI0AF3EV376lGteSvJlUrbOGKr36V/RsPUYdabHO48gu2Drqzv6Zw6rPZ7XceQ+aqbmut08mUaNGrncB9Vo9ngaxoa0Ua0UARK29mXFLuudHVCEKw1ghCEACVsS4dzVlhHW2uYPzdo7ezemlChrYtwqWmZZYra+F+ZhII2jcewhPFzX/HNQGjJPdO/4Tv5LzfmHWTVc3qScdzuY9Uk22xSROyyNLTu4HtB3pPMmT34X+jT0JGuzFEkdGv+8aOOjh37+9MthxBBJsfld7r9PPYUypM0xmmi0QgGuxCktBCEIAEIXG0WtkYq97W8yAghvR2XOedrGlz3BoG8pft+LmN0iaXniatH1SveF4yTGsjq8BsA5BK6RRfqJXXkt78xM6SrIqtZvdsLuXAeaqrput878rBoPaduaPr2KwubDT5aOkqxn8zuQ3DtKd7HZGRNDGNDWj+6k7yoSb7Kpx1kfKjxdtgZCwMYNN53k8SpSEKw1pa8IEIQgkEIQgAQhCABcbVZWSNyvaHDgf70XZCAFK8cH74Xfwu9HfVLlsuyWL/UjcO2lR4jRagvhCVwiivTy+vBllntsjPYe5vIn5KwhxLaW/nDvia0+YoU62m5oJPaiaTxAynxFFXS4RgOzO3k6vzql4sq/hyT0yh/zZaP/H+k/VfH4rtBG1g7Q36kq4ODY90j/wCX6L2zB0W98h/SPRGqDhm+RYnvu0P9qV3IUb+2ihAOed7j3kp/gwxZm/kLvic4+VaKzgsrGaMa1vIAI4P8k/49P6mIlgwzPJq4dG3i7b+ka+NE0XXhyKGhpnf7zt3IbArlCZSkXRhmQQhCYtBCEIAEIQgD/9k="/>
           <p:cNvSpPr>
             <a:spLocks noChangeAspect="1" noChangeArrowheads="1"/>
@@ -11304,38 +10271,6 @@
           </a:p>
         </p:txBody>
       </p:sp>
-      <p:pic>
-        <p:nvPicPr>
-          <p:cNvPr id="12294" name="Picture 1" descr="C:\Users\Sumit\Desktop\Photo Work\5-pen-pc.jpg"/>
-          <p:cNvPicPr>
-            <a:picLocks noChangeAspect="1" noChangeArrowheads="1"/>
-          </p:cNvPicPr>
-          <p:nvPr/>
-        </p:nvPicPr>
-        <p:blipFill>
-          <a:blip r:embed="rId3" cstate="print"/>
-          <a:srcRect/>
-          <a:stretch>
-            <a:fillRect/>
-          </a:stretch>
-        </p:blipFill>
-        <p:spPr bwMode="auto">
-          <a:xfrm>
-            <a:off x="6400800" y="1828800"/>
-            <a:ext cx="3676650" cy="3714750"/>
-          </a:xfrm>
-          <a:prstGeom prst="rect">
-            <a:avLst/>
-          </a:prstGeom>
-          <a:noFill/>
-          <a:ln w="9525">
-            <a:noFill/>
-            <a:miter lim="800000"/>
-            <a:headEnd/>
-            <a:tailEnd/>
-          </a:ln>
-        </p:spPr>
-      </p:pic>
     </p:spTree>
     <p:extLst>
       <p:ext uri="{BB962C8B-B14F-4D97-AF65-F5344CB8AC3E}">
@@ -12325,6 +11260,78 @@
             <a:r>
               <a:rPr lang="en-US" dirty="0"/>
               <a:t>Algorithm 1 K-Means Clustering</a:t>
+            </a:r>
+          </a:p>
+        </p:txBody>
+      </p:sp>
+      <p:pic>
+        <p:nvPicPr>
+          <p:cNvPr id="5" name="Picture 4">
+            <a:extLst>
+              <a:ext uri="{FF2B5EF4-FFF2-40B4-BE49-F238E27FC236}">
+                <a16:creationId xmlns:a16="http://schemas.microsoft.com/office/drawing/2014/main" id="{B9597FFE-EE60-35FB-0F86-820179E7F607}"/>
+              </a:ext>
+            </a:extLst>
+          </p:cNvPr>
+          <p:cNvPicPr>
+            <a:picLocks noChangeAspect="1"/>
+          </p:cNvPicPr>
+          <p:nvPr/>
+        </p:nvPicPr>
+        <p:blipFill>
+          <a:blip r:embed="rId2">
+            <a:extLst>
+              <a:ext uri="{28A0092B-C50C-407E-A947-70E740481C1C}">
+                <a14:useLocalDpi xmlns:a14="http://schemas.microsoft.com/office/drawing/2010/main" val="0"/>
+              </a:ext>
+            </a:extLst>
+          </a:blip>
+          <a:stretch>
+            <a:fillRect/>
+          </a:stretch>
+        </p:blipFill>
+        <p:spPr>
+          <a:xfrm>
+            <a:off x="1034321" y="584616"/>
+            <a:ext cx="9698635" cy="5336499"/>
+          </a:xfrm>
+          <a:prstGeom prst="rect">
+            <a:avLst/>
+          </a:prstGeom>
+        </p:spPr>
+      </p:pic>
+      <p:sp>
+        <p:nvSpPr>
+          <p:cNvPr id="7" name="TextBox 6">
+            <a:extLst>
+              <a:ext uri="{FF2B5EF4-FFF2-40B4-BE49-F238E27FC236}">
+                <a16:creationId xmlns:a16="http://schemas.microsoft.com/office/drawing/2014/main" id="{88177F15-F00F-B44D-EDF5-1A861BA0E93B}"/>
+              </a:ext>
+            </a:extLst>
+          </p:cNvPr>
+          <p:cNvSpPr txBox="1"/>
+          <p:nvPr/>
+        </p:nvSpPr>
+        <p:spPr>
+          <a:xfrm>
+            <a:off x="1573967" y="6041036"/>
+            <a:ext cx="9263922" cy="369332"/>
+          </a:xfrm>
+          <a:prstGeom prst="rect">
+            <a:avLst/>
+          </a:prstGeom>
+          <a:noFill/>
+        </p:spPr>
+        <p:txBody>
+          <a:bodyPr wrap="square" rtlCol="0">
+            <a:spAutoFit/>
+          </a:bodyPr>
+          <a:lstStyle/>
+          <a:p>
+            <a:pPr algn="ctr"/>
+            <a:r>
+              <a:rPr lang="en-US" dirty="0"/>
+              <a:t>Working of K-means clustering algorithm </a:t>
             </a:r>
           </a:p>
         </p:txBody>

</xml_diff>

<commit_message>
final data  in ppt
</commit_message>
<xml_diff>
--- a/final_submission_ppt.pptx
+++ b/final_submission_ppt.pptx
@@ -10140,6 +10140,68 @@
           </a:p>
         </p:txBody>
       </p:sp>
+      <p:sp>
+        <p:nvSpPr>
+          <p:cNvPr id="2" name="TextBox 1">
+            <a:extLst>
+              <a:ext uri="{FF2B5EF4-FFF2-40B4-BE49-F238E27FC236}">
+                <a16:creationId xmlns:a16="http://schemas.microsoft.com/office/drawing/2014/main" id="{80966698-5B30-1362-DD90-538A4A1ED17B}"/>
+              </a:ext>
+            </a:extLst>
+          </p:cNvPr>
+          <p:cNvSpPr txBox="1"/>
+          <p:nvPr/>
+        </p:nvSpPr>
+        <p:spPr>
+          <a:xfrm>
+            <a:off x="0" y="1184223"/>
+            <a:ext cx="12192000" cy="2585323"/>
+          </a:xfrm>
+          <a:prstGeom prst="rect">
+            <a:avLst/>
+          </a:prstGeom>
+          <a:noFill/>
+        </p:spPr>
+        <p:txBody>
+          <a:bodyPr wrap="square" rtlCol="0">
+            <a:spAutoFit/>
+          </a:bodyPr>
+          <a:lstStyle/>
+          <a:p>
+            <a:pPr marL="285750" indent="-285750">
+              <a:buFont typeface="Wingdings" panose="05000000000000000000" pitchFamily="2" charset="2"/>
+              <a:buChar char="Ø"/>
+            </a:pPr>
+            <a:r>
+              <a:rPr lang="en-US" dirty="0"/>
+              <a:t>The highly competitive and dynamic nature of the job market as well as personal preferences and goals lead individuals to change their jobs at some point in their lives. </a:t>
+            </a:r>
+          </a:p>
+          <a:p>
+            <a:pPr marL="285750" indent="-285750">
+              <a:buFont typeface="Wingdings" panose="05000000000000000000" pitchFamily="2" charset="2"/>
+              <a:buChar char="Ø"/>
+            </a:pPr>
+            <a:r>
+              <a:rPr lang="en-US" dirty="0"/>
+              <a:t>Moving to a new job, however, is not an easy decision, which may depend on many factors, such as salary, job description, and geographical location. </a:t>
+            </a:r>
+          </a:p>
+          <a:p>
+            <a:pPr marL="285750" indent="-285750">
+              <a:buFont typeface="Wingdings" panose="05000000000000000000" pitchFamily="2" charset="2"/>
+              <a:buChar char="Ø"/>
+            </a:pPr>
+            <a:r>
+              <a:rPr lang="en-US" dirty="0"/>
+              <a:t>Making successful job transitions is essential for a successful professional career. In this work, we build an automated system that can recommend jobs to people based on their past job histories in order to facilitate the process of selecting a new job. We believe that such a system can successfully exploit the job transitions performed by other employees.</a:t>
+            </a:r>
+          </a:p>
+          <a:p>
+            <a:endParaRPr lang="en-US" dirty="0"/>
+          </a:p>
+        </p:txBody>
+      </p:sp>
     </p:spTree>
     <p:extLst>
       <p:ext uri="{BB962C8B-B14F-4D97-AF65-F5344CB8AC3E}">
@@ -10268,6 +10330,86 @@
             <a:endParaRPr lang="en-US">
               <a:latin typeface="Gill Sans MT" pitchFamily="34" charset="0"/>
             </a:endParaRPr>
+          </a:p>
+        </p:txBody>
+      </p:sp>
+      <p:sp>
+        <p:nvSpPr>
+          <p:cNvPr id="2" name="TextBox 1">
+            <a:extLst>
+              <a:ext uri="{FF2B5EF4-FFF2-40B4-BE49-F238E27FC236}">
+                <a16:creationId xmlns:a16="http://schemas.microsoft.com/office/drawing/2014/main" id="{2B555AE2-BF15-40DE-6311-17111F567FFE}"/>
+              </a:ext>
+            </a:extLst>
+          </p:cNvPr>
+          <p:cNvSpPr txBox="1"/>
+          <p:nvPr/>
+        </p:nvSpPr>
+        <p:spPr>
+          <a:xfrm>
+            <a:off x="134911" y="1364105"/>
+            <a:ext cx="12057089" cy="2862322"/>
+          </a:xfrm>
+          <a:prstGeom prst="rect">
+            <a:avLst/>
+          </a:prstGeom>
+          <a:noFill/>
+        </p:spPr>
+        <p:txBody>
+          <a:bodyPr wrap="square" rtlCol="0">
+            <a:spAutoFit/>
+          </a:bodyPr>
+          <a:lstStyle/>
+          <a:p>
+            <a:pPr marL="285750" indent="-285750">
+              <a:buFont typeface="Wingdings" panose="05000000000000000000" pitchFamily="2" charset="2"/>
+              <a:buChar char="Ø"/>
+            </a:pPr>
+            <a:r>
+              <a:rPr lang="en-US" dirty="0"/>
+              <a:t>According to Narendra Nathan that the identification of the parameters of interest is achieved by a priori specification of the distribution of wage-vacancies, as required by the applicants.</a:t>
+            </a:r>
+          </a:p>
+          <a:p>
+            <a:pPr marL="285750" indent="-285750">
+              <a:buFont typeface="Wingdings" panose="05000000000000000000" pitchFamily="2" charset="2"/>
+              <a:buChar char="Ø"/>
+            </a:pPr>
+            <a:r>
+              <a:rPr lang="en-US" dirty="0"/>
+              <a:t>Previous research related to applications such as the </a:t>
+            </a:r>
+            <a:r>
+              <a:rPr lang="en-US" dirty="0" err="1"/>
+              <a:t>Puspasari</a:t>
+            </a:r>
+            <a:r>
+              <a:rPr lang="en-US" dirty="0"/>
+              <a:t> research, where the use of applications can increase efficiency and data information on special processes that are displayed.</a:t>
+            </a:r>
+          </a:p>
+          <a:p>
+            <a:pPr marL="285750" indent="-285750">
+              <a:buFont typeface="Wingdings" panose="05000000000000000000" pitchFamily="2" charset="2"/>
+              <a:buChar char="Ø"/>
+            </a:pPr>
+            <a:r>
+              <a:rPr lang="en-US" dirty="0"/>
+              <a:t>Data Clustering is one of the Data Mining methods that is unsupervised. There are two types of data clustering that are often used in the data grouping process, namely hierarchical (hierarchical) data clustering and non-hierarchical (nonhierarchical) data clustering.</a:t>
+            </a:r>
+          </a:p>
+          <a:p>
+            <a:pPr marL="285750" indent="-285750">
+              <a:buFont typeface="Wingdings" panose="05000000000000000000" pitchFamily="2" charset="2"/>
+              <a:buChar char="Ø"/>
+            </a:pPr>
+            <a:r>
+              <a:rPr lang="en-US" dirty="0"/>
+              <a:t>This method partitions data into clusters so that data with the same characteristics are grouped into the same cluster and data with different characteristics are grouped into other groups.</a:t>
+            </a:r>
+          </a:p>
+          <a:p>
+            <a:endParaRPr lang="en-US" dirty="0"/>
           </a:p>
         </p:txBody>
       </p:sp>

</xml_diff>